<commit_message>
up to date pp
</commit_message>
<xml_diff>
--- a/Movie PP.pptx
+++ b/Movie PP.pptx
@@ -5,7 +5,7 @@
     <p:sldMasterId id="2147483648" r:id="rId1"/>
   </p:sldMasterIdLst>
   <p:notesMasterIdLst>
-    <p:notesMasterId r:id="rId10"/>
+    <p:notesMasterId r:id="rId12"/>
   </p:notesMasterIdLst>
   <p:sldIdLst>
     <p:sldId id="256" r:id="rId2"/>
@@ -13,9 +13,11 @@
     <p:sldId id="258" r:id="rId4"/>
     <p:sldId id="259" r:id="rId5"/>
     <p:sldId id="260" r:id="rId6"/>
-    <p:sldId id="261" r:id="rId7"/>
-    <p:sldId id="262" r:id="rId8"/>
-    <p:sldId id="263" r:id="rId9"/>
+    <p:sldId id="265" r:id="rId7"/>
+    <p:sldId id="261" r:id="rId8"/>
+    <p:sldId id="262" r:id="rId9"/>
+    <p:sldId id="263" r:id="rId10"/>
+    <p:sldId id="266" r:id="rId11"/>
   </p:sldIdLst>
   <p:sldSz cx="12192000" cy="6858000"/>
   <p:notesSz cx="6858000" cy="9144000"/>
@@ -128,12 +130,17 @@
           <p14:sldIdLst>
             <p14:sldId id="259"/>
             <p14:sldId id="260"/>
+            <p14:sldId id="265"/>
             <p14:sldId id="261"/>
             <p14:sldId id="262"/>
             <p14:sldId id="263"/>
+            <p14:sldId id="266"/>
           </p14:sldIdLst>
         </p14:section>
       </p14:sectionLst>
+    </p:ext>
+    <p:ext uri="{EFAFB233-063F-42B5-8137-9DF3F51BA10A}">
+      <p15:sldGuideLst xmlns:p15="http://schemas.microsoft.com/office/powerpoint/2012/main"/>
     </p:ext>
   </p:extLst>
 </p:presentation>
@@ -221,7 +228,7 @@
           <a:p>
             <a:fld id="{8C131F1C-F2D8-4C30-9616-DDF80984660A}" type="datetimeFigureOut">
               <a:rPr lang="en-US" smtClean="0"/>
-              <a:t>11/1/2018</a:t>
+              <a:t>11/2/2018</a:t>
             </a:fld>
             <a:endParaRPr lang="en-US"/>
           </a:p>
@@ -627,6 +634,93 @@
           <a:bodyPr/>
           <a:lstStyle/>
           <a:p>
+            <a:r>
+              <a:rPr lang="en-US" dirty="0"/>
+              <a:t>With that question in mind we wondered what variables might be a marker of a movie’s success.  While there are hundreds of variables to consider these are the ones we chose to look at.</a:t>
+            </a:r>
+          </a:p>
+        </p:txBody>
+      </p:sp>
+      <p:sp>
+        <p:nvSpPr>
+          <p:cNvPr id="4" name="Slide Number Placeholder 3"/>
+          <p:cNvSpPr>
+            <a:spLocks noGrp="1"/>
+          </p:cNvSpPr>
+          <p:nvPr>
+            <p:ph type="sldNum" sz="quarter" idx="10"/>
+          </p:nvPr>
+        </p:nvSpPr>
+        <p:spPr/>
+        <p:txBody>
+          <a:bodyPr/>
+          <a:lstStyle/>
+          <a:p>
+            <a:fld id="{45B89091-1790-4AD1-9A8F-9BC8A8FD4FF7}" type="slidenum">
+              <a:rPr lang="en-US" smtClean="0"/>
+              <a:t>3</a:t>
+            </a:fld>
+            <a:endParaRPr lang="en-US"/>
+          </a:p>
+        </p:txBody>
+      </p:sp>
+    </p:spTree>
+    <p:extLst>
+      <p:ext uri="{BB962C8B-B14F-4D97-AF65-F5344CB8AC3E}">
+        <p14:creationId xmlns:p14="http://schemas.microsoft.com/office/powerpoint/2010/main" val="2387874677"/>
+      </p:ext>
+    </p:extLst>
+  </p:cSld>
+  <p:clrMapOvr>
+    <a:masterClrMapping/>
+  </p:clrMapOvr>
+</p:notes>
+</file>
+
+<file path=ppt/notesSlides/notesSlide3.xml><?xml version="1.0" encoding="utf-8"?>
+<p:notes xmlns:a="http://schemas.openxmlformats.org/drawingml/2006/main" xmlns:r="http://schemas.openxmlformats.org/officeDocument/2006/relationships" xmlns:p="http://schemas.openxmlformats.org/presentationml/2006/main">
+  <p:cSld>
+    <p:spTree>
+      <p:nvGrpSpPr>
+        <p:cNvPr id="1" name=""/>
+        <p:cNvGrpSpPr/>
+        <p:nvPr/>
+      </p:nvGrpSpPr>
+      <p:grpSpPr>
+        <a:xfrm>
+          <a:off x="0" y="0"/>
+          <a:ext cx="0" cy="0"/>
+          <a:chOff x="0" y="0"/>
+          <a:chExt cx="0" cy="0"/>
+        </a:xfrm>
+      </p:grpSpPr>
+      <p:sp>
+        <p:nvSpPr>
+          <p:cNvPr id="2" name="Slide Image Placeholder 1"/>
+          <p:cNvSpPr>
+            <a:spLocks noGrp="1" noRot="1" noChangeAspect="1"/>
+          </p:cNvSpPr>
+          <p:nvPr>
+            <p:ph type="sldImg"/>
+          </p:nvPr>
+        </p:nvSpPr>
+        <p:spPr/>
+      </p:sp>
+      <p:sp>
+        <p:nvSpPr>
+          <p:cNvPr id="3" name="Notes Placeholder 2"/>
+          <p:cNvSpPr>
+            <a:spLocks noGrp="1"/>
+          </p:cNvSpPr>
+          <p:nvPr>
+            <p:ph type="body" idx="1"/>
+          </p:nvPr>
+        </p:nvSpPr>
+        <p:spPr/>
+        <p:txBody>
+          <a:bodyPr/>
+          <a:lstStyle/>
+          <a:p>
             <a:endParaRPr lang="en-US" dirty="0"/>
           </a:p>
         </p:txBody>
@@ -658,6 +752,444 @@
     <p:extLst>
       <p:ext uri="{BB962C8B-B14F-4D97-AF65-F5344CB8AC3E}">
         <p14:creationId xmlns:p14="http://schemas.microsoft.com/office/powerpoint/2010/main" val="1615157825"/>
+      </p:ext>
+    </p:extLst>
+  </p:cSld>
+  <p:clrMapOvr>
+    <a:masterClrMapping/>
+  </p:clrMapOvr>
+</p:notes>
+</file>
+
+<file path=ppt/notesSlides/notesSlide4.xml><?xml version="1.0" encoding="utf-8"?>
+<p:notes xmlns:a="http://schemas.openxmlformats.org/drawingml/2006/main" xmlns:r="http://schemas.openxmlformats.org/officeDocument/2006/relationships" xmlns:p="http://schemas.openxmlformats.org/presentationml/2006/main">
+  <p:cSld>
+    <p:spTree>
+      <p:nvGrpSpPr>
+        <p:cNvPr id="1" name=""/>
+        <p:cNvGrpSpPr/>
+        <p:nvPr/>
+      </p:nvGrpSpPr>
+      <p:grpSpPr>
+        <a:xfrm>
+          <a:off x="0" y="0"/>
+          <a:ext cx="0" cy="0"/>
+          <a:chOff x="0" y="0"/>
+          <a:chExt cx="0" cy="0"/>
+        </a:xfrm>
+      </p:grpSpPr>
+      <p:sp>
+        <p:nvSpPr>
+          <p:cNvPr id="2" name="Slide Image Placeholder 1"/>
+          <p:cNvSpPr>
+            <a:spLocks noGrp="1" noRot="1" noChangeAspect="1"/>
+          </p:cNvSpPr>
+          <p:nvPr>
+            <p:ph type="sldImg"/>
+          </p:nvPr>
+        </p:nvSpPr>
+        <p:spPr/>
+      </p:sp>
+      <p:sp>
+        <p:nvSpPr>
+          <p:cNvPr id="3" name="Notes Placeholder 2"/>
+          <p:cNvSpPr>
+            <a:spLocks noGrp="1"/>
+          </p:cNvSpPr>
+          <p:nvPr>
+            <p:ph type="body" idx="1"/>
+          </p:nvPr>
+        </p:nvSpPr>
+        <p:spPr/>
+        <p:txBody>
+          <a:bodyPr/>
+          <a:lstStyle/>
+          <a:p>
+            <a:r>
+              <a:rPr lang="en-US" dirty="0"/>
+              <a:t>Does a movie’s MPAA rating effect Gross Revenue?  Absolutely.  As you can see in this graph General Admission movies make more on average than any other single rating category.  And when you combine that with PG movies the results dwarf the other categories.  Which is logical as you’re not limiting the number of people who can see the movie moreover kid’s movies require additional tickets for parents and kids.  This is reflected in the budget when examined by MPAA rating.</a:t>
+            </a:r>
+          </a:p>
+        </p:txBody>
+      </p:sp>
+      <p:sp>
+        <p:nvSpPr>
+          <p:cNvPr id="4" name="Slide Number Placeholder 3"/>
+          <p:cNvSpPr>
+            <a:spLocks noGrp="1"/>
+          </p:cNvSpPr>
+          <p:nvPr>
+            <p:ph type="sldNum" sz="quarter" idx="10"/>
+          </p:nvPr>
+        </p:nvSpPr>
+        <p:spPr/>
+        <p:txBody>
+          <a:bodyPr/>
+          <a:lstStyle/>
+          <a:p>
+            <a:fld id="{45B89091-1790-4AD1-9A8F-9BC8A8FD4FF7}" type="slidenum">
+              <a:rPr lang="en-US" smtClean="0"/>
+              <a:t>5</a:t>
+            </a:fld>
+            <a:endParaRPr lang="en-US"/>
+          </a:p>
+        </p:txBody>
+      </p:sp>
+    </p:spTree>
+    <p:extLst>
+      <p:ext uri="{BB962C8B-B14F-4D97-AF65-F5344CB8AC3E}">
+        <p14:creationId xmlns:p14="http://schemas.microsoft.com/office/powerpoint/2010/main" val="3423515060"/>
+      </p:ext>
+    </p:extLst>
+  </p:cSld>
+  <p:clrMapOvr>
+    <a:masterClrMapping/>
+  </p:clrMapOvr>
+</p:notes>
+</file>
+
+<file path=ppt/notesSlides/notesSlide5.xml><?xml version="1.0" encoding="utf-8"?>
+<p:notes xmlns:a="http://schemas.openxmlformats.org/drawingml/2006/main" xmlns:r="http://schemas.openxmlformats.org/officeDocument/2006/relationships" xmlns:p="http://schemas.openxmlformats.org/presentationml/2006/main">
+  <p:cSld>
+    <p:spTree>
+      <p:nvGrpSpPr>
+        <p:cNvPr id="1" name=""/>
+        <p:cNvGrpSpPr/>
+        <p:nvPr/>
+      </p:nvGrpSpPr>
+      <p:grpSpPr>
+        <a:xfrm>
+          <a:off x="0" y="0"/>
+          <a:ext cx="0" cy="0"/>
+          <a:chOff x="0" y="0"/>
+          <a:chExt cx="0" cy="0"/>
+        </a:xfrm>
+      </p:grpSpPr>
+      <p:sp>
+        <p:nvSpPr>
+          <p:cNvPr id="2" name="Slide Image Placeholder 1"/>
+          <p:cNvSpPr>
+            <a:spLocks noGrp="1" noRot="1" noChangeAspect="1"/>
+          </p:cNvSpPr>
+          <p:nvPr>
+            <p:ph type="sldImg"/>
+          </p:nvPr>
+        </p:nvSpPr>
+        <p:spPr/>
+      </p:sp>
+      <p:sp>
+        <p:nvSpPr>
+          <p:cNvPr id="3" name="Notes Placeholder 2"/>
+          <p:cNvSpPr>
+            <a:spLocks noGrp="1"/>
+          </p:cNvSpPr>
+          <p:nvPr>
+            <p:ph type="body" idx="1"/>
+          </p:nvPr>
+        </p:nvSpPr>
+        <p:spPr/>
+        <p:txBody>
+          <a:bodyPr/>
+          <a:lstStyle/>
+          <a:p>
+            <a:r>
+              <a:rPr lang="en-US" dirty="0"/>
+              <a:t>Here’s a side by side comparison to underscore the point, proportionally more money goes into movies studios think will make more money.</a:t>
+            </a:r>
+          </a:p>
+        </p:txBody>
+      </p:sp>
+      <p:sp>
+        <p:nvSpPr>
+          <p:cNvPr id="4" name="Slide Number Placeholder 3"/>
+          <p:cNvSpPr>
+            <a:spLocks noGrp="1"/>
+          </p:cNvSpPr>
+          <p:nvPr>
+            <p:ph type="sldNum" sz="quarter" idx="10"/>
+          </p:nvPr>
+        </p:nvSpPr>
+        <p:spPr/>
+        <p:txBody>
+          <a:bodyPr/>
+          <a:lstStyle/>
+          <a:p>
+            <a:fld id="{45B89091-1790-4AD1-9A8F-9BC8A8FD4FF7}" type="slidenum">
+              <a:rPr lang="en-US" smtClean="0"/>
+              <a:t>6</a:t>
+            </a:fld>
+            <a:endParaRPr lang="en-US"/>
+          </a:p>
+        </p:txBody>
+      </p:sp>
+    </p:spTree>
+    <p:extLst>
+      <p:ext uri="{BB962C8B-B14F-4D97-AF65-F5344CB8AC3E}">
+        <p14:creationId xmlns:p14="http://schemas.microsoft.com/office/powerpoint/2010/main" val="3097152910"/>
+      </p:ext>
+    </p:extLst>
+  </p:cSld>
+  <p:clrMapOvr>
+    <a:masterClrMapping/>
+  </p:clrMapOvr>
+</p:notes>
+</file>
+
+<file path=ppt/notesSlides/notesSlide6.xml><?xml version="1.0" encoding="utf-8"?>
+<p:notes xmlns:a="http://schemas.openxmlformats.org/drawingml/2006/main" xmlns:r="http://schemas.openxmlformats.org/officeDocument/2006/relationships" xmlns:p="http://schemas.openxmlformats.org/presentationml/2006/main">
+  <p:cSld>
+    <p:spTree>
+      <p:nvGrpSpPr>
+        <p:cNvPr id="1" name=""/>
+        <p:cNvGrpSpPr/>
+        <p:nvPr/>
+      </p:nvGrpSpPr>
+      <p:grpSpPr>
+        <a:xfrm>
+          <a:off x="0" y="0"/>
+          <a:ext cx="0" cy="0"/>
+          <a:chOff x="0" y="0"/>
+          <a:chExt cx="0" cy="0"/>
+        </a:xfrm>
+      </p:grpSpPr>
+      <p:sp>
+        <p:nvSpPr>
+          <p:cNvPr id="2" name="Slide Image Placeholder 1"/>
+          <p:cNvSpPr>
+            <a:spLocks noGrp="1" noRot="1" noChangeAspect="1"/>
+          </p:cNvSpPr>
+          <p:nvPr>
+            <p:ph type="sldImg"/>
+          </p:nvPr>
+        </p:nvSpPr>
+        <p:spPr/>
+      </p:sp>
+      <p:sp>
+        <p:nvSpPr>
+          <p:cNvPr id="3" name="Notes Placeholder 2"/>
+          <p:cNvSpPr>
+            <a:spLocks noGrp="1"/>
+          </p:cNvSpPr>
+          <p:nvPr>
+            <p:ph type="body" idx="1"/>
+          </p:nvPr>
+        </p:nvSpPr>
+        <p:spPr/>
+        <p:txBody>
+          <a:bodyPr/>
+          <a:lstStyle/>
+          <a:p>
+            <a:endParaRPr lang="en-US" dirty="0"/>
+          </a:p>
+        </p:txBody>
+      </p:sp>
+      <p:sp>
+        <p:nvSpPr>
+          <p:cNvPr id="4" name="Slide Number Placeholder 3"/>
+          <p:cNvSpPr>
+            <a:spLocks noGrp="1"/>
+          </p:cNvSpPr>
+          <p:nvPr>
+            <p:ph type="sldNum" sz="quarter" idx="10"/>
+          </p:nvPr>
+        </p:nvSpPr>
+        <p:spPr/>
+        <p:txBody>
+          <a:bodyPr/>
+          <a:lstStyle/>
+          <a:p>
+            <a:fld id="{45B89091-1790-4AD1-9A8F-9BC8A8FD4FF7}" type="slidenum">
+              <a:rPr lang="en-US" smtClean="0"/>
+              <a:t>7</a:t>
+            </a:fld>
+            <a:endParaRPr lang="en-US"/>
+          </a:p>
+        </p:txBody>
+      </p:sp>
+    </p:spTree>
+    <p:extLst>
+      <p:ext uri="{BB962C8B-B14F-4D97-AF65-F5344CB8AC3E}">
+        <p14:creationId xmlns:p14="http://schemas.microsoft.com/office/powerpoint/2010/main" val="2031580490"/>
+      </p:ext>
+    </p:extLst>
+  </p:cSld>
+  <p:clrMapOvr>
+    <a:masterClrMapping/>
+  </p:clrMapOvr>
+</p:notes>
+</file>
+
+<file path=ppt/notesSlides/notesSlide7.xml><?xml version="1.0" encoding="utf-8"?>
+<p:notes xmlns:a="http://schemas.openxmlformats.org/drawingml/2006/main" xmlns:r="http://schemas.openxmlformats.org/officeDocument/2006/relationships" xmlns:p="http://schemas.openxmlformats.org/presentationml/2006/main">
+  <p:cSld>
+    <p:spTree>
+      <p:nvGrpSpPr>
+        <p:cNvPr id="1" name=""/>
+        <p:cNvGrpSpPr/>
+        <p:nvPr/>
+      </p:nvGrpSpPr>
+      <p:grpSpPr>
+        <a:xfrm>
+          <a:off x="0" y="0"/>
+          <a:ext cx="0" cy="0"/>
+          <a:chOff x="0" y="0"/>
+          <a:chExt cx="0" cy="0"/>
+        </a:xfrm>
+      </p:grpSpPr>
+      <p:sp>
+        <p:nvSpPr>
+          <p:cNvPr id="2" name="Slide Image Placeholder 1"/>
+          <p:cNvSpPr>
+            <a:spLocks noGrp="1" noRot="1" noChangeAspect="1"/>
+          </p:cNvSpPr>
+          <p:nvPr>
+            <p:ph type="sldImg"/>
+          </p:nvPr>
+        </p:nvSpPr>
+        <p:spPr/>
+      </p:sp>
+      <p:sp>
+        <p:nvSpPr>
+          <p:cNvPr id="3" name="Notes Placeholder 2"/>
+          <p:cNvSpPr>
+            <a:spLocks noGrp="1"/>
+          </p:cNvSpPr>
+          <p:nvPr>
+            <p:ph type="body" idx="1"/>
+          </p:nvPr>
+        </p:nvSpPr>
+        <p:spPr/>
+        <p:txBody>
+          <a:bodyPr/>
+          <a:lstStyle/>
+          <a:p>
+            <a:r>
+              <a:rPr lang="en-US" dirty="0"/>
+              <a:t>It might be too early to tell.</a:t>
+            </a:r>
+          </a:p>
+        </p:txBody>
+      </p:sp>
+      <p:sp>
+        <p:nvSpPr>
+          <p:cNvPr id="4" name="Slide Number Placeholder 3"/>
+          <p:cNvSpPr>
+            <a:spLocks noGrp="1"/>
+          </p:cNvSpPr>
+          <p:nvPr>
+            <p:ph type="sldNum" sz="quarter" idx="10"/>
+          </p:nvPr>
+        </p:nvSpPr>
+        <p:spPr/>
+        <p:txBody>
+          <a:bodyPr/>
+          <a:lstStyle/>
+          <a:p>
+            <a:fld id="{45B89091-1790-4AD1-9A8F-9BC8A8FD4FF7}" type="slidenum">
+              <a:rPr lang="en-US" smtClean="0"/>
+              <a:t>8</a:t>
+            </a:fld>
+            <a:endParaRPr lang="en-US"/>
+          </a:p>
+        </p:txBody>
+      </p:sp>
+    </p:spTree>
+    <p:extLst>
+      <p:ext uri="{BB962C8B-B14F-4D97-AF65-F5344CB8AC3E}">
+        <p14:creationId xmlns:p14="http://schemas.microsoft.com/office/powerpoint/2010/main" val="2070474913"/>
+      </p:ext>
+    </p:extLst>
+  </p:cSld>
+  <p:clrMapOvr>
+    <a:masterClrMapping/>
+  </p:clrMapOvr>
+</p:notes>
+</file>
+
+<file path=ppt/notesSlides/notesSlide8.xml><?xml version="1.0" encoding="utf-8"?>
+<p:notes xmlns:a="http://schemas.openxmlformats.org/drawingml/2006/main" xmlns:r="http://schemas.openxmlformats.org/officeDocument/2006/relationships" xmlns:p="http://schemas.openxmlformats.org/presentationml/2006/main">
+  <p:cSld>
+    <p:spTree>
+      <p:nvGrpSpPr>
+        <p:cNvPr id="1" name=""/>
+        <p:cNvGrpSpPr/>
+        <p:nvPr/>
+      </p:nvGrpSpPr>
+      <p:grpSpPr>
+        <a:xfrm>
+          <a:off x="0" y="0"/>
+          <a:ext cx="0" cy="0"/>
+          <a:chOff x="0" y="0"/>
+          <a:chExt cx="0" cy="0"/>
+        </a:xfrm>
+      </p:grpSpPr>
+      <p:sp>
+        <p:nvSpPr>
+          <p:cNvPr id="2" name="Slide Image Placeholder 1"/>
+          <p:cNvSpPr>
+            <a:spLocks noGrp="1" noRot="1" noChangeAspect="1"/>
+          </p:cNvSpPr>
+          <p:nvPr>
+            <p:ph type="sldImg"/>
+          </p:nvPr>
+        </p:nvSpPr>
+        <p:spPr/>
+      </p:sp>
+      <p:sp>
+        <p:nvSpPr>
+          <p:cNvPr id="3" name="Notes Placeholder 2"/>
+          <p:cNvSpPr>
+            <a:spLocks noGrp="1"/>
+          </p:cNvSpPr>
+          <p:nvPr>
+            <p:ph type="body" idx="1"/>
+          </p:nvPr>
+        </p:nvSpPr>
+        <p:spPr/>
+        <p:txBody>
+          <a:bodyPr/>
+          <a:lstStyle/>
+          <a:p>
+            <a:r>
+              <a:rPr lang="en-US" dirty="0"/>
+              <a:t>However there are still exceptions to that…apparently people really enjoy Biopics, Historic flicks, and War movies.</a:t>
+            </a:r>
+          </a:p>
+          <a:p>
+            <a:r>
+              <a:rPr lang="en-US" dirty="0"/>
+              <a:t>War never changes.</a:t>
+            </a:r>
+          </a:p>
+        </p:txBody>
+      </p:sp>
+      <p:sp>
+        <p:nvSpPr>
+          <p:cNvPr id="4" name="Slide Number Placeholder 3"/>
+          <p:cNvSpPr>
+            <a:spLocks noGrp="1"/>
+          </p:cNvSpPr>
+          <p:nvPr>
+            <p:ph type="sldNum" sz="quarter" idx="10"/>
+          </p:nvPr>
+        </p:nvSpPr>
+        <p:spPr/>
+        <p:txBody>
+          <a:bodyPr/>
+          <a:lstStyle/>
+          <a:p>
+            <a:fld id="{45B89091-1790-4AD1-9A8F-9BC8A8FD4FF7}" type="slidenum">
+              <a:rPr lang="en-US" smtClean="0"/>
+              <a:t>10</a:t>
+            </a:fld>
+            <a:endParaRPr lang="en-US"/>
+          </a:p>
+        </p:txBody>
+      </p:sp>
+    </p:spTree>
+    <p:extLst>
+      <p:ext uri="{BB962C8B-B14F-4D97-AF65-F5344CB8AC3E}">
+        <p14:creationId xmlns:p14="http://schemas.microsoft.com/office/powerpoint/2010/main" val="3454636135"/>
       </p:ext>
     </p:extLst>
   </p:cSld>
@@ -1120,7 +1652,7 @@
           <a:p>
             <a:fld id="{F7AFFB9B-9FB8-469E-96F9-4D32314110B6}" type="datetimeFigureOut">
               <a:rPr lang="en-US" dirty="0"/>
-              <a:t>11/1/2018</a:t>
+              <a:t>11/2/2018</a:t>
             </a:fld>
             <a:endParaRPr lang="en-US" dirty="0"/>
           </a:p>
@@ -1448,7 +1980,7 @@
           <a:p>
             <a:fld id="{341D2AC3-6A0B-4169-B1EA-E3AE8B351BDD}" type="datetimeFigureOut">
               <a:rPr lang="en-US" dirty="0"/>
-              <a:t>11/1/2018</a:t>
+              <a:t>11/2/2018</a:t>
             </a:fld>
             <a:endParaRPr lang="en-US" dirty="0"/>
           </a:p>
@@ -1639,7 +2171,7 @@
           <a:p>
             <a:fld id="{DD4B9363-8B87-41B7-9F8E-64519CBB8F34}" type="datetimeFigureOut">
               <a:rPr lang="en-US" dirty="0"/>
-              <a:t>11/1/2018</a:t>
+              <a:t>11/2/2018</a:t>
             </a:fld>
             <a:endParaRPr lang="en-US" dirty="0"/>
           </a:p>
@@ -1904,7 +2436,7 @@
           <a:p>
             <a:fld id="{EAEF5746-5284-4951-9F37-7AE924EDBCB7}" type="datetimeFigureOut">
               <a:rPr lang="en-US" dirty="0"/>
-              <a:t>11/1/2018</a:t>
+              <a:t>11/2/2018</a:t>
             </a:fld>
             <a:endParaRPr lang="en-US" dirty="0"/>
           </a:p>
@@ -2327,7 +2859,7 @@
           <a:p>
             <a:fld id="{02398B29-7265-4A65-A2A4-6703C057B7C1}" type="datetimeFigureOut">
               <a:rPr lang="en-US" dirty="0"/>
-              <a:t>11/1/2018</a:t>
+              <a:t>11/2/2018</a:t>
             </a:fld>
             <a:endParaRPr lang="en-US" dirty="0"/>
           </a:p>
@@ -2872,7 +3404,7 @@
           <a:p>
             <a:fld id="{28FBA082-94DF-4C4B-A041-6624924AB0A8}" type="datetimeFigureOut">
               <a:rPr lang="en-US" dirty="0"/>
-              <a:t>11/1/2018</a:t>
+              <a:t>11/2/2018</a:t>
             </a:fld>
             <a:endParaRPr lang="en-US" dirty="0"/>
           </a:p>
@@ -3657,7 +4189,7 @@
           <a:p>
             <a:fld id="{B27686C4-3AB5-4E0C-86CA-FB108C350AA9}" type="datetimeFigureOut">
               <a:rPr lang="en-US" dirty="0"/>
-              <a:t>11/1/2018</a:t>
+              <a:t>11/2/2018</a:t>
             </a:fld>
             <a:endParaRPr lang="en-US" dirty="0"/>
           </a:p>
@@ -3831,7 +4363,7 @@
           <a:p>
             <a:fld id="{49FF1211-4E0C-4AB3-B04F-585959BDAFE8}" type="datetimeFigureOut">
               <a:rPr lang="en-US" dirty="0"/>
-              <a:t>11/1/2018</a:t>
+              <a:t>11/2/2018</a:t>
             </a:fld>
             <a:endParaRPr lang="en-US" dirty="0"/>
           </a:p>
@@ -4010,7 +4542,7 @@
           <a:p>
             <a:fld id="{28BDECAF-D3BE-4069-9C78-642ECCD01477}" type="datetimeFigureOut">
               <a:rPr lang="en-US" dirty="0"/>
-              <a:t>11/1/2018</a:t>
+              <a:t>11/2/2018</a:t>
             </a:fld>
             <a:endParaRPr lang="en-US" dirty="0"/>
           </a:p>
@@ -4180,7 +4712,7 @@
           <a:p>
             <a:fld id="{8EFBDC27-E420-4878-9EE6-7B9656D6442A}" type="datetimeFigureOut">
               <a:rPr lang="en-US" dirty="0"/>
-              <a:t>11/1/2018</a:t>
+              <a:t>11/2/2018</a:t>
             </a:fld>
             <a:endParaRPr lang="en-US" dirty="0"/>
           </a:p>
@@ -4425,7 +4957,7 @@
           <a:p>
             <a:fld id="{0F7F47CF-67C9-420C-80A5-E2069FF0C2DF}" type="datetimeFigureOut">
               <a:rPr lang="en-US" dirty="0"/>
-              <a:t>11/1/2018</a:t>
+              <a:t>11/2/2018</a:t>
             </a:fld>
             <a:endParaRPr lang="en-US" dirty="0"/>
           </a:p>
@@ -4657,7 +5189,7 @@
           <a:p>
             <a:fld id="{AE22DC73-F065-42F5-A9F2-D90B2E42A0B3}" type="datetimeFigureOut">
               <a:rPr lang="en-US" dirty="0"/>
-              <a:t>11/1/2018</a:t>
+              <a:t>11/2/2018</a:t>
             </a:fld>
             <a:endParaRPr lang="en-US" dirty="0"/>
           </a:p>
@@ -5037,7 +5569,7 @@
           <a:p>
             <a:fld id="{76BEA702-9B29-41CC-9BCC-3DF8A0D379FE}" type="datetimeFigureOut">
               <a:rPr lang="en-US" dirty="0"/>
-              <a:t>11/1/2018</a:t>
+              <a:t>11/2/2018</a:t>
             </a:fld>
             <a:endParaRPr lang="en-US" dirty="0"/>
           </a:p>
@@ -5150,7 +5682,7 @@
           <a:p>
             <a:fld id="{097649AC-CB8F-4FF1-9A34-5861C74DD0A7}" type="datetimeFigureOut">
               <a:rPr lang="en-US" dirty="0"/>
-              <a:t>11/1/2018</a:t>
+              <a:t>11/2/2018</a:t>
             </a:fld>
             <a:endParaRPr lang="en-US" dirty="0"/>
           </a:p>
@@ -5240,7 +5772,7 @@
           <a:p>
             <a:fld id="{3EC5CECA-2D3A-4680-9B49-752200DE467C}" type="datetimeFigureOut">
               <a:rPr lang="en-US" dirty="0"/>
-              <a:t>11/1/2018</a:t>
+              <a:t>11/2/2018</a:t>
             </a:fld>
             <a:endParaRPr lang="en-US" dirty="0"/>
           </a:p>
@@ -5488,7 +6020,7 @@
           <a:p>
             <a:fld id="{50C3BFE2-83B7-4B0A-B9D3-AB28331082B3}" type="datetimeFigureOut">
               <a:rPr lang="en-US" dirty="0"/>
-              <a:t>11/1/2018</a:t>
+              <a:t>11/2/2018</a:t>
             </a:fld>
             <a:endParaRPr lang="en-US" dirty="0"/>
           </a:p>
@@ -5752,7 +6284,7 @@
           <a:p>
             <a:fld id="{12EF78E3-FDA3-4D28-AAA2-0B81F349A39D}" type="datetimeFigureOut">
               <a:rPr lang="en-US" dirty="0"/>
-              <a:t>11/1/2018</a:t>
+              <a:t>11/2/2018</a:t>
             </a:fld>
             <a:endParaRPr lang="en-US" dirty="0"/>
           </a:p>
@@ -6150,7 +6682,7 @@
           <a:p>
             <a:fld id="{C35BB1C6-BF8F-4481-8AB2-603A1C8A906A}" type="datetimeFigureOut">
               <a:rPr lang="en-US" dirty="0"/>
-              <a:t>11/1/2018</a:t>
+              <a:t>11/2/2018</a:t>
             </a:fld>
             <a:endParaRPr lang="en-US" dirty="0"/>
           </a:p>
@@ -6690,6 +7222,341 @@
 </p:sld>
 </file>
 
+<file path=ppt/slides/slide10.xml><?xml version="1.0" encoding="utf-8"?>
+<p:sld xmlns:a="http://schemas.openxmlformats.org/drawingml/2006/main" xmlns:r="http://schemas.openxmlformats.org/officeDocument/2006/relationships" xmlns:p="http://schemas.openxmlformats.org/presentationml/2006/main">
+  <p:cSld>
+    <p:spTree>
+      <p:nvGrpSpPr>
+        <p:cNvPr id="1" name=""/>
+        <p:cNvGrpSpPr/>
+        <p:nvPr/>
+      </p:nvGrpSpPr>
+      <p:grpSpPr>
+        <a:xfrm>
+          <a:off x="0" y="0"/>
+          <a:ext cx="0" cy="0"/>
+          <a:chOff x="0" y="0"/>
+          <a:chExt cx="0" cy="0"/>
+        </a:xfrm>
+      </p:grpSpPr>
+      <p:pic>
+        <p:nvPicPr>
+          <p:cNvPr id="8" name="Content Placeholder 7">
+            <a:extLst>
+              <a:ext uri="{FF2B5EF4-FFF2-40B4-BE49-F238E27FC236}">
+                <a16:creationId xmlns:a16="http://schemas.microsoft.com/office/drawing/2014/main" id="{92547338-9C24-4447-8FC1-F31843B42A1B}"/>
+              </a:ext>
+            </a:extLst>
+          </p:cNvPr>
+          <p:cNvPicPr>
+            <a:picLocks noGrp="1" noChangeAspect="1"/>
+          </p:cNvPicPr>
+          <p:nvPr>
+            <p:ph sz="quarter" idx="13"/>
+          </p:nvPr>
+        </p:nvPicPr>
+        <p:blipFill>
+          <a:blip r:embed="rId3"/>
+          <a:stretch>
+            <a:fillRect/>
+          </a:stretch>
+        </p:blipFill>
+        <p:spPr>
+          <a:xfrm>
+            <a:off x="0" y="1372857"/>
+            <a:ext cx="5736751" cy="3837165"/>
+          </a:xfrm>
+        </p:spPr>
+      </p:pic>
+      <p:pic>
+        <p:nvPicPr>
+          <p:cNvPr id="10" name="Content Placeholder 9" descr="A close up of a logo&#10;&#10;Description generated with very high confidence">
+            <a:extLst>
+              <a:ext uri="{FF2B5EF4-FFF2-40B4-BE49-F238E27FC236}">
+                <a16:creationId xmlns:a16="http://schemas.microsoft.com/office/drawing/2014/main" id="{4B10E6E2-1F8F-4777-857D-E7F0ABBDFA5A}"/>
+              </a:ext>
+            </a:extLst>
+          </p:cNvPr>
+          <p:cNvPicPr>
+            <a:picLocks noGrp="1" noChangeAspect="1"/>
+          </p:cNvPicPr>
+          <p:nvPr>
+            <p:ph sz="quarter" idx="14"/>
+          </p:nvPr>
+        </p:nvPicPr>
+        <p:blipFill>
+          <a:blip r:embed="rId4"/>
+          <a:stretch>
+            <a:fillRect/>
+          </a:stretch>
+        </p:blipFill>
+        <p:spPr>
+          <a:xfrm>
+            <a:off x="5736752" y="1455483"/>
+            <a:ext cx="6040280" cy="3837166"/>
+          </a:xfrm>
+        </p:spPr>
+      </p:pic>
+      <p:sp>
+        <p:nvSpPr>
+          <p:cNvPr id="11" name="Content Placeholder 3">
+            <a:extLst>
+              <a:ext uri="{FF2B5EF4-FFF2-40B4-BE49-F238E27FC236}">
+                <a16:creationId xmlns:a16="http://schemas.microsoft.com/office/drawing/2014/main" id="{B0839D5F-F9C2-4AC8-940C-29D896A5CC9A}"/>
+              </a:ext>
+            </a:extLst>
+          </p:cNvPr>
+          <p:cNvSpPr txBox="1">
+            <a:spLocks/>
+          </p:cNvSpPr>
+          <p:nvPr/>
+        </p:nvSpPr>
+        <p:spPr>
+          <a:xfrm>
+            <a:off x="231355" y="424910"/>
+            <a:ext cx="11435508" cy="1129955"/>
+          </a:xfrm>
+          <a:prstGeom prst="rect">
+            <a:avLst/>
+          </a:prstGeom>
+        </p:spPr>
+        <p:txBody>
+          <a:bodyPr vert="horz" lIns="91440" tIns="45720" rIns="91440" bIns="45720" rtlCol="0" anchor="t">
+            <a:normAutofit/>
+          </a:bodyPr>
+          <a:lstStyle>
+            <a:lvl1pPr marL="228600" indent="-228600" algn="l" defTabSz="914400" rtl="0" eaLnBrk="1" latinLnBrk="0" hangingPunct="1">
+              <a:lnSpc>
+                <a:spcPct val="120000"/>
+              </a:lnSpc>
+              <a:spcBef>
+                <a:spcPts val="1000"/>
+              </a:spcBef>
+              <a:buClr>
+                <a:schemeClr val="accent1"/>
+              </a:buClr>
+              <a:buSzPct val="160000"/>
+              <a:buFont typeface="Arial" panose="020B0604020202020204" pitchFamily="34" charset="0"/>
+              <a:buChar char="•"/>
+              <a:defRPr sz="2000" kern="1200" cap="all" baseline="0">
+                <a:solidFill>
+                  <a:schemeClr val="tx1"/>
+                </a:solidFill>
+                <a:effectLst/>
+                <a:latin typeface="+mn-lt"/>
+                <a:ea typeface="+mn-ea"/>
+                <a:cs typeface="+mn-cs"/>
+              </a:defRPr>
+            </a:lvl1pPr>
+            <a:lvl2pPr marL="685800" indent="-228600" algn="l" defTabSz="914400" rtl="0" eaLnBrk="1" latinLnBrk="0" hangingPunct="1">
+              <a:lnSpc>
+                <a:spcPct val="120000"/>
+              </a:lnSpc>
+              <a:spcBef>
+                <a:spcPts val="500"/>
+              </a:spcBef>
+              <a:buClr>
+                <a:schemeClr val="accent1"/>
+              </a:buClr>
+              <a:buSzPct val="160000"/>
+              <a:buFont typeface="Arial" panose="020B0604020202020204" pitchFamily="34" charset="0"/>
+              <a:buChar char="•"/>
+              <a:defRPr sz="1800" kern="1200" cap="all" baseline="0">
+                <a:solidFill>
+                  <a:schemeClr val="tx1"/>
+                </a:solidFill>
+                <a:effectLst/>
+                <a:latin typeface="+mn-lt"/>
+                <a:ea typeface="+mn-ea"/>
+                <a:cs typeface="+mn-cs"/>
+              </a:defRPr>
+            </a:lvl2pPr>
+            <a:lvl3pPr marL="1143000" indent="-228600" algn="l" defTabSz="914400" rtl="0" eaLnBrk="1" latinLnBrk="0" hangingPunct="1">
+              <a:lnSpc>
+                <a:spcPct val="120000"/>
+              </a:lnSpc>
+              <a:spcBef>
+                <a:spcPts val="500"/>
+              </a:spcBef>
+              <a:buClr>
+                <a:schemeClr val="accent1"/>
+              </a:buClr>
+              <a:buSzPct val="160000"/>
+              <a:buFont typeface="Arial" panose="020B0604020202020204" pitchFamily="34" charset="0"/>
+              <a:buChar char="•"/>
+              <a:defRPr sz="1600" kern="1200" cap="all" baseline="0">
+                <a:solidFill>
+                  <a:schemeClr val="tx1"/>
+                </a:solidFill>
+                <a:effectLst/>
+                <a:latin typeface="+mn-lt"/>
+                <a:ea typeface="+mn-ea"/>
+                <a:cs typeface="+mn-cs"/>
+              </a:defRPr>
+            </a:lvl3pPr>
+            <a:lvl4pPr marL="1600200" indent="-228600" algn="l" defTabSz="914400" rtl="0" eaLnBrk="1" latinLnBrk="0" hangingPunct="1">
+              <a:lnSpc>
+                <a:spcPct val="120000"/>
+              </a:lnSpc>
+              <a:spcBef>
+                <a:spcPts val="500"/>
+              </a:spcBef>
+              <a:buClr>
+                <a:schemeClr val="accent1"/>
+              </a:buClr>
+              <a:buSzPct val="160000"/>
+              <a:buFont typeface="Arial" panose="020B0604020202020204" pitchFamily="34" charset="0"/>
+              <a:buChar char="•"/>
+              <a:defRPr sz="1400" kern="1200" cap="all" baseline="0">
+                <a:solidFill>
+                  <a:schemeClr val="tx1"/>
+                </a:solidFill>
+                <a:effectLst/>
+                <a:latin typeface="+mn-lt"/>
+                <a:ea typeface="+mn-ea"/>
+                <a:cs typeface="+mn-cs"/>
+              </a:defRPr>
+            </a:lvl4pPr>
+            <a:lvl5pPr marL="2057400" indent="-228600" algn="l" defTabSz="914400" rtl="0" eaLnBrk="1" latinLnBrk="0" hangingPunct="1">
+              <a:lnSpc>
+                <a:spcPct val="120000"/>
+              </a:lnSpc>
+              <a:spcBef>
+                <a:spcPts val="500"/>
+              </a:spcBef>
+              <a:buClr>
+                <a:schemeClr val="accent1"/>
+              </a:buClr>
+              <a:buSzPct val="160000"/>
+              <a:buFont typeface="Arial" panose="020B0604020202020204" pitchFamily="34" charset="0"/>
+              <a:buChar char="•"/>
+              <a:defRPr sz="1400" kern="1200" cap="all" baseline="0">
+                <a:solidFill>
+                  <a:schemeClr val="tx1"/>
+                </a:solidFill>
+                <a:effectLst/>
+                <a:latin typeface="+mn-lt"/>
+                <a:ea typeface="+mn-ea"/>
+                <a:cs typeface="+mn-cs"/>
+              </a:defRPr>
+            </a:lvl5pPr>
+            <a:lvl6pPr marL="2514600" indent="-228600" algn="l" defTabSz="914400" rtl="0" eaLnBrk="1" latinLnBrk="0" hangingPunct="1">
+              <a:lnSpc>
+                <a:spcPct val="120000"/>
+              </a:lnSpc>
+              <a:spcBef>
+                <a:spcPts val="500"/>
+              </a:spcBef>
+              <a:buClr>
+                <a:schemeClr val="accent1"/>
+              </a:buClr>
+              <a:buSzPct val="160000"/>
+              <a:buFont typeface="Arial" panose="020B0604020202020204" pitchFamily="34" charset="0"/>
+              <a:buChar char="•"/>
+              <a:defRPr sz="1400" kern="1200" cap="all" baseline="0">
+                <a:solidFill>
+                  <a:schemeClr val="tx1"/>
+                </a:solidFill>
+                <a:effectLst/>
+                <a:latin typeface="+mn-lt"/>
+                <a:ea typeface="+mn-ea"/>
+                <a:cs typeface="+mn-cs"/>
+              </a:defRPr>
+            </a:lvl6pPr>
+            <a:lvl7pPr marL="2971800" indent="-228600" algn="l" defTabSz="914400" rtl="0" eaLnBrk="1" latinLnBrk="0" hangingPunct="1">
+              <a:lnSpc>
+                <a:spcPct val="120000"/>
+              </a:lnSpc>
+              <a:spcBef>
+                <a:spcPts val="500"/>
+              </a:spcBef>
+              <a:buClr>
+                <a:schemeClr val="accent1"/>
+              </a:buClr>
+              <a:buSzPct val="160000"/>
+              <a:buFont typeface="Arial" panose="020B0604020202020204" pitchFamily="34" charset="0"/>
+              <a:buChar char="•"/>
+              <a:defRPr sz="1400" kern="1200" cap="all" baseline="0">
+                <a:solidFill>
+                  <a:schemeClr val="tx1"/>
+                </a:solidFill>
+                <a:effectLst/>
+                <a:latin typeface="+mn-lt"/>
+                <a:ea typeface="+mn-ea"/>
+                <a:cs typeface="+mn-cs"/>
+              </a:defRPr>
+            </a:lvl7pPr>
+            <a:lvl8pPr marL="3429000" indent="-228600" algn="l" defTabSz="914400" rtl="0" eaLnBrk="1" latinLnBrk="0" hangingPunct="1">
+              <a:lnSpc>
+                <a:spcPct val="120000"/>
+              </a:lnSpc>
+              <a:spcBef>
+                <a:spcPts val="500"/>
+              </a:spcBef>
+              <a:buClr>
+                <a:schemeClr val="accent1"/>
+              </a:buClr>
+              <a:buSzPct val="160000"/>
+              <a:buFont typeface="Arial" panose="020B0604020202020204" pitchFamily="34" charset="0"/>
+              <a:buChar char="•"/>
+              <a:defRPr sz="1400" kern="1200" cap="all" baseline="0">
+                <a:solidFill>
+                  <a:schemeClr val="tx1"/>
+                </a:solidFill>
+                <a:effectLst/>
+                <a:latin typeface="+mn-lt"/>
+                <a:ea typeface="+mn-ea"/>
+                <a:cs typeface="+mn-cs"/>
+              </a:defRPr>
+            </a:lvl8pPr>
+            <a:lvl9pPr marL="3886200" indent="-228600" algn="l" defTabSz="914400" rtl="0" eaLnBrk="1" latinLnBrk="0" hangingPunct="1">
+              <a:lnSpc>
+                <a:spcPct val="120000"/>
+              </a:lnSpc>
+              <a:spcBef>
+                <a:spcPts val="500"/>
+              </a:spcBef>
+              <a:buClr>
+                <a:schemeClr val="accent1"/>
+              </a:buClr>
+              <a:buSzPct val="160000"/>
+              <a:buFont typeface="Arial" panose="020B0604020202020204" pitchFamily="34" charset="0"/>
+              <a:buChar char="•"/>
+              <a:defRPr sz="1400" kern="1200" cap="all" baseline="0">
+                <a:solidFill>
+                  <a:schemeClr val="tx1"/>
+                </a:solidFill>
+                <a:effectLst/>
+                <a:latin typeface="+mn-lt"/>
+                <a:ea typeface="+mn-ea"/>
+                <a:cs typeface="+mn-cs"/>
+              </a:defRPr>
+            </a:lvl9pPr>
+          </a:lstStyle>
+          <a:p>
+            <a:pPr marL="0" indent="0">
+              <a:buNone/>
+            </a:pPr>
+            <a:r>
+              <a:rPr lang="en-US" sz="2400" dirty="0"/>
+              <a:t>Generally the genres with the fewest Number of voters had the Higher IMDB Average.</a:t>
+            </a:r>
+          </a:p>
+        </p:txBody>
+      </p:sp>
+    </p:spTree>
+    <p:extLst>
+      <p:ext uri="{BB962C8B-B14F-4D97-AF65-F5344CB8AC3E}">
+        <p14:creationId xmlns:p14="http://schemas.microsoft.com/office/powerpoint/2010/main" val="264985083"/>
+      </p:ext>
+    </p:extLst>
+  </p:cSld>
+  <p:clrMapOvr>
+    <a:masterClrMapping/>
+  </p:clrMapOvr>
+</p:sld>
+</file>
+
 <file path=ppt/slides/slide2.xml><?xml version="1.0" encoding="utf-8"?>
 <p:sld xmlns:a="http://schemas.openxmlformats.org/drawingml/2006/main" xmlns:r="http://schemas.openxmlformats.org/officeDocument/2006/relationships" xmlns:p="http://schemas.openxmlformats.org/presentationml/2006/main">
   <p:cSld>
@@ -6789,6 +7656,97 @@
   <p:clrMapOvr>
     <a:masterClrMapping/>
   </p:clrMapOvr>
+  <p:timing>
+    <p:tnLst>
+      <p:par>
+        <p:cTn id="1" dur="indefinite" restart="never" nodeType="tmRoot">
+          <p:childTnLst>
+            <p:seq concurrent="1" nextAc="seek">
+              <p:cTn id="2" dur="indefinite" nodeType="mainSeq">
+                <p:childTnLst>
+                  <p:par>
+                    <p:cTn id="3" fill="hold">
+                      <p:stCondLst>
+                        <p:cond delay="indefinite"/>
+                      </p:stCondLst>
+                      <p:childTnLst>
+                        <p:par>
+                          <p:cTn id="4" fill="hold">
+                            <p:stCondLst>
+                              <p:cond delay="0"/>
+                            </p:stCondLst>
+                            <p:childTnLst>
+                              <p:par>
+                                <p:cTn id="5" presetID="10" presetClass="entr" presetSubtype="0" fill="hold" nodeType="clickEffect">
+                                  <p:stCondLst>
+                                    <p:cond delay="0"/>
+                                  </p:stCondLst>
+                                  <p:childTnLst>
+                                    <p:set>
+                                      <p:cBhvr>
+                                        <p:cTn id="6" dur="1" fill="hold">
+                                          <p:stCondLst>
+                                            <p:cond delay="0"/>
+                                          </p:stCondLst>
+                                        </p:cTn>
+                                        <p:tgtEl>
+                                          <p:spTgt spid="3">
+                                            <p:txEl>
+                                              <p:pRg st="1" end="1"/>
+                                            </p:txEl>
+                                          </p:spTgt>
+                                        </p:tgtEl>
+                                        <p:attrNameLst>
+                                          <p:attrName>style.visibility</p:attrName>
+                                        </p:attrNameLst>
+                                      </p:cBhvr>
+                                      <p:to>
+                                        <p:strVal val="visible"/>
+                                      </p:to>
+                                    </p:set>
+                                    <p:animEffect transition="in" filter="fade">
+                                      <p:cBhvr>
+                                        <p:cTn id="7" dur="500"/>
+                                        <p:tgtEl>
+                                          <p:spTgt spid="3">
+                                            <p:txEl>
+                                              <p:pRg st="1" end="1"/>
+                                            </p:txEl>
+                                          </p:spTgt>
+                                        </p:tgtEl>
+                                      </p:cBhvr>
+                                    </p:animEffect>
+                                  </p:childTnLst>
+                                </p:cTn>
+                              </p:par>
+                            </p:childTnLst>
+                          </p:cTn>
+                        </p:par>
+                      </p:childTnLst>
+                    </p:cTn>
+                  </p:par>
+                </p:childTnLst>
+              </p:cTn>
+              <p:prevCondLst>
+                <p:cond evt="onPrev" delay="0">
+                  <p:tgtEl>
+                    <p:sldTgt/>
+                  </p:tgtEl>
+                </p:cond>
+              </p:prevCondLst>
+              <p:nextCondLst>
+                <p:cond evt="onNext" delay="0">
+                  <p:tgtEl>
+                    <p:sldTgt/>
+                  </p:tgtEl>
+                </p:cond>
+              </p:nextCondLst>
+            </p:seq>
+          </p:childTnLst>
+        </p:cTn>
+      </p:par>
+    </p:tnLst>
+  </p:timing>
 </p:sld>
 </file>
 
@@ -6863,7 +7821,7 @@
             </a:pPr>
             <a:r>
               <a:rPr lang="en-US" dirty="0"/>
-              <a:t>What effects a film’s gross revenue?</a:t>
+              <a:t>What Actually effects a film’s gross revenue?</a:t>
             </a:r>
           </a:p>
           <a:p>
@@ -7215,7 +8173,12 @@
             <p:ph type="title"/>
           </p:nvPr>
         </p:nvSpPr>
-        <p:spPr/>
+        <p:spPr>
+          <a:xfrm>
+            <a:off x="685801" y="685800"/>
+            <a:ext cx="4855683" cy="1158140"/>
+          </a:xfrm>
+        </p:spPr>
         <p:txBody>
           <a:bodyPr/>
           <a:lstStyle/>
@@ -7245,14 +8208,19 @@
         </p:nvSpPr>
         <p:spPr>
           <a:xfrm>
-            <a:off x="685800" y="2063397"/>
-            <a:ext cx="5088714" cy="1435178"/>
+            <a:off x="685801" y="1950592"/>
+            <a:ext cx="4646364" cy="1660304"/>
           </a:xfrm>
         </p:spPr>
         <p:txBody>
-          <a:bodyPr/>
+          <a:bodyPr>
+            <a:normAutofit/>
+          </a:bodyPr>
           <a:lstStyle/>
           <a:p>
+            <a:pPr marL="0" indent="0">
+              <a:buNone/>
+            </a:pPr>
             <a:r>
               <a:rPr lang="en-US" dirty="0"/>
               <a:t>Does a Movie’s IMDB Score, a number driven by your average, everyday moviegoer, trend with the Gross Revenue?</a:t>
@@ -7260,28 +8228,277 @@
           </a:p>
         </p:txBody>
       </p:sp>
-      <p:sp>
-        <p:nvSpPr>
-          <p:cNvPr id="4" name="Content Placeholder 3">
+      <p:pic>
+        <p:nvPicPr>
+          <p:cNvPr id="6" name="Content Placeholder 5">
             <a:extLst>
               <a:ext uri="{FF2B5EF4-FFF2-40B4-BE49-F238E27FC236}">
-                <a16:creationId xmlns:a16="http://schemas.microsoft.com/office/drawing/2014/main" id="{F68C430E-97DE-4D5E-81B3-579C6C5D4D19}"/>
+                <a16:creationId xmlns:a16="http://schemas.microsoft.com/office/drawing/2014/main" id="{BDCA271D-3F5B-41A7-990D-D51FD9AC1BF3}"/>
               </a:ext>
             </a:extLst>
           </p:cNvPr>
-          <p:cNvSpPr>
-            <a:spLocks noGrp="1"/>
-          </p:cNvSpPr>
+          <p:cNvPicPr>
+            <a:picLocks noGrp="1" noChangeAspect="1"/>
+          </p:cNvPicPr>
           <p:nvPr>
             <p:ph sz="quarter" idx="14"/>
           </p:nvPr>
-        </p:nvSpPr>
-        <p:spPr/>
-        <p:txBody>
-          <a:bodyPr/>
-          <a:lstStyle/>
-          <a:p>
-            <a:endParaRPr lang="en-US"/>
+        </p:nvPicPr>
+        <p:blipFill>
+          <a:blip r:embed="rId3"/>
+          <a:stretch>
+            <a:fillRect/>
+          </a:stretch>
+        </p:blipFill>
+        <p:spPr>
+          <a:xfrm>
+            <a:off x="5130157" y="717717"/>
+            <a:ext cx="6520835" cy="4660135"/>
+          </a:xfrm>
+        </p:spPr>
+      </p:pic>
+      <p:sp>
+        <p:nvSpPr>
+          <p:cNvPr id="7" name="Content Placeholder 2">
+            <a:extLst>
+              <a:ext uri="{FF2B5EF4-FFF2-40B4-BE49-F238E27FC236}">
+                <a16:creationId xmlns:a16="http://schemas.microsoft.com/office/drawing/2014/main" id="{0C93A34A-63CD-4E15-A190-BFF73B57538A}"/>
+              </a:ext>
+            </a:extLst>
+          </p:cNvPr>
+          <p:cNvSpPr txBox="1">
+            <a:spLocks/>
+          </p:cNvSpPr>
+          <p:nvPr/>
+        </p:nvSpPr>
+        <p:spPr>
+          <a:xfrm>
+            <a:off x="584797" y="3610896"/>
+            <a:ext cx="4646364" cy="1660304"/>
+          </a:xfrm>
+          <a:prstGeom prst="rect">
+            <a:avLst/>
+          </a:prstGeom>
+        </p:spPr>
+        <p:txBody>
+          <a:bodyPr vert="horz" lIns="91440" tIns="45720" rIns="91440" bIns="45720" rtlCol="0" anchor="t">
+            <a:normAutofit/>
+          </a:bodyPr>
+          <a:lstStyle>
+            <a:lvl1pPr marL="228600" indent="-228600" algn="l" defTabSz="914400" rtl="0" eaLnBrk="1" latinLnBrk="0" hangingPunct="1">
+              <a:lnSpc>
+                <a:spcPct val="120000"/>
+              </a:lnSpc>
+              <a:spcBef>
+                <a:spcPts val="1000"/>
+              </a:spcBef>
+              <a:buClr>
+                <a:schemeClr val="accent1"/>
+              </a:buClr>
+              <a:buSzPct val="160000"/>
+              <a:buFont typeface="Arial" panose="020B0604020202020204" pitchFamily="34" charset="0"/>
+              <a:buChar char="•"/>
+              <a:defRPr sz="2000" kern="1200" cap="all" baseline="0">
+                <a:solidFill>
+                  <a:schemeClr val="tx1"/>
+                </a:solidFill>
+                <a:effectLst/>
+                <a:latin typeface="+mn-lt"/>
+                <a:ea typeface="+mn-ea"/>
+                <a:cs typeface="+mn-cs"/>
+              </a:defRPr>
+            </a:lvl1pPr>
+            <a:lvl2pPr marL="685800" indent="-228600" algn="l" defTabSz="914400" rtl="0" eaLnBrk="1" latinLnBrk="0" hangingPunct="1">
+              <a:lnSpc>
+                <a:spcPct val="120000"/>
+              </a:lnSpc>
+              <a:spcBef>
+                <a:spcPts val="500"/>
+              </a:spcBef>
+              <a:buClr>
+                <a:schemeClr val="accent1"/>
+              </a:buClr>
+              <a:buSzPct val="160000"/>
+              <a:buFont typeface="Arial" panose="020B0604020202020204" pitchFamily="34" charset="0"/>
+              <a:buChar char="•"/>
+              <a:defRPr sz="1800" kern="1200" cap="all" baseline="0">
+                <a:solidFill>
+                  <a:schemeClr val="tx1"/>
+                </a:solidFill>
+                <a:effectLst/>
+                <a:latin typeface="+mn-lt"/>
+                <a:ea typeface="+mn-ea"/>
+                <a:cs typeface="+mn-cs"/>
+              </a:defRPr>
+            </a:lvl2pPr>
+            <a:lvl3pPr marL="1143000" indent="-228600" algn="l" defTabSz="914400" rtl="0" eaLnBrk="1" latinLnBrk="0" hangingPunct="1">
+              <a:lnSpc>
+                <a:spcPct val="120000"/>
+              </a:lnSpc>
+              <a:spcBef>
+                <a:spcPts val="500"/>
+              </a:spcBef>
+              <a:buClr>
+                <a:schemeClr val="accent1"/>
+              </a:buClr>
+              <a:buSzPct val="160000"/>
+              <a:buFont typeface="Arial" panose="020B0604020202020204" pitchFamily="34" charset="0"/>
+              <a:buChar char="•"/>
+              <a:defRPr sz="1600" kern="1200" cap="all" baseline="0">
+                <a:solidFill>
+                  <a:schemeClr val="tx1"/>
+                </a:solidFill>
+                <a:effectLst/>
+                <a:latin typeface="+mn-lt"/>
+                <a:ea typeface="+mn-ea"/>
+                <a:cs typeface="+mn-cs"/>
+              </a:defRPr>
+            </a:lvl3pPr>
+            <a:lvl4pPr marL="1600200" indent="-228600" algn="l" defTabSz="914400" rtl="0" eaLnBrk="1" latinLnBrk="0" hangingPunct="1">
+              <a:lnSpc>
+                <a:spcPct val="120000"/>
+              </a:lnSpc>
+              <a:spcBef>
+                <a:spcPts val="500"/>
+              </a:spcBef>
+              <a:buClr>
+                <a:schemeClr val="accent1"/>
+              </a:buClr>
+              <a:buSzPct val="160000"/>
+              <a:buFont typeface="Arial" panose="020B0604020202020204" pitchFamily="34" charset="0"/>
+              <a:buChar char="•"/>
+              <a:defRPr sz="1400" kern="1200" cap="all" baseline="0">
+                <a:solidFill>
+                  <a:schemeClr val="tx1"/>
+                </a:solidFill>
+                <a:effectLst/>
+                <a:latin typeface="+mn-lt"/>
+                <a:ea typeface="+mn-ea"/>
+                <a:cs typeface="+mn-cs"/>
+              </a:defRPr>
+            </a:lvl4pPr>
+            <a:lvl5pPr marL="2057400" indent="-228600" algn="l" defTabSz="914400" rtl="0" eaLnBrk="1" latinLnBrk="0" hangingPunct="1">
+              <a:lnSpc>
+                <a:spcPct val="120000"/>
+              </a:lnSpc>
+              <a:spcBef>
+                <a:spcPts val="500"/>
+              </a:spcBef>
+              <a:buClr>
+                <a:schemeClr val="accent1"/>
+              </a:buClr>
+              <a:buSzPct val="160000"/>
+              <a:buFont typeface="Arial" panose="020B0604020202020204" pitchFamily="34" charset="0"/>
+              <a:buChar char="•"/>
+              <a:defRPr sz="1400" kern="1200" cap="all" baseline="0">
+                <a:solidFill>
+                  <a:schemeClr val="tx1"/>
+                </a:solidFill>
+                <a:effectLst/>
+                <a:latin typeface="+mn-lt"/>
+                <a:ea typeface="+mn-ea"/>
+                <a:cs typeface="+mn-cs"/>
+              </a:defRPr>
+            </a:lvl5pPr>
+            <a:lvl6pPr marL="2514600" indent="-228600" algn="l" defTabSz="914400" rtl="0" eaLnBrk="1" latinLnBrk="0" hangingPunct="1">
+              <a:lnSpc>
+                <a:spcPct val="120000"/>
+              </a:lnSpc>
+              <a:spcBef>
+                <a:spcPts val="500"/>
+              </a:spcBef>
+              <a:buClr>
+                <a:schemeClr val="accent1"/>
+              </a:buClr>
+              <a:buSzPct val="160000"/>
+              <a:buFont typeface="Arial" panose="020B0604020202020204" pitchFamily="34" charset="0"/>
+              <a:buChar char="•"/>
+              <a:defRPr sz="1400" kern="1200" cap="all" baseline="0">
+                <a:solidFill>
+                  <a:schemeClr val="tx1"/>
+                </a:solidFill>
+                <a:effectLst/>
+                <a:latin typeface="+mn-lt"/>
+                <a:ea typeface="+mn-ea"/>
+                <a:cs typeface="+mn-cs"/>
+              </a:defRPr>
+            </a:lvl6pPr>
+            <a:lvl7pPr marL="2971800" indent="-228600" algn="l" defTabSz="914400" rtl="0" eaLnBrk="1" latinLnBrk="0" hangingPunct="1">
+              <a:lnSpc>
+                <a:spcPct val="120000"/>
+              </a:lnSpc>
+              <a:spcBef>
+                <a:spcPts val="500"/>
+              </a:spcBef>
+              <a:buClr>
+                <a:schemeClr val="accent1"/>
+              </a:buClr>
+              <a:buSzPct val="160000"/>
+              <a:buFont typeface="Arial" panose="020B0604020202020204" pitchFamily="34" charset="0"/>
+              <a:buChar char="•"/>
+              <a:defRPr sz="1400" kern="1200" cap="all" baseline="0">
+                <a:solidFill>
+                  <a:schemeClr val="tx1"/>
+                </a:solidFill>
+                <a:effectLst/>
+                <a:latin typeface="+mn-lt"/>
+                <a:ea typeface="+mn-ea"/>
+                <a:cs typeface="+mn-cs"/>
+              </a:defRPr>
+            </a:lvl7pPr>
+            <a:lvl8pPr marL="3429000" indent="-228600" algn="l" defTabSz="914400" rtl="0" eaLnBrk="1" latinLnBrk="0" hangingPunct="1">
+              <a:lnSpc>
+                <a:spcPct val="120000"/>
+              </a:lnSpc>
+              <a:spcBef>
+                <a:spcPts val="500"/>
+              </a:spcBef>
+              <a:buClr>
+                <a:schemeClr val="accent1"/>
+              </a:buClr>
+              <a:buSzPct val="160000"/>
+              <a:buFont typeface="Arial" panose="020B0604020202020204" pitchFamily="34" charset="0"/>
+              <a:buChar char="•"/>
+              <a:defRPr sz="1400" kern="1200" cap="all" baseline="0">
+                <a:solidFill>
+                  <a:schemeClr val="tx1"/>
+                </a:solidFill>
+                <a:effectLst/>
+                <a:latin typeface="+mn-lt"/>
+                <a:ea typeface="+mn-ea"/>
+                <a:cs typeface="+mn-cs"/>
+              </a:defRPr>
+            </a:lvl8pPr>
+            <a:lvl9pPr marL="3886200" indent="-228600" algn="l" defTabSz="914400" rtl="0" eaLnBrk="1" latinLnBrk="0" hangingPunct="1">
+              <a:lnSpc>
+                <a:spcPct val="120000"/>
+              </a:lnSpc>
+              <a:spcBef>
+                <a:spcPts val="500"/>
+              </a:spcBef>
+              <a:buClr>
+                <a:schemeClr val="accent1"/>
+              </a:buClr>
+              <a:buSzPct val="160000"/>
+              <a:buFont typeface="Arial" panose="020B0604020202020204" pitchFamily="34" charset="0"/>
+              <a:buChar char="•"/>
+              <a:defRPr sz="1400" kern="1200" cap="all" baseline="0">
+                <a:solidFill>
+                  <a:schemeClr val="tx1"/>
+                </a:solidFill>
+                <a:effectLst/>
+                <a:latin typeface="+mn-lt"/>
+                <a:ea typeface="+mn-ea"/>
+                <a:cs typeface="+mn-cs"/>
+              </a:defRPr>
+            </a:lvl9pPr>
+          </a:lstStyle>
+          <a:p>
+            <a:pPr marL="0" indent="0">
+              <a:buFont typeface="Arial" panose="020B0604020202020204" pitchFamily="34" charset="0"/>
+              <a:buNone/>
+            </a:pPr>
+            <a:endParaRPr lang="en-US" dirty="0"/>
           </a:p>
         </p:txBody>
       </p:sp>
@@ -7352,6 +8569,105 @@
                       </p:childTnLst>
                     </p:cTn>
                   </p:par>
+                  <p:par>
+                    <p:cTn id="7" fill="hold">
+                      <p:stCondLst>
+                        <p:cond delay="indefinite"/>
+                      </p:stCondLst>
+                      <p:childTnLst>
+                        <p:par>
+                          <p:cTn id="8" fill="hold">
+                            <p:stCondLst>
+                              <p:cond delay="0"/>
+                            </p:stCondLst>
+                            <p:childTnLst>
+                              <p:par>
+                                <p:cTn id="9" presetID="1" presetClass="entr" presetSubtype="0" fill="hold" nodeType="clickEffect">
+                                  <p:stCondLst>
+                                    <p:cond delay="0"/>
+                                  </p:stCondLst>
+                                  <p:childTnLst>
+                                    <p:set>
+                                      <p:cBhvr>
+                                        <p:cTn id="10" dur="1" fill="hold">
+                                          <p:stCondLst>
+                                            <p:cond delay="0"/>
+                                          </p:stCondLst>
+                                        </p:cTn>
+                                        <p:tgtEl>
+                                          <p:spTgt spid="6"/>
+                                        </p:tgtEl>
+                                        <p:attrNameLst>
+                                          <p:attrName>style.visibility</p:attrName>
+                                        </p:attrNameLst>
+                                      </p:cBhvr>
+                                      <p:to>
+                                        <p:strVal val="visible"/>
+                                      </p:to>
+                                    </p:set>
+                                  </p:childTnLst>
+                                </p:cTn>
+                              </p:par>
+                            </p:childTnLst>
+                          </p:cTn>
+                        </p:par>
+                      </p:childTnLst>
+                    </p:cTn>
+                  </p:par>
+                  <p:par>
+                    <p:cTn id="11" fill="hold">
+                      <p:stCondLst>
+                        <p:cond delay="indefinite"/>
+                      </p:stCondLst>
+                      <p:childTnLst>
+                        <p:par>
+                          <p:cTn id="12" fill="hold">
+                            <p:stCondLst>
+                              <p:cond delay="0"/>
+                            </p:stCondLst>
+                            <p:childTnLst>
+                              <p:par>
+                                <p:cTn id="13" presetID="1" presetClass="entr" presetSubtype="0" fill="hold" grpId="0" nodeType="clickEffect" nodePh="1">
+                                  <p:stCondLst>
+                                    <p:cond delay="0"/>
+                                  </p:stCondLst>
+                                  <p:endCondLst>
+                                    <p:cond evt="begin" delay="0">
+                                      <p:tn val="13"/>
+                                    </p:cond>
+                                  </p:endCondLst>
+                                  <p:childTnLst>
+                                    <p:set>
+                                      <p:cBhvr>
+                                        <p:cTn id="14" dur="1" fill="hold">
+                                          <p:stCondLst>
+                                            <p:cond delay="0"/>
+                                          </p:stCondLst>
+                                        </p:cTn>
+                                        <p:tgtEl>
+                                          <p:spTgt spid="7">
+                                            <p:txEl>
+                                              <p:pRg st="0" end="0"/>
+                                            </p:txEl>
+                                          </p:spTgt>
+                                        </p:tgtEl>
+                                        <p:attrNameLst>
+                                          <p:attrName>style.visibility</p:attrName>
+                                        </p:attrNameLst>
+                                      </p:cBhvr>
+                                      <p:to>
+                                        <p:strVal val="visible"/>
+                                      </p:to>
+                                    </p:set>
+                                  </p:childTnLst>
+                                </p:cTn>
+                              </p:par>
+                            </p:childTnLst>
+                          </p:cTn>
+                        </p:par>
+                      </p:childTnLst>
+                    </p:cTn>
+                  </p:par>
                 </p:childTnLst>
               </p:cTn>
               <p:prevCondLst>
@@ -7375,6 +8691,7 @@
     </p:tnLst>
     <p:bldLst>
       <p:bldP spid="3" grpId="0" build="p"/>
+      <p:bldP spid="7" grpId="0" build="p"/>
     </p:bldLst>
   </p:timing>
 </p:sld>
@@ -7413,11 +8730,17 @@
             <p:ph type="title"/>
           </p:nvPr>
         </p:nvSpPr>
-        <p:spPr/>
+        <p:spPr>
+          <a:xfrm>
+            <a:off x="6095999" y="685800"/>
+            <a:ext cx="4986683" cy="1158140"/>
+          </a:xfrm>
+        </p:spPr>
         <p:txBody>
           <a:bodyPr/>
           <a:lstStyle/>
           <a:p>
+            <a:pPr algn="r"/>
             <a:r>
               <a:rPr lang="en-US" dirty="0"/>
               <a:t>MPAA Rating</a:t>
@@ -7425,31 +8748,35 @@
           </a:p>
         </p:txBody>
       </p:sp>
-      <p:sp>
-        <p:nvSpPr>
-          <p:cNvPr id="3" name="Content Placeholder 2">
+      <p:pic>
+        <p:nvPicPr>
+          <p:cNvPr id="6" name="Content Placeholder 5" descr="A screenshot of a cell phone&#10;&#10;Description generated with very high confidence">
             <a:extLst>
               <a:ext uri="{FF2B5EF4-FFF2-40B4-BE49-F238E27FC236}">
-                <a16:creationId xmlns:a16="http://schemas.microsoft.com/office/drawing/2014/main" id="{3F9DE4F3-5929-44EF-88AE-494375FED6F6}"/>
+                <a16:creationId xmlns:a16="http://schemas.microsoft.com/office/drawing/2014/main" id="{C226757D-1BA7-458A-99DF-F62E7D32361E}"/>
               </a:ext>
             </a:extLst>
           </p:cNvPr>
-          <p:cNvSpPr>
-            <a:spLocks noGrp="1"/>
-          </p:cNvSpPr>
+          <p:cNvPicPr>
+            <a:picLocks noGrp="1" noChangeAspect="1"/>
+          </p:cNvPicPr>
           <p:nvPr>
             <p:ph sz="quarter" idx="13"/>
           </p:nvPr>
-        </p:nvSpPr>
-        <p:spPr/>
-        <p:txBody>
-          <a:bodyPr/>
-          <a:lstStyle/>
-          <a:p>
-            <a:endParaRPr lang="en-US"/>
-          </a:p>
-        </p:txBody>
-      </p:sp>
+        </p:nvPicPr>
+        <p:blipFill>
+          <a:blip r:embed="rId3"/>
+          <a:stretch>
+            <a:fillRect/>
+          </a:stretch>
+        </p:blipFill>
+        <p:spPr>
+          <a:xfrm>
+            <a:off x="118256" y="594911"/>
+            <a:ext cx="5925523" cy="4881649"/>
+          </a:xfrm>
+        </p:spPr>
+      </p:pic>
       <p:sp>
         <p:nvSpPr>
           <p:cNvPr id="4" name="Content Placeholder 3">
@@ -7466,24 +8793,558 @@
             <p:ph sz="quarter" idx="14"/>
           </p:nvPr>
         </p:nvSpPr>
-        <p:spPr/>
-        <p:txBody>
-          <a:bodyPr/>
+        <p:spPr>
+          <a:xfrm>
+            <a:off x="6095712" y="3331937"/>
+            <a:ext cx="5086538" cy="689220"/>
+          </a:xfrm>
+        </p:spPr>
+        <p:txBody>
+          <a:bodyPr>
+            <a:normAutofit/>
+          </a:bodyPr>
           <a:lstStyle/>
           <a:p>
+            <a:pPr marL="0" indent="0" algn="r">
+              <a:buNone/>
+            </a:pPr>
             <a:r>
               <a:rPr lang="en-US" dirty="0"/>
-              <a:t>Does the movie’s MPAA Rating effect gross Revenue? </a:t>
-            </a:r>
-          </a:p>
-          <a:p>
+              <a:t>Absolutely.</a:t>
+            </a:r>
+          </a:p>
+          <a:p>
+            <a:pPr marL="0" indent="0" algn="r">
+              <a:buNone/>
+            </a:pPr>
+            <a:endParaRPr lang="en-US" dirty="0"/>
+          </a:p>
+        </p:txBody>
+      </p:sp>
+      <p:sp>
+        <p:nvSpPr>
+          <p:cNvPr id="7" name="Content Placeholder 3">
+            <a:extLst>
+              <a:ext uri="{FF2B5EF4-FFF2-40B4-BE49-F238E27FC236}">
+                <a16:creationId xmlns:a16="http://schemas.microsoft.com/office/drawing/2014/main" id="{9E47DB04-22E5-4CFB-9C01-419E3AB44220}"/>
+              </a:ext>
+            </a:extLst>
+          </p:cNvPr>
+          <p:cNvSpPr txBox="1">
+            <a:spLocks/>
+          </p:cNvSpPr>
+          <p:nvPr/>
+        </p:nvSpPr>
+        <p:spPr>
+          <a:xfrm>
+            <a:off x="6146371" y="2215797"/>
+            <a:ext cx="5086538" cy="933192"/>
+          </a:xfrm>
+          <a:prstGeom prst="rect">
+            <a:avLst/>
+          </a:prstGeom>
+        </p:spPr>
+        <p:txBody>
+          <a:bodyPr vert="horz" lIns="91440" tIns="45720" rIns="91440" bIns="45720" rtlCol="0" anchor="t">
+            <a:normAutofit/>
+          </a:bodyPr>
+          <a:lstStyle>
+            <a:lvl1pPr marL="228600" indent="-228600" algn="l" defTabSz="914400" rtl="0" eaLnBrk="1" latinLnBrk="0" hangingPunct="1">
+              <a:lnSpc>
+                <a:spcPct val="120000"/>
+              </a:lnSpc>
+              <a:spcBef>
+                <a:spcPts val="1000"/>
+              </a:spcBef>
+              <a:buClr>
+                <a:schemeClr val="accent1"/>
+              </a:buClr>
+              <a:buSzPct val="160000"/>
+              <a:buFont typeface="Arial" panose="020B0604020202020204" pitchFamily="34" charset="0"/>
+              <a:buChar char="•"/>
+              <a:defRPr sz="2000" kern="1200" cap="all" baseline="0">
+                <a:solidFill>
+                  <a:schemeClr val="tx1"/>
+                </a:solidFill>
+                <a:effectLst/>
+                <a:latin typeface="+mn-lt"/>
+                <a:ea typeface="+mn-ea"/>
+                <a:cs typeface="+mn-cs"/>
+              </a:defRPr>
+            </a:lvl1pPr>
+            <a:lvl2pPr marL="685800" indent="-228600" algn="l" defTabSz="914400" rtl="0" eaLnBrk="1" latinLnBrk="0" hangingPunct="1">
+              <a:lnSpc>
+                <a:spcPct val="120000"/>
+              </a:lnSpc>
+              <a:spcBef>
+                <a:spcPts val="500"/>
+              </a:spcBef>
+              <a:buClr>
+                <a:schemeClr val="accent1"/>
+              </a:buClr>
+              <a:buSzPct val="160000"/>
+              <a:buFont typeface="Arial" panose="020B0604020202020204" pitchFamily="34" charset="0"/>
+              <a:buChar char="•"/>
+              <a:defRPr sz="1800" kern="1200" cap="all" baseline="0">
+                <a:solidFill>
+                  <a:schemeClr val="tx1"/>
+                </a:solidFill>
+                <a:effectLst/>
+                <a:latin typeface="+mn-lt"/>
+                <a:ea typeface="+mn-ea"/>
+                <a:cs typeface="+mn-cs"/>
+              </a:defRPr>
+            </a:lvl2pPr>
+            <a:lvl3pPr marL="1143000" indent="-228600" algn="l" defTabSz="914400" rtl="0" eaLnBrk="1" latinLnBrk="0" hangingPunct="1">
+              <a:lnSpc>
+                <a:spcPct val="120000"/>
+              </a:lnSpc>
+              <a:spcBef>
+                <a:spcPts val="500"/>
+              </a:spcBef>
+              <a:buClr>
+                <a:schemeClr val="accent1"/>
+              </a:buClr>
+              <a:buSzPct val="160000"/>
+              <a:buFont typeface="Arial" panose="020B0604020202020204" pitchFamily="34" charset="0"/>
+              <a:buChar char="•"/>
+              <a:defRPr sz="1600" kern="1200" cap="all" baseline="0">
+                <a:solidFill>
+                  <a:schemeClr val="tx1"/>
+                </a:solidFill>
+                <a:effectLst/>
+                <a:latin typeface="+mn-lt"/>
+                <a:ea typeface="+mn-ea"/>
+                <a:cs typeface="+mn-cs"/>
+              </a:defRPr>
+            </a:lvl3pPr>
+            <a:lvl4pPr marL="1600200" indent="-228600" algn="l" defTabSz="914400" rtl="0" eaLnBrk="1" latinLnBrk="0" hangingPunct="1">
+              <a:lnSpc>
+                <a:spcPct val="120000"/>
+              </a:lnSpc>
+              <a:spcBef>
+                <a:spcPts val="500"/>
+              </a:spcBef>
+              <a:buClr>
+                <a:schemeClr val="accent1"/>
+              </a:buClr>
+              <a:buSzPct val="160000"/>
+              <a:buFont typeface="Arial" panose="020B0604020202020204" pitchFamily="34" charset="0"/>
+              <a:buChar char="•"/>
+              <a:defRPr sz="1400" kern="1200" cap="all" baseline="0">
+                <a:solidFill>
+                  <a:schemeClr val="tx1"/>
+                </a:solidFill>
+                <a:effectLst/>
+                <a:latin typeface="+mn-lt"/>
+                <a:ea typeface="+mn-ea"/>
+                <a:cs typeface="+mn-cs"/>
+              </a:defRPr>
+            </a:lvl4pPr>
+            <a:lvl5pPr marL="2057400" indent="-228600" algn="l" defTabSz="914400" rtl="0" eaLnBrk="1" latinLnBrk="0" hangingPunct="1">
+              <a:lnSpc>
+                <a:spcPct val="120000"/>
+              </a:lnSpc>
+              <a:spcBef>
+                <a:spcPts val="500"/>
+              </a:spcBef>
+              <a:buClr>
+                <a:schemeClr val="accent1"/>
+              </a:buClr>
+              <a:buSzPct val="160000"/>
+              <a:buFont typeface="Arial" panose="020B0604020202020204" pitchFamily="34" charset="0"/>
+              <a:buChar char="•"/>
+              <a:defRPr sz="1400" kern="1200" cap="all" baseline="0">
+                <a:solidFill>
+                  <a:schemeClr val="tx1"/>
+                </a:solidFill>
+                <a:effectLst/>
+                <a:latin typeface="+mn-lt"/>
+                <a:ea typeface="+mn-ea"/>
+                <a:cs typeface="+mn-cs"/>
+              </a:defRPr>
+            </a:lvl5pPr>
+            <a:lvl6pPr marL="2514600" indent="-228600" algn="l" defTabSz="914400" rtl="0" eaLnBrk="1" latinLnBrk="0" hangingPunct="1">
+              <a:lnSpc>
+                <a:spcPct val="120000"/>
+              </a:lnSpc>
+              <a:spcBef>
+                <a:spcPts val="500"/>
+              </a:spcBef>
+              <a:buClr>
+                <a:schemeClr val="accent1"/>
+              </a:buClr>
+              <a:buSzPct val="160000"/>
+              <a:buFont typeface="Arial" panose="020B0604020202020204" pitchFamily="34" charset="0"/>
+              <a:buChar char="•"/>
+              <a:defRPr sz="1400" kern="1200" cap="all" baseline="0">
+                <a:solidFill>
+                  <a:schemeClr val="tx1"/>
+                </a:solidFill>
+                <a:effectLst/>
+                <a:latin typeface="+mn-lt"/>
+                <a:ea typeface="+mn-ea"/>
+                <a:cs typeface="+mn-cs"/>
+              </a:defRPr>
+            </a:lvl6pPr>
+            <a:lvl7pPr marL="2971800" indent="-228600" algn="l" defTabSz="914400" rtl="0" eaLnBrk="1" latinLnBrk="0" hangingPunct="1">
+              <a:lnSpc>
+                <a:spcPct val="120000"/>
+              </a:lnSpc>
+              <a:spcBef>
+                <a:spcPts val="500"/>
+              </a:spcBef>
+              <a:buClr>
+                <a:schemeClr val="accent1"/>
+              </a:buClr>
+              <a:buSzPct val="160000"/>
+              <a:buFont typeface="Arial" panose="020B0604020202020204" pitchFamily="34" charset="0"/>
+              <a:buChar char="•"/>
+              <a:defRPr sz="1400" kern="1200" cap="all" baseline="0">
+                <a:solidFill>
+                  <a:schemeClr val="tx1"/>
+                </a:solidFill>
+                <a:effectLst/>
+                <a:latin typeface="+mn-lt"/>
+                <a:ea typeface="+mn-ea"/>
+                <a:cs typeface="+mn-cs"/>
+              </a:defRPr>
+            </a:lvl7pPr>
+            <a:lvl8pPr marL="3429000" indent="-228600" algn="l" defTabSz="914400" rtl="0" eaLnBrk="1" latinLnBrk="0" hangingPunct="1">
+              <a:lnSpc>
+                <a:spcPct val="120000"/>
+              </a:lnSpc>
+              <a:spcBef>
+                <a:spcPts val="500"/>
+              </a:spcBef>
+              <a:buClr>
+                <a:schemeClr val="accent1"/>
+              </a:buClr>
+              <a:buSzPct val="160000"/>
+              <a:buFont typeface="Arial" panose="020B0604020202020204" pitchFamily="34" charset="0"/>
+              <a:buChar char="•"/>
+              <a:defRPr sz="1400" kern="1200" cap="all" baseline="0">
+                <a:solidFill>
+                  <a:schemeClr val="tx1"/>
+                </a:solidFill>
+                <a:effectLst/>
+                <a:latin typeface="+mn-lt"/>
+                <a:ea typeface="+mn-ea"/>
+                <a:cs typeface="+mn-cs"/>
+              </a:defRPr>
+            </a:lvl8pPr>
+            <a:lvl9pPr marL="3886200" indent="-228600" algn="l" defTabSz="914400" rtl="0" eaLnBrk="1" latinLnBrk="0" hangingPunct="1">
+              <a:lnSpc>
+                <a:spcPct val="120000"/>
+              </a:lnSpc>
+              <a:spcBef>
+                <a:spcPts val="500"/>
+              </a:spcBef>
+              <a:buClr>
+                <a:schemeClr val="accent1"/>
+              </a:buClr>
+              <a:buSzPct val="160000"/>
+              <a:buFont typeface="Arial" panose="020B0604020202020204" pitchFamily="34" charset="0"/>
+              <a:buChar char="•"/>
+              <a:defRPr sz="1400" kern="1200" cap="all" baseline="0">
+                <a:solidFill>
+                  <a:schemeClr val="tx1"/>
+                </a:solidFill>
+                <a:effectLst/>
+                <a:latin typeface="+mn-lt"/>
+                <a:ea typeface="+mn-ea"/>
+                <a:cs typeface="+mn-cs"/>
+              </a:defRPr>
+            </a:lvl9pPr>
+          </a:lstStyle>
+          <a:p>
+            <a:pPr marL="0" indent="0">
+              <a:buNone/>
+            </a:pPr>
             <a:r>
               <a:rPr lang="en-US" dirty="0"/>
-              <a:t> Would making a movie accessible to more people yield a better box office?</a:t>
-            </a:r>
-          </a:p>
-        </p:txBody>
-      </p:sp>
+              <a:t>Does a movie’s MPAA Rating effect gross Revenue? </a:t>
+            </a:r>
+          </a:p>
+        </p:txBody>
+      </p:sp>
+      <p:sp>
+        <p:nvSpPr>
+          <p:cNvPr id="8" name="Content Placeholder 3">
+            <a:extLst>
+              <a:ext uri="{FF2B5EF4-FFF2-40B4-BE49-F238E27FC236}">
+                <a16:creationId xmlns:a16="http://schemas.microsoft.com/office/drawing/2014/main" id="{F794E119-977B-4176-B9BF-6EE8F7E04E37}"/>
+              </a:ext>
+            </a:extLst>
+          </p:cNvPr>
+          <p:cNvSpPr txBox="1">
+            <a:spLocks/>
+          </p:cNvSpPr>
+          <p:nvPr/>
+        </p:nvSpPr>
+        <p:spPr>
+          <a:xfrm>
+            <a:off x="6095712" y="4170390"/>
+            <a:ext cx="5086538" cy="933192"/>
+          </a:xfrm>
+          <a:prstGeom prst="rect">
+            <a:avLst/>
+          </a:prstGeom>
+        </p:spPr>
+        <p:txBody>
+          <a:bodyPr vert="horz" lIns="91440" tIns="45720" rIns="91440" bIns="45720" rtlCol="0" anchor="t">
+            <a:normAutofit/>
+          </a:bodyPr>
+          <a:lstStyle>
+            <a:lvl1pPr marL="228600" indent="-228600" algn="l" defTabSz="914400" rtl="0" eaLnBrk="1" latinLnBrk="0" hangingPunct="1">
+              <a:lnSpc>
+                <a:spcPct val="120000"/>
+              </a:lnSpc>
+              <a:spcBef>
+                <a:spcPts val="1000"/>
+              </a:spcBef>
+              <a:buClr>
+                <a:schemeClr val="accent1"/>
+              </a:buClr>
+              <a:buSzPct val="160000"/>
+              <a:buFont typeface="Arial" panose="020B0604020202020204" pitchFamily="34" charset="0"/>
+              <a:buChar char="•"/>
+              <a:defRPr sz="2000" kern="1200" cap="all" baseline="0">
+                <a:solidFill>
+                  <a:schemeClr val="tx1"/>
+                </a:solidFill>
+                <a:effectLst/>
+                <a:latin typeface="+mn-lt"/>
+                <a:ea typeface="+mn-ea"/>
+                <a:cs typeface="+mn-cs"/>
+              </a:defRPr>
+            </a:lvl1pPr>
+            <a:lvl2pPr marL="685800" indent="-228600" algn="l" defTabSz="914400" rtl="0" eaLnBrk="1" latinLnBrk="0" hangingPunct="1">
+              <a:lnSpc>
+                <a:spcPct val="120000"/>
+              </a:lnSpc>
+              <a:spcBef>
+                <a:spcPts val="500"/>
+              </a:spcBef>
+              <a:buClr>
+                <a:schemeClr val="accent1"/>
+              </a:buClr>
+              <a:buSzPct val="160000"/>
+              <a:buFont typeface="Arial" panose="020B0604020202020204" pitchFamily="34" charset="0"/>
+              <a:buChar char="•"/>
+              <a:defRPr sz="1800" kern="1200" cap="all" baseline="0">
+                <a:solidFill>
+                  <a:schemeClr val="tx1"/>
+                </a:solidFill>
+                <a:effectLst/>
+                <a:latin typeface="+mn-lt"/>
+                <a:ea typeface="+mn-ea"/>
+                <a:cs typeface="+mn-cs"/>
+              </a:defRPr>
+            </a:lvl2pPr>
+            <a:lvl3pPr marL="1143000" indent="-228600" algn="l" defTabSz="914400" rtl="0" eaLnBrk="1" latinLnBrk="0" hangingPunct="1">
+              <a:lnSpc>
+                <a:spcPct val="120000"/>
+              </a:lnSpc>
+              <a:spcBef>
+                <a:spcPts val="500"/>
+              </a:spcBef>
+              <a:buClr>
+                <a:schemeClr val="accent1"/>
+              </a:buClr>
+              <a:buSzPct val="160000"/>
+              <a:buFont typeface="Arial" panose="020B0604020202020204" pitchFamily="34" charset="0"/>
+              <a:buChar char="•"/>
+              <a:defRPr sz="1600" kern="1200" cap="all" baseline="0">
+                <a:solidFill>
+                  <a:schemeClr val="tx1"/>
+                </a:solidFill>
+                <a:effectLst/>
+                <a:latin typeface="+mn-lt"/>
+                <a:ea typeface="+mn-ea"/>
+                <a:cs typeface="+mn-cs"/>
+              </a:defRPr>
+            </a:lvl3pPr>
+            <a:lvl4pPr marL="1600200" indent="-228600" algn="l" defTabSz="914400" rtl="0" eaLnBrk="1" latinLnBrk="0" hangingPunct="1">
+              <a:lnSpc>
+                <a:spcPct val="120000"/>
+              </a:lnSpc>
+              <a:spcBef>
+                <a:spcPts val="500"/>
+              </a:spcBef>
+              <a:buClr>
+                <a:schemeClr val="accent1"/>
+              </a:buClr>
+              <a:buSzPct val="160000"/>
+              <a:buFont typeface="Arial" panose="020B0604020202020204" pitchFamily="34" charset="0"/>
+              <a:buChar char="•"/>
+              <a:defRPr sz="1400" kern="1200" cap="all" baseline="0">
+                <a:solidFill>
+                  <a:schemeClr val="tx1"/>
+                </a:solidFill>
+                <a:effectLst/>
+                <a:latin typeface="+mn-lt"/>
+                <a:ea typeface="+mn-ea"/>
+                <a:cs typeface="+mn-cs"/>
+              </a:defRPr>
+            </a:lvl4pPr>
+            <a:lvl5pPr marL="2057400" indent="-228600" algn="l" defTabSz="914400" rtl="0" eaLnBrk="1" latinLnBrk="0" hangingPunct="1">
+              <a:lnSpc>
+                <a:spcPct val="120000"/>
+              </a:lnSpc>
+              <a:spcBef>
+                <a:spcPts val="500"/>
+              </a:spcBef>
+              <a:buClr>
+                <a:schemeClr val="accent1"/>
+              </a:buClr>
+              <a:buSzPct val="160000"/>
+              <a:buFont typeface="Arial" panose="020B0604020202020204" pitchFamily="34" charset="0"/>
+              <a:buChar char="•"/>
+              <a:defRPr sz="1400" kern="1200" cap="all" baseline="0">
+                <a:solidFill>
+                  <a:schemeClr val="tx1"/>
+                </a:solidFill>
+                <a:effectLst/>
+                <a:latin typeface="+mn-lt"/>
+                <a:ea typeface="+mn-ea"/>
+                <a:cs typeface="+mn-cs"/>
+              </a:defRPr>
+            </a:lvl5pPr>
+            <a:lvl6pPr marL="2514600" indent="-228600" algn="l" defTabSz="914400" rtl="0" eaLnBrk="1" latinLnBrk="0" hangingPunct="1">
+              <a:lnSpc>
+                <a:spcPct val="120000"/>
+              </a:lnSpc>
+              <a:spcBef>
+                <a:spcPts val="500"/>
+              </a:spcBef>
+              <a:buClr>
+                <a:schemeClr val="accent1"/>
+              </a:buClr>
+              <a:buSzPct val="160000"/>
+              <a:buFont typeface="Arial" panose="020B0604020202020204" pitchFamily="34" charset="0"/>
+              <a:buChar char="•"/>
+              <a:defRPr sz="1400" kern="1200" cap="all" baseline="0">
+                <a:solidFill>
+                  <a:schemeClr val="tx1"/>
+                </a:solidFill>
+                <a:effectLst/>
+                <a:latin typeface="+mn-lt"/>
+                <a:ea typeface="+mn-ea"/>
+                <a:cs typeface="+mn-cs"/>
+              </a:defRPr>
+            </a:lvl6pPr>
+            <a:lvl7pPr marL="2971800" indent="-228600" algn="l" defTabSz="914400" rtl="0" eaLnBrk="1" latinLnBrk="0" hangingPunct="1">
+              <a:lnSpc>
+                <a:spcPct val="120000"/>
+              </a:lnSpc>
+              <a:spcBef>
+                <a:spcPts val="500"/>
+              </a:spcBef>
+              <a:buClr>
+                <a:schemeClr val="accent1"/>
+              </a:buClr>
+              <a:buSzPct val="160000"/>
+              <a:buFont typeface="Arial" panose="020B0604020202020204" pitchFamily="34" charset="0"/>
+              <a:buChar char="•"/>
+              <a:defRPr sz="1400" kern="1200" cap="all" baseline="0">
+                <a:solidFill>
+                  <a:schemeClr val="tx1"/>
+                </a:solidFill>
+                <a:effectLst/>
+                <a:latin typeface="+mn-lt"/>
+                <a:ea typeface="+mn-ea"/>
+                <a:cs typeface="+mn-cs"/>
+              </a:defRPr>
+            </a:lvl7pPr>
+            <a:lvl8pPr marL="3429000" indent="-228600" algn="l" defTabSz="914400" rtl="0" eaLnBrk="1" latinLnBrk="0" hangingPunct="1">
+              <a:lnSpc>
+                <a:spcPct val="120000"/>
+              </a:lnSpc>
+              <a:spcBef>
+                <a:spcPts val="500"/>
+              </a:spcBef>
+              <a:buClr>
+                <a:schemeClr val="accent1"/>
+              </a:buClr>
+              <a:buSzPct val="160000"/>
+              <a:buFont typeface="Arial" panose="020B0604020202020204" pitchFamily="34" charset="0"/>
+              <a:buChar char="•"/>
+              <a:defRPr sz="1400" kern="1200" cap="all" baseline="0">
+                <a:solidFill>
+                  <a:schemeClr val="tx1"/>
+                </a:solidFill>
+                <a:effectLst/>
+                <a:latin typeface="+mn-lt"/>
+                <a:ea typeface="+mn-ea"/>
+                <a:cs typeface="+mn-cs"/>
+              </a:defRPr>
+            </a:lvl8pPr>
+            <a:lvl9pPr marL="3886200" indent="-228600" algn="l" defTabSz="914400" rtl="0" eaLnBrk="1" latinLnBrk="0" hangingPunct="1">
+              <a:lnSpc>
+                <a:spcPct val="120000"/>
+              </a:lnSpc>
+              <a:spcBef>
+                <a:spcPts val="500"/>
+              </a:spcBef>
+              <a:buClr>
+                <a:schemeClr val="accent1"/>
+              </a:buClr>
+              <a:buSzPct val="160000"/>
+              <a:buFont typeface="Arial" panose="020B0604020202020204" pitchFamily="34" charset="0"/>
+              <a:buChar char="•"/>
+              <a:defRPr sz="1400" kern="1200" cap="all" baseline="0">
+                <a:solidFill>
+                  <a:schemeClr val="tx1"/>
+                </a:solidFill>
+                <a:effectLst/>
+                <a:latin typeface="+mn-lt"/>
+                <a:ea typeface="+mn-ea"/>
+                <a:cs typeface="+mn-cs"/>
+              </a:defRPr>
+            </a:lvl9pPr>
+          </a:lstStyle>
+          <a:p>
+            <a:pPr marL="0" indent="0">
+              <a:buNone/>
+            </a:pPr>
+            <a:r>
+              <a:rPr lang="en-US" dirty="0"/>
+              <a:t>Moreover it’s evident that production companies are aware of this.</a:t>
+            </a:r>
+          </a:p>
+        </p:txBody>
+      </p:sp>
+      <p:pic>
+        <p:nvPicPr>
+          <p:cNvPr id="10" name="Picture 9" descr="A screenshot of a cell phone&#10;&#10;Description generated with very high confidence">
+            <a:extLst>
+              <a:ext uri="{FF2B5EF4-FFF2-40B4-BE49-F238E27FC236}">
+                <a16:creationId xmlns:a16="http://schemas.microsoft.com/office/drawing/2014/main" id="{B0241CE4-AA02-4A96-BED1-CAB0E5CF90C9}"/>
+              </a:ext>
+            </a:extLst>
+          </p:cNvPr>
+          <p:cNvPicPr>
+            <a:picLocks noChangeAspect="1"/>
+          </p:cNvPicPr>
+          <p:nvPr/>
+        </p:nvPicPr>
+        <p:blipFill>
+          <a:blip r:embed="rId4"/>
+          <a:stretch>
+            <a:fillRect/>
+          </a:stretch>
+        </p:blipFill>
+        <p:spPr>
+          <a:xfrm>
+            <a:off x="251723" y="612217"/>
+            <a:ext cx="5792056" cy="4847036"/>
+          </a:xfrm>
+          <a:prstGeom prst="rect">
+            <a:avLst/>
+          </a:prstGeom>
+        </p:spPr>
+      </p:pic>
     </p:spTree>
     <p:extLst>
       <p:ext uri="{BB962C8B-B14F-4D97-AF65-F5344CB8AC3E}">
@@ -7528,7 +9389,7 @@
                                           </p:stCondLst>
                                         </p:cTn>
                                         <p:tgtEl>
-                                          <p:spTgt spid="4">
+                                          <p:spTgt spid="7">
                                             <p:txEl>
                                               <p:pRg st="0" end="0"/>
                                             </p:txEl>
@@ -7577,11 +9438,203 @@
                                           </p:stCondLst>
                                         </p:cTn>
                                         <p:tgtEl>
+                                          <p:spTgt spid="6"/>
+                                        </p:tgtEl>
+                                        <p:attrNameLst>
+                                          <p:attrName>style.visibility</p:attrName>
+                                        </p:attrNameLst>
+                                      </p:cBhvr>
+                                      <p:to>
+                                        <p:strVal val="visible"/>
+                                      </p:to>
+                                    </p:set>
+                                  </p:childTnLst>
+                                </p:cTn>
+                              </p:par>
+                            </p:childTnLst>
+                          </p:cTn>
+                        </p:par>
+                      </p:childTnLst>
+                    </p:cTn>
+                  </p:par>
+                  <p:par>
+                    <p:cTn id="11" fill="hold">
+                      <p:stCondLst>
+                        <p:cond delay="indefinite"/>
+                      </p:stCondLst>
+                      <p:childTnLst>
+                        <p:par>
+                          <p:cTn id="12" fill="hold">
+                            <p:stCondLst>
+                              <p:cond delay="0"/>
+                            </p:stCondLst>
+                            <p:childTnLst>
+                              <p:par>
+                                <p:cTn id="13" presetID="1" presetClass="entr" presetSubtype="0" fill="hold" nodeType="clickEffect">
+                                  <p:stCondLst>
+                                    <p:cond delay="0"/>
+                                  </p:stCondLst>
+                                  <p:childTnLst>
+                                    <p:set>
+                                      <p:cBhvr>
+                                        <p:cTn id="14" dur="1" fill="hold">
+                                          <p:stCondLst>
+                                            <p:cond delay="0"/>
+                                          </p:stCondLst>
+                                        </p:cTn>
+                                        <p:tgtEl>
                                           <p:spTgt spid="4">
                                             <p:txEl>
-                                              <p:pRg st="1" end="1"/>
+                                              <p:pRg st="0" end="0"/>
                                             </p:txEl>
                                           </p:spTgt>
+                                        </p:tgtEl>
+                                        <p:attrNameLst>
+                                          <p:attrName>style.visibility</p:attrName>
+                                        </p:attrNameLst>
+                                      </p:cBhvr>
+                                      <p:to>
+                                        <p:strVal val="visible"/>
+                                      </p:to>
+                                    </p:set>
+                                  </p:childTnLst>
+                                </p:cTn>
+                              </p:par>
+                            </p:childTnLst>
+                          </p:cTn>
+                        </p:par>
+                      </p:childTnLst>
+                    </p:cTn>
+                  </p:par>
+                  <p:par>
+                    <p:cTn id="15" fill="hold">
+                      <p:stCondLst>
+                        <p:cond delay="indefinite"/>
+                      </p:stCondLst>
+                      <p:childTnLst>
+                        <p:par>
+                          <p:cTn id="16" fill="hold">
+                            <p:stCondLst>
+                              <p:cond delay="0"/>
+                            </p:stCondLst>
+                            <p:childTnLst>
+                              <p:par>
+                                <p:cTn id="17" presetID="1" presetClass="entr" presetSubtype="0" fill="hold" nodeType="clickEffect">
+                                  <p:stCondLst>
+                                    <p:cond delay="0"/>
+                                  </p:stCondLst>
+                                  <p:childTnLst>
+                                    <p:set>
+                                      <p:cBhvr>
+                                        <p:cTn id="18" dur="1" fill="hold">
+                                          <p:stCondLst>
+                                            <p:cond delay="0"/>
+                                          </p:stCondLst>
+                                        </p:cTn>
+                                        <p:tgtEl>
+                                          <p:spTgt spid="8">
+                                            <p:txEl>
+                                              <p:pRg st="0" end="0"/>
+                                            </p:txEl>
+                                          </p:spTgt>
+                                        </p:tgtEl>
+                                        <p:attrNameLst>
+                                          <p:attrName>style.visibility</p:attrName>
+                                        </p:attrNameLst>
+                                      </p:cBhvr>
+                                      <p:to>
+                                        <p:strVal val="visible"/>
+                                      </p:to>
+                                    </p:set>
+                                  </p:childTnLst>
+                                </p:cTn>
+                              </p:par>
+                            </p:childTnLst>
+                          </p:cTn>
+                        </p:par>
+                      </p:childTnLst>
+                    </p:cTn>
+                  </p:par>
+                  <p:par>
+                    <p:cTn id="19" fill="hold">
+                      <p:stCondLst>
+                        <p:cond delay="indefinite"/>
+                      </p:stCondLst>
+                      <p:childTnLst>
+                        <p:par>
+                          <p:cTn id="20" fill="hold">
+                            <p:stCondLst>
+                              <p:cond delay="0"/>
+                            </p:stCondLst>
+                            <p:childTnLst>
+                              <p:par>
+                                <p:cTn id="21" presetID="10" presetClass="exit" presetSubtype="0" fill="hold" nodeType="clickEffect">
+                                  <p:stCondLst>
+                                    <p:cond delay="0"/>
+                                  </p:stCondLst>
+                                  <p:childTnLst>
+                                    <p:animEffect transition="out" filter="fade">
+                                      <p:cBhvr>
+                                        <p:cTn id="22" dur="500"/>
+                                        <p:tgtEl>
+                                          <p:spTgt spid="6"/>
+                                        </p:tgtEl>
+                                      </p:cBhvr>
+                                    </p:animEffect>
+                                    <p:set>
+                                      <p:cBhvr>
+                                        <p:cTn id="23" dur="1" fill="hold">
+                                          <p:stCondLst>
+                                            <p:cond delay="499"/>
+                                          </p:stCondLst>
+                                        </p:cTn>
+                                        <p:tgtEl>
+                                          <p:spTgt spid="6"/>
+                                        </p:tgtEl>
+                                        <p:attrNameLst>
+                                          <p:attrName>style.visibility</p:attrName>
+                                        </p:attrNameLst>
+                                      </p:cBhvr>
+                                      <p:to>
+                                        <p:strVal val="hidden"/>
+                                      </p:to>
+                                    </p:set>
+                                  </p:childTnLst>
+                                </p:cTn>
+                              </p:par>
+                            </p:childTnLst>
+                          </p:cTn>
+                        </p:par>
+                      </p:childTnLst>
+                    </p:cTn>
+                  </p:par>
+                  <p:par>
+                    <p:cTn id="24" fill="hold">
+                      <p:stCondLst>
+                        <p:cond delay="indefinite"/>
+                      </p:stCondLst>
+                      <p:childTnLst>
+                        <p:par>
+                          <p:cTn id="25" fill="hold">
+                            <p:stCondLst>
+                              <p:cond delay="0"/>
+                            </p:stCondLst>
+                            <p:childTnLst>
+                              <p:par>
+                                <p:cTn id="26" presetID="1" presetClass="entr" presetSubtype="0" fill="hold" nodeType="clickEffect">
+                                  <p:stCondLst>
+                                    <p:cond delay="0"/>
+                                  </p:stCondLst>
+                                  <p:childTnLst>
+                                    <p:set>
+                                      <p:cBhvr>
+                                        <p:cTn id="27" dur="1" fill="hold">
+                                          <p:stCondLst>
+                                            <p:cond delay="0"/>
+                                          </p:stCondLst>
+                                        </p:cTn>
+                                        <p:tgtEl>
+                                          <p:spTgt spid="10"/>
                                         </p:tgtEl>
                                         <p:attrNameLst>
                                           <p:attrName>style.visibility</p:attrName>
@@ -7642,99 +9695,68 @@
           <a:chExt cx="0" cy="0"/>
         </a:xfrm>
       </p:grpSpPr>
-      <p:sp>
-        <p:nvSpPr>
-          <p:cNvPr id="2" name="Title 1">
+      <p:pic>
+        <p:nvPicPr>
+          <p:cNvPr id="6" name="Content Placeholder 5" descr="A screenshot of a cell phone&#10;&#10;Description generated with very high confidence">
             <a:extLst>
               <a:ext uri="{FF2B5EF4-FFF2-40B4-BE49-F238E27FC236}">
-                <a16:creationId xmlns:a16="http://schemas.microsoft.com/office/drawing/2014/main" id="{D70524D5-97C8-48F3-9986-C1DD466D55AF}"/>
+                <a16:creationId xmlns:a16="http://schemas.microsoft.com/office/drawing/2014/main" id="{BC3DCE3D-E696-45DB-ADEE-0AD1F7ECF2F2}"/>
               </a:ext>
             </a:extLst>
           </p:cNvPr>
-          <p:cNvSpPr>
-            <a:spLocks noGrp="1"/>
-          </p:cNvSpPr>
-          <p:nvPr>
-            <p:ph type="title"/>
-          </p:nvPr>
-        </p:nvSpPr>
-        <p:spPr/>
-        <p:txBody>
-          <a:bodyPr/>
-          <a:lstStyle/>
-          <a:p>
-            <a:r>
-              <a:rPr lang="en-US" dirty="0"/>
-              <a:t>Mo’ Money Mo’ Money?</a:t>
-            </a:r>
-          </a:p>
-        </p:txBody>
-      </p:sp>
-      <p:sp>
-        <p:nvSpPr>
-          <p:cNvPr id="3" name="Content Placeholder 2">
+          <p:cNvPicPr>
+            <a:picLocks noGrp="1" noChangeAspect="1"/>
+          </p:cNvPicPr>
+          <p:nvPr>
+            <p:ph sz="quarter" idx="13"/>
+          </p:nvPr>
+        </p:nvPicPr>
+        <p:blipFill>
+          <a:blip r:embed="rId3"/>
+          <a:stretch>
+            <a:fillRect/>
+          </a:stretch>
+        </p:blipFill>
+        <p:spPr>
+          <a:xfrm>
+            <a:off x="173340" y="653566"/>
+            <a:ext cx="5490675" cy="4523405"/>
+          </a:xfrm>
+        </p:spPr>
+      </p:pic>
+      <p:pic>
+        <p:nvPicPr>
+          <p:cNvPr id="8" name="Content Placeholder 7" descr="A screenshot of a cell phone&#10;&#10;Description generated with very high confidence">
             <a:extLst>
               <a:ext uri="{FF2B5EF4-FFF2-40B4-BE49-F238E27FC236}">
-                <a16:creationId xmlns:a16="http://schemas.microsoft.com/office/drawing/2014/main" id="{442B4B3D-83F0-4E29-A64A-C907F55CCEC9}"/>
+                <a16:creationId xmlns:a16="http://schemas.microsoft.com/office/drawing/2014/main" id="{6B17349F-43D0-40B2-82B7-EC0BFC9E9B4A}"/>
               </a:ext>
             </a:extLst>
           </p:cNvPr>
-          <p:cNvSpPr>
-            <a:spLocks noGrp="1"/>
-          </p:cNvSpPr>
-          <p:nvPr>
-            <p:ph sz="quarter" idx="13"/>
-          </p:nvPr>
-        </p:nvSpPr>
-        <p:spPr/>
-        <p:txBody>
-          <a:bodyPr/>
-          <a:lstStyle/>
-          <a:p>
-            <a:r>
-              <a:rPr lang="en-US" dirty="0"/>
-              <a:t>Does a bigger budget translate to a bigger payday at the Box </a:t>
-            </a:r>
-            <a:r>
-              <a:rPr lang="en-US" dirty="0" err="1"/>
-              <a:t>OfFice</a:t>
-            </a:r>
-            <a:r>
-              <a:rPr lang="en-US" dirty="0"/>
-              <a:t>?</a:t>
-            </a:r>
-          </a:p>
-        </p:txBody>
-      </p:sp>
-      <p:sp>
-        <p:nvSpPr>
-          <p:cNvPr id="4" name="Content Placeholder 3">
-            <a:extLst>
-              <a:ext uri="{FF2B5EF4-FFF2-40B4-BE49-F238E27FC236}">
-                <a16:creationId xmlns:a16="http://schemas.microsoft.com/office/drawing/2014/main" id="{86B812F5-7EA8-4345-8927-E604710FE503}"/>
-              </a:ext>
-            </a:extLst>
-          </p:cNvPr>
-          <p:cNvSpPr>
-            <a:spLocks noGrp="1"/>
-          </p:cNvSpPr>
+          <p:cNvPicPr>
+            <a:picLocks noGrp="1" noChangeAspect="1"/>
+          </p:cNvPicPr>
           <p:nvPr>
             <p:ph sz="quarter" idx="14"/>
           </p:nvPr>
-        </p:nvSpPr>
-        <p:spPr/>
-        <p:txBody>
-          <a:bodyPr/>
-          <a:lstStyle/>
-          <a:p>
-            <a:endParaRPr lang="en-US"/>
-          </a:p>
-        </p:txBody>
-      </p:sp>
+        </p:nvPicPr>
+        <p:blipFill>
+          <a:blip r:embed="rId4"/>
+          <a:stretch>
+            <a:fillRect/>
+          </a:stretch>
+        </p:blipFill>
+        <p:spPr>
+          <a:xfrm>
+            <a:off x="6096000" y="653567"/>
+            <a:ext cx="5405327" cy="4523405"/>
+          </a:xfrm>
+        </p:spPr>
+      </p:pic>
     </p:spTree>
     <p:extLst>
       <p:ext uri="{BB962C8B-B14F-4D97-AF65-F5344CB8AC3E}">
-        <p14:creationId xmlns:p14="http://schemas.microsoft.com/office/powerpoint/2010/main" val="4274631436"/>
+        <p14:creationId xmlns:p14="http://schemas.microsoft.com/office/powerpoint/2010/main" val="456084117"/>
       </p:ext>
     </p:extLst>
   </p:cSld>
@@ -7766,7 +9788,7 @@
           <p:cNvPr id="2" name="Title 1">
             <a:extLst>
               <a:ext uri="{FF2B5EF4-FFF2-40B4-BE49-F238E27FC236}">
-                <a16:creationId xmlns:a16="http://schemas.microsoft.com/office/drawing/2014/main" id="{E2E2F591-D63D-4B4C-BA61-D3AD551C9A6C}"/>
+                <a16:creationId xmlns:a16="http://schemas.microsoft.com/office/drawing/2014/main" id="{D70524D5-97C8-48F3-9986-C1DD466D55AF}"/>
               </a:ext>
             </a:extLst>
           </p:cNvPr>
@@ -7777,14 +9799,35 @@
             <p:ph type="title"/>
           </p:nvPr>
         </p:nvSpPr>
-        <p:spPr/>
-        <p:txBody>
-          <a:bodyPr/>
+        <p:spPr>
+          <a:xfrm>
+            <a:off x="376301" y="672164"/>
+            <a:ext cx="10396882" cy="1892616"/>
+          </a:xfrm>
+        </p:spPr>
+        <p:txBody>
+          <a:bodyPr>
+            <a:normAutofit fontScale="90000"/>
+          </a:bodyPr>
           <a:lstStyle/>
           <a:p>
             <a:r>
               <a:rPr lang="en-US" dirty="0"/>
-              <a:t>Like us on Facebook</a:t>
+              <a:t>But do you </a:t>
+            </a:r>
+            <a:br>
+              <a:rPr lang="en-US" dirty="0"/>
+            </a:br>
+            <a:r>
+              <a:rPr lang="en-US" dirty="0"/>
+              <a:t>Spend Money to </a:t>
+            </a:r>
+            <a:br>
+              <a:rPr lang="en-US" dirty="0"/>
+            </a:br>
+            <a:r>
+              <a:rPr lang="en-US" dirty="0"/>
+              <a:t>Make Money?</a:t>
             </a:r>
           </a:p>
         </p:txBody>
@@ -7794,7 +9837,7 @@
           <p:cNvPr id="3" name="Content Placeholder 2">
             <a:extLst>
               <a:ext uri="{FF2B5EF4-FFF2-40B4-BE49-F238E27FC236}">
-                <a16:creationId xmlns:a16="http://schemas.microsoft.com/office/drawing/2014/main" id="{7D19C7E8-0DA6-4B24-B365-5F4D5DB4E09F}"/>
+                <a16:creationId xmlns:a16="http://schemas.microsoft.com/office/drawing/2014/main" id="{442B4B3D-83F0-4E29-A64A-C907F55CCEC9}"/>
               </a:ext>
             </a:extLst>
           </p:cNvPr>
@@ -7805,39 +9848,306 @@
             <p:ph sz="quarter" idx="13"/>
           </p:nvPr>
         </p:nvSpPr>
-        <p:spPr/>
+        <p:spPr>
+          <a:xfrm>
+            <a:off x="376301" y="3081709"/>
+            <a:ext cx="5088714" cy="1009618"/>
+          </a:xfrm>
+        </p:spPr>
         <p:txBody>
           <a:bodyPr/>
           <a:lstStyle/>
           <a:p>
-            <a:endParaRPr lang="en-US"/>
-          </a:p>
-        </p:txBody>
-      </p:sp>
-      <p:sp>
-        <p:nvSpPr>
-          <p:cNvPr id="4" name="Content Placeholder 3">
+            <a:pPr marL="0" indent="0">
+              <a:buNone/>
+            </a:pPr>
+            <a:r>
+              <a:rPr lang="en-US" dirty="0"/>
+              <a:t>Does a bigger budget translate to a </a:t>
+            </a:r>
+            <a:br>
+              <a:rPr lang="en-US" dirty="0"/>
+            </a:br>
+            <a:r>
+              <a:rPr lang="en-US" dirty="0"/>
+              <a:t>bigger payday at the Box Office?</a:t>
+            </a:r>
+          </a:p>
+        </p:txBody>
+      </p:sp>
+      <p:pic>
+        <p:nvPicPr>
+          <p:cNvPr id="6" name="Content Placeholder 5">
             <a:extLst>
               <a:ext uri="{FF2B5EF4-FFF2-40B4-BE49-F238E27FC236}">
-                <a16:creationId xmlns:a16="http://schemas.microsoft.com/office/drawing/2014/main" id="{12467DB6-0126-47B9-8E01-C38BAC1C80F1}"/>
+                <a16:creationId xmlns:a16="http://schemas.microsoft.com/office/drawing/2014/main" id="{F79BAEDC-45FE-4540-9DA9-06AD80D646F7}"/>
               </a:ext>
             </a:extLst>
           </p:cNvPr>
-          <p:cNvSpPr>
-            <a:spLocks noGrp="1"/>
-          </p:cNvSpPr>
+          <p:cNvPicPr>
+            <a:picLocks noGrp="1" noChangeAspect="1"/>
+          </p:cNvPicPr>
           <p:nvPr>
             <p:ph sz="quarter" idx="14"/>
           </p:nvPr>
-        </p:nvSpPr>
-        <p:spPr/>
-        <p:txBody>
-          <a:bodyPr/>
-          <a:lstStyle/>
-          <a:p>
+        </p:nvPicPr>
+        <p:blipFill>
+          <a:blip r:embed="rId3"/>
+          <a:stretch>
+            <a:fillRect/>
+          </a:stretch>
+        </p:blipFill>
+        <p:spPr>
+          <a:xfrm>
+            <a:off x="5210979" y="672164"/>
+            <a:ext cx="6439909" cy="4602301"/>
+          </a:xfrm>
+        </p:spPr>
+      </p:pic>
+      <p:sp>
+        <p:nvSpPr>
+          <p:cNvPr id="20" name="Content Placeholder 2">
+            <a:extLst>
+              <a:ext uri="{FF2B5EF4-FFF2-40B4-BE49-F238E27FC236}">
+                <a16:creationId xmlns:a16="http://schemas.microsoft.com/office/drawing/2014/main" id="{E9F75C6F-4B4E-4291-B992-231B1A53AE31}"/>
+              </a:ext>
+            </a:extLst>
+          </p:cNvPr>
+          <p:cNvSpPr txBox="1">
+            <a:spLocks/>
+          </p:cNvSpPr>
+          <p:nvPr/>
+        </p:nvSpPr>
+        <p:spPr>
+          <a:xfrm>
+            <a:off x="1586429" y="4091327"/>
+            <a:ext cx="2865034" cy="1009618"/>
+          </a:xfrm>
+          <a:prstGeom prst="rect">
+            <a:avLst/>
+          </a:prstGeom>
+        </p:spPr>
+        <p:txBody>
+          <a:bodyPr vert="horz" lIns="91440" tIns="45720" rIns="91440" bIns="45720" rtlCol="0" anchor="t">
+            <a:normAutofit/>
+          </a:bodyPr>
+          <a:lstStyle>
+            <a:lvl1pPr marL="228600" indent="-228600" algn="l" defTabSz="914400" rtl="0" eaLnBrk="1" latinLnBrk="0" hangingPunct="1">
+              <a:lnSpc>
+                <a:spcPct val="120000"/>
+              </a:lnSpc>
+              <a:spcBef>
+                <a:spcPts val="1000"/>
+              </a:spcBef>
+              <a:buClr>
+                <a:schemeClr val="accent1"/>
+              </a:buClr>
+              <a:buSzPct val="160000"/>
+              <a:buFont typeface="Arial" panose="020B0604020202020204" pitchFamily="34" charset="0"/>
+              <a:buChar char="•"/>
+              <a:defRPr sz="2000" kern="1200" cap="all" baseline="0">
+                <a:solidFill>
+                  <a:schemeClr val="tx1"/>
+                </a:solidFill>
+                <a:effectLst/>
+                <a:latin typeface="+mn-lt"/>
+                <a:ea typeface="+mn-ea"/>
+                <a:cs typeface="+mn-cs"/>
+              </a:defRPr>
+            </a:lvl1pPr>
+            <a:lvl2pPr marL="685800" indent="-228600" algn="l" defTabSz="914400" rtl="0" eaLnBrk="1" latinLnBrk="0" hangingPunct="1">
+              <a:lnSpc>
+                <a:spcPct val="120000"/>
+              </a:lnSpc>
+              <a:spcBef>
+                <a:spcPts val="500"/>
+              </a:spcBef>
+              <a:buClr>
+                <a:schemeClr val="accent1"/>
+              </a:buClr>
+              <a:buSzPct val="160000"/>
+              <a:buFont typeface="Arial" panose="020B0604020202020204" pitchFamily="34" charset="0"/>
+              <a:buChar char="•"/>
+              <a:defRPr sz="1800" kern="1200" cap="all" baseline="0">
+                <a:solidFill>
+                  <a:schemeClr val="tx1"/>
+                </a:solidFill>
+                <a:effectLst/>
+                <a:latin typeface="+mn-lt"/>
+                <a:ea typeface="+mn-ea"/>
+                <a:cs typeface="+mn-cs"/>
+              </a:defRPr>
+            </a:lvl2pPr>
+            <a:lvl3pPr marL="1143000" indent="-228600" algn="l" defTabSz="914400" rtl="0" eaLnBrk="1" latinLnBrk="0" hangingPunct="1">
+              <a:lnSpc>
+                <a:spcPct val="120000"/>
+              </a:lnSpc>
+              <a:spcBef>
+                <a:spcPts val="500"/>
+              </a:spcBef>
+              <a:buClr>
+                <a:schemeClr val="accent1"/>
+              </a:buClr>
+              <a:buSzPct val="160000"/>
+              <a:buFont typeface="Arial" panose="020B0604020202020204" pitchFamily="34" charset="0"/>
+              <a:buChar char="•"/>
+              <a:defRPr sz="1600" kern="1200" cap="all" baseline="0">
+                <a:solidFill>
+                  <a:schemeClr val="tx1"/>
+                </a:solidFill>
+                <a:effectLst/>
+                <a:latin typeface="+mn-lt"/>
+                <a:ea typeface="+mn-ea"/>
+                <a:cs typeface="+mn-cs"/>
+              </a:defRPr>
+            </a:lvl3pPr>
+            <a:lvl4pPr marL="1600200" indent="-228600" algn="l" defTabSz="914400" rtl="0" eaLnBrk="1" latinLnBrk="0" hangingPunct="1">
+              <a:lnSpc>
+                <a:spcPct val="120000"/>
+              </a:lnSpc>
+              <a:spcBef>
+                <a:spcPts val="500"/>
+              </a:spcBef>
+              <a:buClr>
+                <a:schemeClr val="accent1"/>
+              </a:buClr>
+              <a:buSzPct val="160000"/>
+              <a:buFont typeface="Arial" panose="020B0604020202020204" pitchFamily="34" charset="0"/>
+              <a:buChar char="•"/>
+              <a:defRPr sz="1400" kern="1200" cap="all" baseline="0">
+                <a:solidFill>
+                  <a:schemeClr val="tx1"/>
+                </a:solidFill>
+                <a:effectLst/>
+                <a:latin typeface="+mn-lt"/>
+                <a:ea typeface="+mn-ea"/>
+                <a:cs typeface="+mn-cs"/>
+              </a:defRPr>
+            </a:lvl4pPr>
+            <a:lvl5pPr marL="2057400" indent="-228600" algn="l" defTabSz="914400" rtl="0" eaLnBrk="1" latinLnBrk="0" hangingPunct="1">
+              <a:lnSpc>
+                <a:spcPct val="120000"/>
+              </a:lnSpc>
+              <a:spcBef>
+                <a:spcPts val="500"/>
+              </a:spcBef>
+              <a:buClr>
+                <a:schemeClr val="accent1"/>
+              </a:buClr>
+              <a:buSzPct val="160000"/>
+              <a:buFont typeface="Arial" panose="020B0604020202020204" pitchFamily="34" charset="0"/>
+              <a:buChar char="•"/>
+              <a:defRPr sz="1400" kern="1200" cap="all" baseline="0">
+                <a:solidFill>
+                  <a:schemeClr val="tx1"/>
+                </a:solidFill>
+                <a:effectLst/>
+                <a:latin typeface="+mn-lt"/>
+                <a:ea typeface="+mn-ea"/>
+                <a:cs typeface="+mn-cs"/>
+              </a:defRPr>
+            </a:lvl5pPr>
+            <a:lvl6pPr marL="2514600" indent="-228600" algn="l" defTabSz="914400" rtl="0" eaLnBrk="1" latinLnBrk="0" hangingPunct="1">
+              <a:lnSpc>
+                <a:spcPct val="120000"/>
+              </a:lnSpc>
+              <a:spcBef>
+                <a:spcPts val="500"/>
+              </a:spcBef>
+              <a:buClr>
+                <a:schemeClr val="accent1"/>
+              </a:buClr>
+              <a:buSzPct val="160000"/>
+              <a:buFont typeface="Arial" panose="020B0604020202020204" pitchFamily="34" charset="0"/>
+              <a:buChar char="•"/>
+              <a:defRPr sz="1400" kern="1200" cap="all" baseline="0">
+                <a:solidFill>
+                  <a:schemeClr val="tx1"/>
+                </a:solidFill>
+                <a:effectLst/>
+                <a:latin typeface="+mn-lt"/>
+                <a:ea typeface="+mn-ea"/>
+                <a:cs typeface="+mn-cs"/>
+              </a:defRPr>
+            </a:lvl6pPr>
+            <a:lvl7pPr marL="2971800" indent="-228600" algn="l" defTabSz="914400" rtl="0" eaLnBrk="1" latinLnBrk="0" hangingPunct="1">
+              <a:lnSpc>
+                <a:spcPct val="120000"/>
+              </a:lnSpc>
+              <a:spcBef>
+                <a:spcPts val="500"/>
+              </a:spcBef>
+              <a:buClr>
+                <a:schemeClr val="accent1"/>
+              </a:buClr>
+              <a:buSzPct val="160000"/>
+              <a:buFont typeface="Arial" panose="020B0604020202020204" pitchFamily="34" charset="0"/>
+              <a:buChar char="•"/>
+              <a:defRPr sz="1400" kern="1200" cap="all" baseline="0">
+                <a:solidFill>
+                  <a:schemeClr val="tx1"/>
+                </a:solidFill>
+                <a:effectLst/>
+                <a:latin typeface="+mn-lt"/>
+                <a:ea typeface="+mn-ea"/>
+                <a:cs typeface="+mn-cs"/>
+              </a:defRPr>
+            </a:lvl7pPr>
+            <a:lvl8pPr marL="3429000" indent="-228600" algn="l" defTabSz="914400" rtl="0" eaLnBrk="1" latinLnBrk="0" hangingPunct="1">
+              <a:lnSpc>
+                <a:spcPct val="120000"/>
+              </a:lnSpc>
+              <a:spcBef>
+                <a:spcPts val="500"/>
+              </a:spcBef>
+              <a:buClr>
+                <a:schemeClr val="accent1"/>
+              </a:buClr>
+              <a:buSzPct val="160000"/>
+              <a:buFont typeface="Arial" panose="020B0604020202020204" pitchFamily="34" charset="0"/>
+              <a:buChar char="•"/>
+              <a:defRPr sz="1400" kern="1200" cap="all" baseline="0">
+                <a:solidFill>
+                  <a:schemeClr val="tx1"/>
+                </a:solidFill>
+                <a:effectLst/>
+                <a:latin typeface="+mn-lt"/>
+                <a:ea typeface="+mn-ea"/>
+                <a:cs typeface="+mn-cs"/>
+              </a:defRPr>
+            </a:lvl8pPr>
+            <a:lvl9pPr marL="3886200" indent="-228600" algn="l" defTabSz="914400" rtl="0" eaLnBrk="1" latinLnBrk="0" hangingPunct="1">
+              <a:lnSpc>
+                <a:spcPct val="120000"/>
+              </a:lnSpc>
+              <a:spcBef>
+                <a:spcPts val="500"/>
+              </a:spcBef>
+              <a:buClr>
+                <a:schemeClr val="accent1"/>
+              </a:buClr>
+              <a:buSzPct val="160000"/>
+              <a:buFont typeface="Arial" panose="020B0604020202020204" pitchFamily="34" charset="0"/>
+              <a:buChar char="•"/>
+              <a:defRPr sz="1400" kern="1200" cap="all" baseline="0">
+                <a:solidFill>
+                  <a:schemeClr val="tx1"/>
+                </a:solidFill>
+                <a:effectLst/>
+                <a:latin typeface="+mn-lt"/>
+                <a:ea typeface="+mn-ea"/>
+                <a:cs typeface="+mn-cs"/>
+              </a:defRPr>
+            </a:lvl9pPr>
+          </a:lstStyle>
+          <a:p>
+            <a:pPr marL="0" indent="0" algn="r">
+              <a:buFont typeface="Arial" panose="020B0604020202020204" pitchFamily="34" charset="0"/>
+              <a:buNone/>
+            </a:pPr>
             <a:r>
               <a:rPr lang="en-US" dirty="0"/>
-              <a:t>Facebook is a billion dollar business but does the number of likes on a Movie Facebook page correlate to more Gross Revenue?</a:t>
+              <a:t>. . . Well, Not Always.</a:t>
             </a:r>
           </a:p>
         </p:txBody>
@@ -7845,13 +10155,144 @@
     </p:spTree>
     <p:extLst>
       <p:ext uri="{BB962C8B-B14F-4D97-AF65-F5344CB8AC3E}">
-        <p14:creationId xmlns:p14="http://schemas.microsoft.com/office/powerpoint/2010/main" val="377932690"/>
+        <p14:creationId xmlns:p14="http://schemas.microsoft.com/office/powerpoint/2010/main" val="4274631436"/>
       </p:ext>
     </p:extLst>
   </p:cSld>
   <p:clrMapOvr>
     <a:masterClrMapping/>
   </p:clrMapOvr>
+  <p:timing>
+    <p:tnLst>
+      <p:par>
+        <p:cTn id="1" dur="indefinite" restart="never" nodeType="tmRoot">
+          <p:childTnLst>
+            <p:seq concurrent="1" nextAc="seek">
+              <p:cTn id="2" dur="indefinite" nodeType="mainSeq">
+                <p:childTnLst>
+                  <p:par>
+                    <p:cTn id="3" fill="hold">
+                      <p:stCondLst>
+                        <p:cond delay="indefinite"/>
+                      </p:stCondLst>
+                      <p:childTnLst>
+                        <p:par>
+                          <p:cTn id="4" fill="hold">
+                            <p:stCondLst>
+                              <p:cond delay="0"/>
+                            </p:stCondLst>
+                            <p:childTnLst>
+                              <p:par>
+                                <p:cTn id="5" presetID="1" presetClass="entr" presetSubtype="0" fill="hold" nodeType="clickEffect">
+                                  <p:stCondLst>
+                                    <p:cond delay="0"/>
+                                  </p:stCondLst>
+                                  <p:childTnLst>
+                                    <p:set>
+                                      <p:cBhvr>
+                                        <p:cTn id="6" dur="1" fill="hold">
+                                          <p:stCondLst>
+                                            <p:cond delay="0"/>
+                                          </p:stCondLst>
+                                        </p:cTn>
+                                        <p:tgtEl>
+                                          <p:spTgt spid="6"/>
+                                        </p:tgtEl>
+                                        <p:attrNameLst>
+                                          <p:attrName>style.visibility</p:attrName>
+                                        </p:attrNameLst>
+                                      </p:cBhvr>
+                                      <p:to>
+                                        <p:strVal val="visible"/>
+                                      </p:to>
+                                    </p:set>
+                                  </p:childTnLst>
+                                </p:cTn>
+                              </p:par>
+                            </p:childTnLst>
+                          </p:cTn>
+                        </p:par>
+                      </p:childTnLst>
+                    </p:cTn>
+                  </p:par>
+                  <p:par>
+                    <p:cTn id="7" fill="hold">
+                      <p:stCondLst>
+                        <p:cond delay="indefinite"/>
+                      </p:stCondLst>
+                      <p:childTnLst>
+                        <p:par>
+                          <p:cTn id="8" fill="hold">
+                            <p:stCondLst>
+                              <p:cond delay="0"/>
+                            </p:stCondLst>
+                            <p:childTnLst>
+                              <p:par>
+                                <p:cTn id="9" presetID="10" presetClass="entr" presetSubtype="0" fill="hold" grpId="0" nodeType="clickEffect">
+                                  <p:stCondLst>
+                                    <p:cond delay="0"/>
+                                  </p:stCondLst>
+                                  <p:childTnLst>
+                                    <p:set>
+                                      <p:cBhvr>
+                                        <p:cTn id="10" dur="1" fill="hold">
+                                          <p:stCondLst>
+                                            <p:cond delay="0"/>
+                                          </p:stCondLst>
+                                        </p:cTn>
+                                        <p:tgtEl>
+                                          <p:spTgt spid="20"/>
+                                        </p:tgtEl>
+                                        <p:attrNameLst>
+                                          <p:attrName>style.visibility</p:attrName>
+                                        </p:attrNameLst>
+                                      </p:cBhvr>
+                                      <p:to>
+                                        <p:strVal val="visible"/>
+                                      </p:to>
+                                    </p:set>
+                                    <p:animEffect transition="in" filter="fade">
+                                      <p:cBhvr>
+                                        <p:cTn id="11" dur="500"/>
+                                        <p:tgtEl>
+                                          <p:spTgt spid="20"/>
+                                        </p:tgtEl>
+                                      </p:cBhvr>
+                                    </p:animEffect>
+                                  </p:childTnLst>
+                                </p:cTn>
+                              </p:par>
+                            </p:childTnLst>
+                          </p:cTn>
+                        </p:par>
+                      </p:childTnLst>
+                    </p:cTn>
+                  </p:par>
+                </p:childTnLst>
+              </p:cTn>
+              <p:prevCondLst>
+                <p:cond evt="onPrev" delay="0">
+                  <p:tgtEl>
+                    <p:sldTgt/>
+                  </p:tgtEl>
+                </p:cond>
+              </p:prevCondLst>
+              <p:nextCondLst>
+                <p:cond evt="onNext" delay="0">
+                  <p:tgtEl>
+                    <p:sldTgt/>
+                  </p:tgtEl>
+                </p:cond>
+              </p:nextCondLst>
+            </p:seq>
+          </p:childTnLst>
+        </p:cTn>
+      </p:par>
+    </p:tnLst>
+    <p:bldLst>
+      <p:bldP spid="20" grpId="0"/>
+    </p:bldLst>
+  </p:timing>
 </p:sld>
 </file>
 
@@ -7877,6 +10318,209 @@
           <p:cNvPr id="2" name="Title 1">
             <a:extLst>
               <a:ext uri="{FF2B5EF4-FFF2-40B4-BE49-F238E27FC236}">
+                <a16:creationId xmlns:a16="http://schemas.microsoft.com/office/drawing/2014/main" id="{E2E2F591-D63D-4B4C-BA61-D3AD551C9A6C}"/>
+              </a:ext>
+            </a:extLst>
+          </p:cNvPr>
+          <p:cNvSpPr>
+            <a:spLocks noGrp="1"/>
+          </p:cNvSpPr>
+          <p:nvPr>
+            <p:ph type="title"/>
+          </p:nvPr>
+        </p:nvSpPr>
+        <p:spPr>
+          <a:xfrm>
+            <a:off x="5781908" y="607742"/>
+            <a:ext cx="6172199" cy="1158140"/>
+          </a:xfrm>
+        </p:spPr>
+        <p:txBody>
+          <a:bodyPr/>
+          <a:lstStyle/>
+          <a:p>
+            <a:r>
+              <a:rPr lang="en-US" dirty="0"/>
+              <a:t>Like us on Facebook</a:t>
+            </a:r>
+          </a:p>
+        </p:txBody>
+      </p:sp>
+      <p:pic>
+        <p:nvPicPr>
+          <p:cNvPr id="6" name="Content Placeholder 5" descr="A close up of text on a white background&#10;&#10;Description generated with very high confidence">
+            <a:extLst>
+              <a:ext uri="{FF2B5EF4-FFF2-40B4-BE49-F238E27FC236}">
+                <a16:creationId xmlns:a16="http://schemas.microsoft.com/office/drawing/2014/main" id="{EF64E628-5CE7-4388-A7DF-3D20D7E29071}"/>
+              </a:ext>
+            </a:extLst>
+          </p:cNvPr>
+          <p:cNvPicPr>
+            <a:picLocks noGrp="1" noChangeAspect="1"/>
+          </p:cNvPicPr>
+          <p:nvPr>
+            <p:ph sz="quarter" idx="13"/>
+          </p:nvPr>
+        </p:nvPicPr>
+        <p:blipFill>
+          <a:blip r:embed="rId3"/>
+          <a:stretch>
+            <a:fillRect/>
+          </a:stretch>
+        </p:blipFill>
+        <p:spPr>
+          <a:xfrm>
+            <a:off x="0" y="1186812"/>
+            <a:ext cx="6264114" cy="4431512"/>
+          </a:xfrm>
+        </p:spPr>
+      </p:pic>
+      <p:sp>
+        <p:nvSpPr>
+          <p:cNvPr id="4" name="Content Placeholder 3">
+            <a:extLst>
+              <a:ext uri="{FF2B5EF4-FFF2-40B4-BE49-F238E27FC236}">
+                <a16:creationId xmlns:a16="http://schemas.microsoft.com/office/drawing/2014/main" id="{12467DB6-0126-47B9-8E01-C38BAC1C80F1}"/>
+              </a:ext>
+            </a:extLst>
+          </p:cNvPr>
+          <p:cNvSpPr>
+            <a:spLocks noGrp="1"/>
+          </p:cNvSpPr>
+          <p:nvPr>
+            <p:ph sz="quarter" idx="14"/>
+          </p:nvPr>
+        </p:nvSpPr>
+        <p:spPr>
+          <a:xfrm>
+            <a:off x="6287865" y="2241817"/>
+            <a:ext cx="5086538" cy="1772624"/>
+          </a:xfrm>
+        </p:spPr>
+        <p:txBody>
+          <a:bodyPr/>
+          <a:lstStyle/>
+          <a:p>
+            <a:pPr marL="0" indent="0" algn="r">
+              <a:buNone/>
+            </a:pPr>
+            <a:r>
+              <a:rPr lang="en-US" dirty="0"/>
+              <a:t>Facebook is a billion dollar business but does the number of likes on a Movie Facebook page correlate to more Gross Revenue?</a:t>
+            </a:r>
+          </a:p>
+        </p:txBody>
+      </p:sp>
+    </p:spTree>
+    <p:extLst>
+      <p:ext uri="{BB962C8B-B14F-4D97-AF65-F5344CB8AC3E}">
+        <p14:creationId xmlns:p14="http://schemas.microsoft.com/office/powerpoint/2010/main" val="377932690"/>
+      </p:ext>
+    </p:extLst>
+  </p:cSld>
+  <p:clrMapOvr>
+    <a:masterClrMapping/>
+  </p:clrMapOvr>
+  <p:timing>
+    <p:tnLst>
+      <p:par>
+        <p:cTn id="1" dur="indefinite" restart="never" nodeType="tmRoot">
+          <p:childTnLst>
+            <p:seq concurrent="1" nextAc="seek">
+              <p:cTn id="2" dur="indefinite" nodeType="mainSeq">
+                <p:childTnLst>
+                  <p:par>
+                    <p:cTn id="3" fill="hold">
+                      <p:stCondLst>
+                        <p:cond delay="indefinite"/>
+                      </p:stCondLst>
+                      <p:childTnLst>
+                        <p:par>
+                          <p:cTn id="4" fill="hold">
+                            <p:stCondLst>
+                              <p:cond delay="0"/>
+                            </p:stCondLst>
+                            <p:childTnLst>
+                              <p:par>
+                                <p:cTn id="5" presetID="1" presetClass="entr" presetSubtype="0" fill="hold" nodeType="clickEffect">
+                                  <p:stCondLst>
+                                    <p:cond delay="0"/>
+                                  </p:stCondLst>
+                                  <p:childTnLst>
+                                    <p:set>
+                                      <p:cBhvr>
+                                        <p:cTn id="6" dur="1" fill="hold">
+                                          <p:stCondLst>
+                                            <p:cond delay="0"/>
+                                          </p:stCondLst>
+                                        </p:cTn>
+                                        <p:tgtEl>
+                                          <p:spTgt spid="6"/>
+                                        </p:tgtEl>
+                                        <p:attrNameLst>
+                                          <p:attrName>style.visibility</p:attrName>
+                                        </p:attrNameLst>
+                                      </p:cBhvr>
+                                      <p:to>
+                                        <p:strVal val="visible"/>
+                                      </p:to>
+                                    </p:set>
+                                  </p:childTnLst>
+                                </p:cTn>
+                              </p:par>
+                            </p:childTnLst>
+                          </p:cTn>
+                        </p:par>
+                      </p:childTnLst>
+                    </p:cTn>
+                  </p:par>
+                </p:childTnLst>
+              </p:cTn>
+              <p:prevCondLst>
+                <p:cond evt="onPrev" delay="0">
+                  <p:tgtEl>
+                    <p:sldTgt/>
+                  </p:tgtEl>
+                </p:cond>
+              </p:prevCondLst>
+              <p:nextCondLst>
+                <p:cond evt="onNext" delay="0">
+                  <p:tgtEl>
+                    <p:sldTgt/>
+                  </p:tgtEl>
+                </p:cond>
+              </p:nextCondLst>
+            </p:seq>
+          </p:childTnLst>
+        </p:cTn>
+      </p:par>
+    </p:tnLst>
+  </p:timing>
+</p:sld>
+</file>
+
+<file path=ppt/slides/slide9.xml><?xml version="1.0" encoding="utf-8"?>
+<p:sld xmlns:a="http://schemas.openxmlformats.org/drawingml/2006/main" xmlns:r="http://schemas.openxmlformats.org/officeDocument/2006/relationships" xmlns:p="http://schemas.openxmlformats.org/presentationml/2006/main">
+  <p:cSld>
+    <p:spTree>
+      <p:nvGrpSpPr>
+        <p:cNvPr id="1" name=""/>
+        <p:cNvGrpSpPr/>
+        <p:nvPr/>
+      </p:nvGrpSpPr>
+      <p:grpSpPr>
+        <a:xfrm>
+          <a:off x="0" y="0"/>
+          <a:ext cx="0" cy="0"/>
+          <a:chOff x="0" y="0"/>
+          <a:chExt cx="0" cy="0"/>
+        </a:xfrm>
+      </p:grpSpPr>
+      <p:sp>
+        <p:nvSpPr>
+          <p:cNvPr id="2" name="Title 1">
+            <a:extLst>
+              <a:ext uri="{FF2B5EF4-FFF2-40B4-BE49-F238E27FC236}">
                 <a16:creationId xmlns:a16="http://schemas.microsoft.com/office/drawing/2014/main" id="{236C88B5-D1A0-4B7D-BC80-BA0050016305}"/>
               </a:ext>
             </a:extLst>
@@ -7888,16 +10532,28 @@
             <p:ph type="title"/>
           </p:nvPr>
         </p:nvSpPr>
-        <p:spPr/>
+        <p:spPr>
+          <a:xfrm>
+            <a:off x="366312" y="421395"/>
+            <a:ext cx="10396882" cy="1594692"/>
+          </a:xfrm>
+        </p:spPr>
         <p:txBody>
           <a:bodyPr>
-            <a:normAutofit fontScale="90000"/>
+            <a:normAutofit/>
           </a:bodyPr>
           <a:lstStyle/>
           <a:p>
             <a:r>
               <a:rPr lang="en-US" dirty="0"/>
-              <a:t>Superhero Movies are Nearly  a Genre</a:t>
+              <a:t>Superhero Movies </a:t>
+            </a:r>
+            <a:br>
+              <a:rPr lang="en-US" dirty="0"/>
+            </a:br>
+            <a:r>
+              <a:rPr lang="en-US" dirty="0"/>
+              <a:t>are a Genre</a:t>
             </a:r>
           </a:p>
         </p:txBody>
@@ -7918,17 +10574,28 @@
             <p:ph sz="quarter" idx="13"/>
           </p:nvPr>
         </p:nvSpPr>
-        <p:spPr/>
+        <p:spPr>
+          <a:xfrm>
+            <a:off x="289193" y="2614614"/>
+            <a:ext cx="5088714" cy="3311189"/>
+          </a:xfrm>
+        </p:spPr>
         <p:txBody>
           <a:bodyPr/>
           <a:lstStyle/>
           <a:p>
+            <a:pPr marL="0" indent="0">
+              <a:buNone/>
+            </a:pPr>
             <a:r>
               <a:rPr lang="en-US" dirty="0"/>
               <a:t>Do Certain genres rate higher on IMDB?</a:t>
             </a:r>
           </a:p>
           <a:p>
+            <a:pPr marL="0" indent="0">
+              <a:buNone/>
+            </a:pPr>
             <a:r>
               <a:rPr lang="en-US" dirty="0"/>
               <a:t>Do the higher rated genres have fewer individual voters?</a:t>
@@ -7936,31 +10603,35 @@
           </a:p>
         </p:txBody>
       </p:sp>
-      <p:sp>
-        <p:nvSpPr>
-          <p:cNvPr id="4" name="Content Placeholder 3">
+      <p:pic>
+        <p:nvPicPr>
+          <p:cNvPr id="6" name="Content Placeholder 5">
             <a:extLst>
               <a:ext uri="{FF2B5EF4-FFF2-40B4-BE49-F238E27FC236}">
-                <a16:creationId xmlns:a16="http://schemas.microsoft.com/office/drawing/2014/main" id="{5B3AC972-AB7C-40B9-94EB-A686CEAFDF0A}"/>
+                <a16:creationId xmlns:a16="http://schemas.microsoft.com/office/drawing/2014/main" id="{1F1C2F8B-A979-4F25-9871-0BBA34D98D3F}"/>
               </a:ext>
             </a:extLst>
           </p:cNvPr>
-          <p:cNvSpPr>
-            <a:spLocks noGrp="1"/>
-          </p:cNvSpPr>
+          <p:cNvPicPr>
+            <a:picLocks noGrp="1" noChangeAspect="1"/>
+          </p:cNvPicPr>
           <p:nvPr>
             <p:ph sz="quarter" idx="14"/>
           </p:nvPr>
-        </p:nvSpPr>
-        <p:spPr/>
-        <p:txBody>
-          <a:bodyPr/>
-          <a:lstStyle/>
-          <a:p>
-            <a:endParaRPr lang="en-US"/>
-          </a:p>
-        </p:txBody>
-      </p:sp>
+        </p:nvPicPr>
+        <p:blipFill>
+          <a:blip r:embed="rId2"/>
+          <a:stretch>
+            <a:fillRect/>
+          </a:stretch>
+        </p:blipFill>
+        <p:spPr>
+          <a:xfrm>
+            <a:off x="4821812" y="1017168"/>
+            <a:ext cx="6794556" cy="4544704"/>
+          </a:xfrm>
+        </p:spPr>
+      </p:pic>
     </p:spTree>
     <p:extLst>
       <p:ext uri="{BB962C8B-B14F-4D97-AF65-F5344CB8AC3E}">
@@ -7971,6 +10642,81 @@
   <p:clrMapOvr>
     <a:masterClrMapping/>
   </p:clrMapOvr>
+  <p:timing>
+    <p:tnLst>
+      <p:par>
+        <p:cTn id="1" dur="indefinite" restart="never" nodeType="tmRoot">
+          <p:childTnLst>
+            <p:seq concurrent="1" nextAc="seek">
+              <p:cTn id="2" dur="indefinite" nodeType="mainSeq">
+                <p:childTnLst>
+                  <p:par>
+                    <p:cTn id="3" fill="hold">
+                      <p:stCondLst>
+                        <p:cond delay="indefinite"/>
+                      </p:stCondLst>
+                      <p:childTnLst>
+                        <p:par>
+                          <p:cTn id="4" fill="hold">
+                            <p:stCondLst>
+                              <p:cond delay="0"/>
+                            </p:stCondLst>
+                            <p:childTnLst>
+                              <p:par>
+                                <p:cTn id="5" presetID="1" presetClass="entr" presetSubtype="0" fill="hold" nodeType="clickEffect">
+                                  <p:stCondLst>
+                                    <p:cond delay="0"/>
+                                  </p:stCondLst>
+                                  <p:childTnLst>
+                                    <p:set>
+                                      <p:cBhvr>
+                                        <p:cTn id="6" dur="1" fill="hold">
+                                          <p:stCondLst>
+                                            <p:cond delay="0"/>
+                                          </p:stCondLst>
+                                        </p:cTn>
+                                        <p:tgtEl>
+                                          <p:spTgt spid="6"/>
+                                        </p:tgtEl>
+                                        <p:attrNameLst>
+                                          <p:attrName>style.visibility</p:attrName>
+                                        </p:attrNameLst>
+                                      </p:cBhvr>
+                                      <p:to>
+                                        <p:strVal val="visible"/>
+                                      </p:to>
+                                    </p:set>
+                                  </p:childTnLst>
+                                </p:cTn>
+                              </p:par>
+                            </p:childTnLst>
+                          </p:cTn>
+                        </p:par>
+                      </p:childTnLst>
+                    </p:cTn>
+                  </p:par>
+                </p:childTnLst>
+              </p:cTn>
+              <p:prevCondLst>
+                <p:cond evt="onPrev" delay="0">
+                  <p:tgtEl>
+                    <p:sldTgt/>
+                  </p:tgtEl>
+                </p:cond>
+              </p:prevCondLst>
+              <p:nextCondLst>
+                <p:cond evt="onNext" delay="0">
+                  <p:tgtEl>
+                    <p:sldTgt/>
+                  </p:tgtEl>
+                </p:cond>
+              </p:nextCondLst>
+            </p:seq>
+          </p:childTnLst>
+        </p:cTn>
+      </p:par>
+    </p:tnLst>
+  </p:timing>
 </p:sld>
 </file>
 

</xml_diff>

<commit_message>
PP still has to be finished
</commit_message>
<xml_diff>
--- a/Movie PP.pptx
+++ b/Movie PP.pptx
@@ -262,7 +262,7 @@
           <a:p>
             <a:fld id="{8C131F1C-F2D8-4C30-9616-DDF80984660A}" type="datetimeFigureOut">
               <a:rPr lang="en-US" smtClean="0"/>
-              <a:t>11/2/2018</a:t>
+              <a:t>11/3/2018</a:t>
             </a:fld>
             <a:endParaRPr lang="en-US"/>
           </a:p>
@@ -1972,7 +1972,7 @@
           <a:p>
             <a:fld id="{F7AFFB9B-9FB8-469E-96F9-4D32314110B6}" type="datetimeFigureOut">
               <a:rPr lang="en-US" dirty="0"/>
-              <a:t>11/2/2018</a:t>
+              <a:t>11/3/2018</a:t>
             </a:fld>
             <a:endParaRPr lang="en-US" dirty="0"/>
           </a:p>
@@ -2300,7 +2300,7 @@
           <a:p>
             <a:fld id="{341D2AC3-6A0B-4169-B1EA-E3AE8B351BDD}" type="datetimeFigureOut">
               <a:rPr lang="en-US" dirty="0"/>
-              <a:t>11/2/2018</a:t>
+              <a:t>11/3/2018</a:t>
             </a:fld>
             <a:endParaRPr lang="en-US" dirty="0"/>
           </a:p>
@@ -2491,7 +2491,7 @@
           <a:p>
             <a:fld id="{DD4B9363-8B87-41B7-9F8E-64519CBB8F34}" type="datetimeFigureOut">
               <a:rPr lang="en-US" dirty="0"/>
-              <a:t>11/2/2018</a:t>
+              <a:t>11/3/2018</a:t>
             </a:fld>
             <a:endParaRPr lang="en-US" dirty="0"/>
           </a:p>
@@ -2756,7 +2756,7 @@
           <a:p>
             <a:fld id="{EAEF5746-5284-4951-9F37-7AE924EDBCB7}" type="datetimeFigureOut">
               <a:rPr lang="en-US" dirty="0"/>
-              <a:t>11/2/2018</a:t>
+              <a:t>11/3/2018</a:t>
             </a:fld>
             <a:endParaRPr lang="en-US" dirty="0"/>
           </a:p>
@@ -3179,7 +3179,7 @@
           <a:p>
             <a:fld id="{02398B29-7265-4A65-A2A4-6703C057B7C1}" type="datetimeFigureOut">
               <a:rPr lang="en-US" dirty="0"/>
-              <a:t>11/2/2018</a:t>
+              <a:t>11/3/2018</a:t>
             </a:fld>
             <a:endParaRPr lang="en-US" dirty="0"/>
           </a:p>
@@ -3724,7 +3724,7 @@
           <a:p>
             <a:fld id="{28FBA082-94DF-4C4B-A041-6624924AB0A8}" type="datetimeFigureOut">
               <a:rPr lang="en-US" dirty="0"/>
-              <a:t>11/2/2018</a:t>
+              <a:t>11/3/2018</a:t>
             </a:fld>
             <a:endParaRPr lang="en-US" dirty="0"/>
           </a:p>
@@ -4509,7 +4509,7 @@
           <a:p>
             <a:fld id="{B27686C4-3AB5-4E0C-86CA-FB108C350AA9}" type="datetimeFigureOut">
               <a:rPr lang="en-US" dirty="0"/>
-              <a:t>11/2/2018</a:t>
+              <a:t>11/3/2018</a:t>
             </a:fld>
             <a:endParaRPr lang="en-US" dirty="0"/>
           </a:p>
@@ -4683,7 +4683,7 @@
           <a:p>
             <a:fld id="{49FF1211-4E0C-4AB3-B04F-585959BDAFE8}" type="datetimeFigureOut">
               <a:rPr lang="en-US" dirty="0"/>
-              <a:t>11/2/2018</a:t>
+              <a:t>11/3/2018</a:t>
             </a:fld>
             <a:endParaRPr lang="en-US" dirty="0"/>
           </a:p>
@@ -4862,7 +4862,7 @@
           <a:p>
             <a:fld id="{28BDECAF-D3BE-4069-9C78-642ECCD01477}" type="datetimeFigureOut">
               <a:rPr lang="en-US" dirty="0"/>
-              <a:t>11/2/2018</a:t>
+              <a:t>11/3/2018</a:t>
             </a:fld>
             <a:endParaRPr lang="en-US" dirty="0"/>
           </a:p>
@@ -5032,7 +5032,7 @@
           <a:p>
             <a:fld id="{8EFBDC27-E420-4878-9EE6-7B9656D6442A}" type="datetimeFigureOut">
               <a:rPr lang="en-US" dirty="0"/>
-              <a:t>11/2/2018</a:t>
+              <a:t>11/3/2018</a:t>
             </a:fld>
             <a:endParaRPr lang="en-US" dirty="0"/>
           </a:p>
@@ -5277,7 +5277,7 @@
           <a:p>
             <a:fld id="{0F7F47CF-67C9-420C-80A5-E2069FF0C2DF}" type="datetimeFigureOut">
               <a:rPr lang="en-US" dirty="0"/>
-              <a:t>11/2/2018</a:t>
+              <a:t>11/3/2018</a:t>
             </a:fld>
             <a:endParaRPr lang="en-US" dirty="0"/>
           </a:p>
@@ -5509,7 +5509,7 @@
           <a:p>
             <a:fld id="{AE22DC73-F065-42F5-A9F2-D90B2E42A0B3}" type="datetimeFigureOut">
               <a:rPr lang="en-US" dirty="0"/>
-              <a:t>11/2/2018</a:t>
+              <a:t>11/3/2018</a:t>
             </a:fld>
             <a:endParaRPr lang="en-US" dirty="0"/>
           </a:p>
@@ -5889,7 +5889,7 @@
           <a:p>
             <a:fld id="{76BEA702-9B29-41CC-9BCC-3DF8A0D379FE}" type="datetimeFigureOut">
               <a:rPr lang="en-US" dirty="0"/>
-              <a:t>11/2/2018</a:t>
+              <a:t>11/3/2018</a:t>
             </a:fld>
             <a:endParaRPr lang="en-US" dirty="0"/>
           </a:p>
@@ -6002,7 +6002,7 @@
           <a:p>
             <a:fld id="{097649AC-CB8F-4FF1-9A34-5861C74DD0A7}" type="datetimeFigureOut">
               <a:rPr lang="en-US" dirty="0"/>
-              <a:t>11/2/2018</a:t>
+              <a:t>11/3/2018</a:t>
             </a:fld>
             <a:endParaRPr lang="en-US" dirty="0"/>
           </a:p>
@@ -6092,7 +6092,7 @@
           <a:p>
             <a:fld id="{3EC5CECA-2D3A-4680-9B49-752200DE467C}" type="datetimeFigureOut">
               <a:rPr lang="en-US" dirty="0"/>
-              <a:t>11/2/2018</a:t>
+              <a:t>11/3/2018</a:t>
             </a:fld>
             <a:endParaRPr lang="en-US" dirty="0"/>
           </a:p>
@@ -6340,7 +6340,7 @@
           <a:p>
             <a:fld id="{50C3BFE2-83B7-4B0A-B9D3-AB28331082B3}" type="datetimeFigureOut">
               <a:rPr lang="en-US" dirty="0"/>
-              <a:t>11/2/2018</a:t>
+              <a:t>11/3/2018</a:t>
             </a:fld>
             <a:endParaRPr lang="en-US" dirty="0"/>
           </a:p>
@@ -6604,7 +6604,7 @@
           <a:p>
             <a:fld id="{12EF78E3-FDA3-4D28-AAA2-0B81F349A39D}" type="datetimeFigureOut">
               <a:rPr lang="en-US" dirty="0"/>
-              <a:t>11/2/2018</a:t>
+              <a:t>11/3/2018</a:t>
             </a:fld>
             <a:endParaRPr lang="en-US" dirty="0"/>
           </a:p>
@@ -7002,7 +7002,7 @@
           <a:p>
             <a:fld id="{C35BB1C6-BF8F-4481-8AB2-603A1C8A906A}" type="datetimeFigureOut">
               <a:rPr lang="en-US" dirty="0"/>
-              <a:t>11/2/2018</a:t>
+              <a:t>11/3/2018</a:t>
             </a:fld>
             <a:endParaRPr lang="en-US" dirty="0"/>
           </a:p>
@@ -7461,7 +7461,7 @@
           <p:cNvPr id="2" name="Title 1">
             <a:extLst>
               <a:ext uri="{FF2B5EF4-FFF2-40B4-BE49-F238E27FC236}">
-                <a16:creationId xmlns:a16="http://schemas.microsoft.com/office/drawing/2014/main" xmlns="" id="{E1860640-9637-49E7-84FC-024E11BDA933}"/>
+                <a16:creationId xmlns:a16="http://schemas.microsoft.com/office/drawing/2014/main" id="{E1860640-9637-49E7-84FC-024E11BDA933}"/>
               </a:ext>
             </a:extLst>
           </p:cNvPr>
@@ -7489,7 +7489,7 @@
           <p:cNvPr id="3" name="Subtitle 2">
             <a:extLst>
               <a:ext uri="{FF2B5EF4-FFF2-40B4-BE49-F238E27FC236}">
-                <a16:creationId xmlns:a16="http://schemas.microsoft.com/office/drawing/2014/main" xmlns="" id="{E52F3ABE-5721-4B58-8B28-96BAD6703EB2}"/>
+                <a16:creationId xmlns:a16="http://schemas.microsoft.com/office/drawing/2014/main" id="{E52F3ABE-5721-4B58-8B28-96BAD6703EB2}"/>
               </a:ext>
             </a:extLst>
           </p:cNvPr>
@@ -7539,13 +7539,6 @@
   <p:clrMapOvr>
     <a:masterClrMapping/>
   </p:clrMapOvr>
-  <p:timing>
-    <p:tnLst>
-      <p:par>
-        <p:cTn id="1" dur="indefinite" restart="never" nodeType="tmRoot"/>
-      </p:par>
-    </p:tnLst>
-  </p:timing>
 </p:sld>
 </file>
 
@@ -7566,70 +7559,12 @@
           <a:chExt cx="0" cy="0"/>
         </a:xfrm>
       </p:grpSpPr>
-      <p:pic>
-        <p:nvPicPr>
-          <p:cNvPr id="8" name="Content Placeholder 7">
-            <a:extLst>
-              <a:ext uri="{FF2B5EF4-FFF2-40B4-BE49-F238E27FC236}">
-                <a16:creationId xmlns:a16="http://schemas.microsoft.com/office/drawing/2014/main" xmlns="" id="{92547338-9C24-4447-8FC1-F31843B42A1B}"/>
-              </a:ext>
-            </a:extLst>
-          </p:cNvPr>
-          <p:cNvPicPr>
-            <a:picLocks noGrp="1" noChangeAspect="1"/>
-          </p:cNvPicPr>
-          <p:nvPr>
-            <p:ph sz="quarter" idx="13"/>
-          </p:nvPr>
-        </p:nvPicPr>
-        <p:blipFill>
-          <a:blip r:embed="rId3"/>
-          <a:stretch>
-            <a:fillRect/>
-          </a:stretch>
-        </p:blipFill>
-        <p:spPr>
-          <a:xfrm>
-            <a:off x="0" y="1372857"/>
-            <a:ext cx="5736751" cy="3837165"/>
-          </a:xfrm>
-        </p:spPr>
-      </p:pic>
-      <p:pic>
-        <p:nvPicPr>
-          <p:cNvPr id="10" name="Content Placeholder 9" descr="A close up of a logo&#10;&#10;Description generated with very high confidence">
-            <a:extLst>
-              <a:ext uri="{FF2B5EF4-FFF2-40B4-BE49-F238E27FC236}">
-                <a16:creationId xmlns:a16="http://schemas.microsoft.com/office/drawing/2014/main" xmlns="" id="{4B10E6E2-1F8F-4777-857D-E7F0ABBDFA5A}"/>
-              </a:ext>
-            </a:extLst>
-          </p:cNvPr>
-          <p:cNvPicPr>
-            <a:picLocks noGrp="1" noChangeAspect="1"/>
-          </p:cNvPicPr>
-          <p:nvPr>
-            <p:ph sz="quarter" idx="14"/>
-          </p:nvPr>
-        </p:nvPicPr>
-        <p:blipFill>
-          <a:blip r:embed="rId4"/>
-          <a:stretch>
-            <a:fillRect/>
-          </a:stretch>
-        </p:blipFill>
-        <p:spPr>
-          <a:xfrm>
-            <a:off x="5736752" y="1455483"/>
-            <a:ext cx="6040280" cy="3837166"/>
-          </a:xfrm>
-        </p:spPr>
-      </p:pic>
       <p:sp>
         <p:nvSpPr>
           <p:cNvPr id="11" name="Content Placeholder 3">
             <a:extLst>
               <a:ext uri="{FF2B5EF4-FFF2-40B4-BE49-F238E27FC236}">
-                <a16:creationId xmlns:a16="http://schemas.microsoft.com/office/drawing/2014/main" xmlns="" id="{B0839D5F-F9C2-4AC8-940C-29D896A5CC9A}"/>
+                <a16:creationId xmlns:a16="http://schemas.microsoft.com/office/drawing/2014/main" id="{B0839D5F-F9C2-4AC8-940C-29D896A5CC9A}"/>
               </a:ext>
             </a:extLst>
           </p:cNvPr>
@@ -7871,6 +7806,64 @@
           </a:p>
         </p:txBody>
       </p:sp>
+      <p:pic>
+        <p:nvPicPr>
+          <p:cNvPr id="5" name="Content Placeholder 4">
+            <a:extLst>
+              <a:ext uri="{FF2B5EF4-FFF2-40B4-BE49-F238E27FC236}">
+                <a16:creationId xmlns:a16="http://schemas.microsoft.com/office/drawing/2014/main" id="{5FE6D5E8-79BC-4E89-BDE0-82C982B9FD6B}"/>
+              </a:ext>
+            </a:extLst>
+          </p:cNvPr>
+          <p:cNvPicPr>
+            <a:picLocks noGrp="1" noChangeAspect="1"/>
+          </p:cNvPicPr>
+          <p:nvPr>
+            <p:ph sz="quarter" idx="13"/>
+          </p:nvPr>
+        </p:nvPicPr>
+        <p:blipFill>
+          <a:blip r:embed="rId3"/>
+          <a:stretch>
+            <a:fillRect/>
+          </a:stretch>
+        </p:blipFill>
+        <p:spPr>
+          <a:xfrm>
+            <a:off x="79607" y="1489358"/>
+            <a:ext cx="5752481" cy="3847687"/>
+          </a:xfrm>
+        </p:spPr>
+      </p:pic>
+      <p:pic>
+        <p:nvPicPr>
+          <p:cNvPr id="12" name="Content Placeholder 11">
+            <a:extLst>
+              <a:ext uri="{FF2B5EF4-FFF2-40B4-BE49-F238E27FC236}">
+                <a16:creationId xmlns:a16="http://schemas.microsoft.com/office/drawing/2014/main" id="{4E28A5AE-28CD-4D5F-8478-81D3CB50232C}"/>
+              </a:ext>
+            </a:extLst>
+          </p:cNvPr>
+          <p:cNvPicPr>
+            <a:picLocks noGrp="1" noChangeAspect="1"/>
+          </p:cNvPicPr>
+          <p:nvPr>
+            <p:ph sz="quarter" idx="14"/>
+          </p:nvPr>
+        </p:nvPicPr>
+        <p:blipFill>
+          <a:blip r:embed="rId4"/>
+          <a:stretch>
+            <a:fillRect/>
+          </a:stretch>
+        </p:blipFill>
+        <p:spPr>
+          <a:xfrm>
+            <a:off x="5758471" y="1489358"/>
+            <a:ext cx="5982010" cy="3764379"/>
+          </a:xfrm>
+        </p:spPr>
+      </p:pic>
     </p:spTree>
     <p:extLst>
       <p:ext uri="{BB962C8B-B14F-4D97-AF65-F5344CB8AC3E}">
@@ -7881,13 +7874,6 @@
   <p:clrMapOvr>
     <a:masterClrMapping/>
   </p:clrMapOvr>
-  <p:timing>
-    <p:tnLst>
-      <p:par>
-        <p:cTn id="1" dur="indefinite" restart="never" nodeType="tmRoot"/>
-      </p:par>
-    </p:tnLst>
-  </p:timing>
 </p:sld>
 </file>
 
@@ -7913,7 +7899,7 @@
           <p:cNvPr id="5" name="Title 4">
             <a:extLst>
               <a:ext uri="{FF2B5EF4-FFF2-40B4-BE49-F238E27FC236}">
-                <a16:creationId xmlns:a16="http://schemas.microsoft.com/office/drawing/2014/main" xmlns="" id="{4B9A497B-F039-4934-BA89-2EE659992D0B}"/>
+                <a16:creationId xmlns:a16="http://schemas.microsoft.com/office/drawing/2014/main" id="{4B9A497B-F039-4934-BA89-2EE659992D0B}"/>
               </a:ext>
             </a:extLst>
           </p:cNvPr>
@@ -7942,7 +7928,7 @@
           <p:cNvPr id="6" name="Content Placeholder 5">
             <a:extLst>
               <a:ext uri="{FF2B5EF4-FFF2-40B4-BE49-F238E27FC236}">
-                <a16:creationId xmlns:a16="http://schemas.microsoft.com/office/drawing/2014/main" xmlns="" id="{E61B2BA3-6D8F-4537-89F4-2FB428C8C825}"/>
+                <a16:creationId xmlns:a16="http://schemas.microsoft.com/office/drawing/2014/main" id="{E61B2BA3-6D8F-4537-89F4-2FB428C8C825}"/>
               </a:ext>
             </a:extLst>
           </p:cNvPr>
@@ -8037,7 +8023,7 @@
           <p:cNvPr id="2" name="Title 1">
             <a:extLst>
               <a:ext uri="{FF2B5EF4-FFF2-40B4-BE49-F238E27FC236}">
-                <a16:creationId xmlns:a16="http://schemas.microsoft.com/office/drawing/2014/main" xmlns="" id="{D8F1F431-E83A-4CA9-BBB4-BBE52DC9710B}"/>
+                <a16:creationId xmlns:a16="http://schemas.microsoft.com/office/drawing/2014/main" id="{D8F1F431-E83A-4CA9-BBB4-BBE52DC9710B}"/>
               </a:ext>
             </a:extLst>
           </p:cNvPr>
@@ -8067,7 +8053,7 @@
           <p:cNvPr id="9" name="Content Placeholder 8" descr="A screenshot of a cell phone&#10;&#10;Description generated with very high confidence">
             <a:extLst>
               <a:ext uri="{FF2B5EF4-FFF2-40B4-BE49-F238E27FC236}">
-                <a16:creationId xmlns:a16="http://schemas.microsoft.com/office/drawing/2014/main" xmlns="" id="{3CF998F2-2267-4353-857F-BE0BD4ABDB3B}"/>
+                <a16:creationId xmlns:a16="http://schemas.microsoft.com/office/drawing/2014/main" id="{3CF998F2-2267-4353-857F-BE0BD4ABDB3B}"/>
               </a:ext>
             </a:extLst>
           </p:cNvPr>
@@ -8096,7 +8082,7 @@
           <p:cNvPr id="13" name="Content Placeholder 12">
             <a:extLst>
               <a:ext uri="{FF2B5EF4-FFF2-40B4-BE49-F238E27FC236}">
-                <a16:creationId xmlns:a16="http://schemas.microsoft.com/office/drawing/2014/main" xmlns="" id="{7EBBC771-F5BD-4F43-9221-941A8E5222CF}"/>
+                <a16:creationId xmlns:a16="http://schemas.microsoft.com/office/drawing/2014/main" id="{7EBBC771-F5BD-4F43-9221-941A8E5222CF}"/>
               </a:ext>
             </a:extLst>
           </p:cNvPr>
@@ -8130,7 +8116,7 @@
           <p:cNvPr id="12" name="Picture 11" descr="A screenshot of a cell phone&#10;&#10;Description generated with very high confidence">
             <a:extLst>
               <a:ext uri="{FF2B5EF4-FFF2-40B4-BE49-F238E27FC236}">
-                <a16:creationId xmlns:a16="http://schemas.microsoft.com/office/drawing/2014/main" xmlns="" id="{7A142B5E-056D-4EE4-8E12-9956CC60685B}"/>
+                <a16:creationId xmlns:a16="http://schemas.microsoft.com/office/drawing/2014/main" id="{7A142B5E-056D-4EE4-8E12-9956CC60685B}"/>
               </a:ext>
             </a:extLst>
           </p:cNvPr>
@@ -8393,7 +8379,7 @@
           <p:cNvPr id="2" name="Title 1">
             <a:extLst>
               <a:ext uri="{FF2B5EF4-FFF2-40B4-BE49-F238E27FC236}">
-                <a16:creationId xmlns:a16="http://schemas.microsoft.com/office/drawing/2014/main" xmlns="" id="{0C13BBE4-42A7-49BC-A3D9-C61CF2B7B241}"/>
+                <a16:creationId xmlns:a16="http://schemas.microsoft.com/office/drawing/2014/main" id="{0C13BBE4-42A7-49BC-A3D9-C61CF2B7B241}"/>
               </a:ext>
             </a:extLst>
           </p:cNvPr>
@@ -8421,7 +8407,7 @@
           <p:cNvPr id="6" name="Content Placeholder 5" descr="A screenshot of a cell phone&#10;&#10;Description generated with very high confidence">
             <a:extLst>
               <a:ext uri="{FF2B5EF4-FFF2-40B4-BE49-F238E27FC236}">
-                <a16:creationId xmlns:a16="http://schemas.microsoft.com/office/drawing/2014/main" xmlns="" id="{DE20EDCB-8B26-4A98-AC9E-F9F50EB4CEA7}"/>
+                <a16:creationId xmlns:a16="http://schemas.microsoft.com/office/drawing/2014/main" id="{DE20EDCB-8B26-4A98-AC9E-F9F50EB4CEA7}"/>
               </a:ext>
             </a:extLst>
           </p:cNvPr>
@@ -8450,7 +8436,7 @@
           <p:cNvPr id="4" name="Content Placeholder 3">
             <a:extLst>
               <a:ext uri="{FF2B5EF4-FFF2-40B4-BE49-F238E27FC236}">
-                <a16:creationId xmlns:a16="http://schemas.microsoft.com/office/drawing/2014/main" xmlns="" id="{57EAB6FB-EF77-4FF6-BA65-17D0D77933A3}"/>
+                <a16:creationId xmlns:a16="http://schemas.microsoft.com/office/drawing/2014/main" id="{57EAB6FB-EF77-4FF6-BA65-17D0D77933A3}"/>
               </a:ext>
             </a:extLst>
           </p:cNvPr>
@@ -8495,7 +8481,7 @@
           <p:cNvPr id="8" name="Picture 7">
             <a:extLst>
               <a:ext uri="{FF2B5EF4-FFF2-40B4-BE49-F238E27FC236}">
-                <a16:creationId xmlns:a16="http://schemas.microsoft.com/office/drawing/2014/main" xmlns="" id="{A166D8C5-D123-48DE-8C7D-25F417E8213A}"/>
+                <a16:creationId xmlns:a16="http://schemas.microsoft.com/office/drawing/2014/main" id="{A166D8C5-D123-48DE-8C7D-25F417E8213A}"/>
               </a:ext>
             </a:extLst>
           </p:cNvPr>
@@ -8808,7 +8794,7 @@
           <p:cNvPr id="5" name="Title 4">
             <a:extLst>
               <a:ext uri="{FF2B5EF4-FFF2-40B4-BE49-F238E27FC236}">
-                <a16:creationId xmlns:a16="http://schemas.microsoft.com/office/drawing/2014/main" xmlns="" id="{70222D27-0026-4BBB-8A4B-0B42FA4D4DFC}"/>
+                <a16:creationId xmlns:a16="http://schemas.microsoft.com/office/drawing/2014/main" id="{70222D27-0026-4BBB-8A4B-0B42FA4D4DFC}"/>
               </a:ext>
             </a:extLst>
           </p:cNvPr>
@@ -8843,7 +8829,7 @@
           <p:cNvPr id="9" name="Content Placeholder 8">
             <a:extLst>
               <a:ext uri="{FF2B5EF4-FFF2-40B4-BE49-F238E27FC236}">
-                <a16:creationId xmlns:a16="http://schemas.microsoft.com/office/drawing/2014/main" xmlns="" id="{52E358DE-D13C-4827-BF83-EEAEAAF0909C}"/>
+                <a16:creationId xmlns:a16="http://schemas.microsoft.com/office/drawing/2014/main" id="{52E358DE-D13C-4827-BF83-EEAEAAF0909C}"/>
               </a:ext>
             </a:extLst>
           </p:cNvPr>
@@ -8872,7 +8858,7 @@
           <p:cNvPr id="6" name="Text Placeholder 5">
             <a:extLst>
               <a:ext uri="{FF2B5EF4-FFF2-40B4-BE49-F238E27FC236}">
-                <a16:creationId xmlns:a16="http://schemas.microsoft.com/office/drawing/2014/main" xmlns="" id="{FE3FC41E-3368-4C97-9108-2E8495E6C755}"/>
+                <a16:creationId xmlns:a16="http://schemas.microsoft.com/office/drawing/2014/main" id="{FE3FC41E-3368-4C97-9108-2E8495E6C755}"/>
               </a:ext>
             </a:extLst>
           </p:cNvPr>
@@ -8946,7 +8932,7 @@
           <p:cNvPr id="5" name="Title 4">
             <a:extLst>
               <a:ext uri="{FF2B5EF4-FFF2-40B4-BE49-F238E27FC236}">
-                <a16:creationId xmlns:a16="http://schemas.microsoft.com/office/drawing/2014/main" xmlns="" id="{CB297D01-DDCB-4327-8550-7EF052E5F1CD}"/>
+                <a16:creationId xmlns:a16="http://schemas.microsoft.com/office/drawing/2014/main" id="{CB297D01-DDCB-4327-8550-7EF052E5F1CD}"/>
               </a:ext>
             </a:extLst>
           </p:cNvPr>
@@ -8974,7 +8960,7 @@
           <p:cNvPr id="6" name="Content Placeholder 5">
             <a:extLst>
               <a:ext uri="{FF2B5EF4-FFF2-40B4-BE49-F238E27FC236}">
-                <a16:creationId xmlns:a16="http://schemas.microsoft.com/office/drawing/2014/main" xmlns="" id="{D508238F-A336-45EE-BCF6-9E4981466413}"/>
+                <a16:creationId xmlns:a16="http://schemas.microsoft.com/office/drawing/2014/main" id="{D508238F-A336-45EE-BCF6-9E4981466413}"/>
               </a:ext>
             </a:extLst>
           </p:cNvPr>
@@ -9028,7 +9014,7 @@
           <p:cNvPr id="13" name="Content Placeholder 12" descr="A screenshot of a cell phone&#10;&#10;Description generated with very high confidence">
             <a:extLst>
               <a:ext uri="{FF2B5EF4-FFF2-40B4-BE49-F238E27FC236}">
-                <a16:creationId xmlns:a16="http://schemas.microsoft.com/office/drawing/2014/main" xmlns="" id="{CD3EB054-2606-438E-A90A-7B1912CBB6A4}"/>
+                <a16:creationId xmlns:a16="http://schemas.microsoft.com/office/drawing/2014/main" id="{CD3EB054-2606-438E-A90A-7B1912CBB6A4}"/>
               </a:ext>
             </a:extLst>
           </p:cNvPr>
@@ -9057,7 +9043,7 @@
           <p:cNvPr id="15" name="Picture 14">
             <a:extLst>
               <a:ext uri="{FF2B5EF4-FFF2-40B4-BE49-F238E27FC236}">
-                <a16:creationId xmlns:a16="http://schemas.microsoft.com/office/drawing/2014/main" xmlns="" id="{E4CB2E80-2183-4526-8398-BEDF22459751}"/>
+                <a16:creationId xmlns:a16="http://schemas.microsoft.com/office/drawing/2014/main" id="{E4CB2E80-2183-4526-8398-BEDF22459751}"/>
               </a:ext>
             </a:extLst>
           </p:cNvPr>
@@ -9248,10 +9234,9 @@
           <a:lstStyle/>
           <a:p>
             <a:r>
-              <a:rPr lang="en-US" dirty="0" smtClean="0"/>
+              <a:rPr lang="en-US" dirty="0"/>
               <a:t>Discussion</a:t>
             </a:r>
-            <a:endParaRPr lang="en-US" dirty="0"/>
           </a:p>
         </p:txBody>
       </p:sp>
@@ -9271,30 +9256,29 @@
           <a:lstStyle/>
           <a:p>
             <a:r>
-              <a:rPr lang="en-US" dirty="0" smtClean="0"/>
+              <a:rPr lang="en-US" dirty="0"/>
               <a:t>We found that people generally like movies. All of the genres were within the 6-8 range on an 0-10 scale.</a:t>
             </a:r>
           </a:p>
           <a:p>
             <a:r>
-              <a:rPr lang="en-US" dirty="0" smtClean="0"/>
+              <a:rPr lang="en-US" dirty="0"/>
               <a:t> the movie industry would hope that the more money is spent on a movie, the more the movie would gross, and our analysis does support this idea. </a:t>
             </a:r>
           </a:p>
           <a:p>
             <a:r>
-              <a:rPr lang="en-US" dirty="0" smtClean="0"/>
+              <a:rPr lang="en-US" dirty="0"/>
               <a:t>A surprising find is that movie ratings have a major role in revenue. G and </a:t>
             </a:r>
             <a:r>
-              <a:rPr lang="en-US" dirty="0" err="1" smtClean="0"/>
+              <a:rPr lang="en-US" dirty="0" err="1"/>
               <a:t>pg</a:t>
             </a:r>
             <a:r>
-              <a:rPr lang="en-US" dirty="0" smtClean="0"/>
+              <a:rPr lang="en-US" dirty="0"/>
               <a:t> movies  on average have a larger budget and receive larger gross revenue. </a:t>
             </a:r>
-            <a:endParaRPr lang="en-US" dirty="0"/>
           </a:p>
         </p:txBody>
       </p:sp>
@@ -9308,13 +9292,6 @@
   <p:clrMapOvr>
     <a:masterClrMapping/>
   </p:clrMapOvr>
-  <p:timing>
-    <p:tnLst>
-      <p:par>
-        <p:cTn id="1" dur="indefinite" restart="never" nodeType="tmRoot"/>
-      </p:par>
-    </p:tnLst>
-  </p:timing>
 </p:sld>
 </file>
 
@@ -9351,10 +9328,9 @@
           <a:lstStyle/>
           <a:p>
             <a:r>
-              <a:rPr lang="en-US" dirty="0" smtClean="0"/>
+              <a:rPr lang="en-US" dirty="0"/>
               <a:t>Post Mortem</a:t>
             </a:r>
-            <a:endParaRPr lang="en-US" dirty="0"/>
           </a:p>
         </p:txBody>
       </p:sp>
@@ -9374,18 +9350,18 @@
           <a:lstStyle/>
           <a:p>
             <a:r>
-              <a:rPr lang="en-US" dirty="0" smtClean="0"/>
+              <a:rPr lang="en-US" dirty="0"/>
               <a:t>We had several difficulties arise while analyzing this data. To be as accurate as possible, we wanted to account for inflation. When we added inflation, we noticed that older movies would have grossed much more in today’s market than a modern blockbuster.  That caused our data to become skewed and we had to set limits to drop any outliers. </a:t>
             </a:r>
           </a:p>
           <a:p>
             <a:r>
-              <a:rPr lang="en-US" dirty="0" smtClean="0"/>
+              <a:rPr lang="en-US" dirty="0"/>
               <a:t>Another issue was currency exchanges. We noticed some movies were costing around 20 billion to make, however this was in yen. To deal with this, we dropped movies that were not in English, USA movies.</a:t>
             </a:r>
           </a:p>
           <a:p>
-            <a:endParaRPr lang="en-US" dirty="0" smtClean="0"/>
+            <a:endParaRPr lang="en-US" dirty="0"/>
           </a:p>
           <a:p>
             <a:endParaRPr lang="en-US" dirty="0"/>
@@ -9438,10 +9414,9 @@
           <a:lstStyle/>
           <a:p>
             <a:r>
-              <a:rPr lang="en-US" dirty="0" smtClean="0"/>
-              <a:t>If we had more time!</a:t>
-            </a:r>
-            <a:endParaRPr lang="en-US" dirty="0"/>
+              <a:rPr lang="en-US" dirty="0"/>
+              <a:t>If Only we had more time!</a:t>
+            </a:r>
           </a:p>
         </p:txBody>
       </p:sp>
@@ -9461,40 +9436,39 @@
           <a:lstStyle/>
           <a:p>
             <a:r>
-              <a:rPr lang="en-US" dirty="0" smtClean="0"/>
+              <a:rPr lang="en-US" dirty="0"/>
               <a:t>If we had more time we would have converted all of the countries of origin to US dollars.</a:t>
             </a:r>
           </a:p>
           <a:p>
             <a:r>
-              <a:rPr lang="en-US" dirty="0" smtClean="0"/>
+              <a:rPr lang="en-US" dirty="0"/>
               <a:t>We would have wanted to look at gross revenue vs awards won </a:t>
             </a:r>
           </a:p>
           <a:p>
             <a:r>
-              <a:rPr lang="en-US" dirty="0" smtClean="0"/>
+              <a:rPr lang="en-US" dirty="0"/>
               <a:t>Compare opening weekend to total box office and </a:t>
             </a:r>
             <a:r>
-              <a:rPr lang="en-US" dirty="0" err="1" smtClean="0"/>
+              <a:rPr lang="en-US" dirty="0" err="1"/>
               <a:t>imdb</a:t>
             </a:r>
             <a:r>
-              <a:rPr lang="en-US" dirty="0" smtClean="0"/>
+              <a:rPr lang="en-US" dirty="0"/>
               <a:t> score</a:t>
             </a:r>
           </a:p>
           <a:p>
             <a:r>
-              <a:rPr lang="en-US" dirty="0" err="1" smtClean="0"/>
+              <a:rPr lang="en-US" dirty="0" err="1"/>
               <a:t>Api</a:t>
             </a:r>
             <a:r>
-              <a:rPr lang="en-US" dirty="0" smtClean="0"/>
+              <a:rPr lang="en-US" dirty="0"/>
               <a:t> keys. We would have created our own data to use from multiple sources such as critic scores vs rotten tomatoes. We really wanted to see gross revenue vs critic rating and fan ratings. </a:t>
             </a:r>
-            <a:endParaRPr lang="en-US" dirty="0"/>
           </a:p>
         </p:txBody>
       </p:sp>
@@ -9544,7 +9518,7 @@
           <a:lstStyle/>
           <a:p>
             <a:r>
-              <a:rPr lang="en-US" dirty="0" err="1" smtClean="0"/>
+              <a:rPr lang="en-US" dirty="0" err="1"/>
               <a:t>Q&amp;a</a:t>
             </a:r>
             <a:endParaRPr lang="en-US" dirty="0"/>
@@ -9567,10 +9541,9 @@
           <a:lstStyle/>
           <a:p>
             <a:r>
-              <a:rPr lang="en-US" dirty="0" smtClean="0"/>
+              <a:rPr lang="en-US" dirty="0"/>
               <a:t>Questions, comments, concerns? </a:t>
             </a:r>
-            <a:endParaRPr lang="en-US" dirty="0"/>
           </a:p>
         </p:txBody>
       </p:sp>
@@ -9609,7 +9582,7 @@
           <p:cNvPr id="2" name="Title 1">
             <a:extLst>
               <a:ext uri="{FF2B5EF4-FFF2-40B4-BE49-F238E27FC236}">
-                <a16:creationId xmlns:a16="http://schemas.microsoft.com/office/drawing/2014/main" xmlns="" id="{C37A407A-5402-46F1-8DA6-5764C0EBB6D7}"/>
+                <a16:creationId xmlns:a16="http://schemas.microsoft.com/office/drawing/2014/main" id="{C37A407A-5402-46F1-8DA6-5764C0EBB6D7}"/>
               </a:ext>
             </a:extLst>
           </p:cNvPr>
@@ -9637,7 +9610,7 @@
           <p:cNvPr id="3" name="Content Placeholder 2">
             <a:extLst>
               <a:ext uri="{FF2B5EF4-FFF2-40B4-BE49-F238E27FC236}">
-                <a16:creationId xmlns:a16="http://schemas.microsoft.com/office/drawing/2014/main" xmlns="" id="{F13E0551-8B2B-49DB-8507-BB81C8F93DB7}"/>
+                <a16:creationId xmlns:a16="http://schemas.microsoft.com/office/drawing/2014/main" id="{F13E0551-8B2B-49DB-8507-BB81C8F93DB7}"/>
               </a:ext>
             </a:extLst>
           </p:cNvPr>
@@ -9802,7 +9775,7 @@
           <p:cNvPr id="2" name="Title 1">
             <a:extLst>
               <a:ext uri="{FF2B5EF4-FFF2-40B4-BE49-F238E27FC236}">
-                <a16:creationId xmlns:a16="http://schemas.microsoft.com/office/drawing/2014/main" xmlns="" id="{2E55EB2A-2748-4823-B161-AE13D814BB74}"/>
+                <a16:creationId xmlns:a16="http://schemas.microsoft.com/office/drawing/2014/main" id="{2E55EB2A-2748-4823-B161-AE13D814BB74}"/>
               </a:ext>
             </a:extLst>
           </p:cNvPr>
@@ -9830,7 +9803,7 @@
           <p:cNvPr id="3" name="Content Placeholder 2">
             <a:extLst>
               <a:ext uri="{FF2B5EF4-FFF2-40B4-BE49-F238E27FC236}">
-                <a16:creationId xmlns:a16="http://schemas.microsoft.com/office/drawing/2014/main" xmlns="" id="{56D88EDD-2A58-447D-A2D0-FBF6581B84BE}"/>
+                <a16:creationId xmlns:a16="http://schemas.microsoft.com/office/drawing/2014/main" id="{56D88EDD-2A58-447D-A2D0-FBF6581B84BE}"/>
               </a:ext>
             </a:extLst>
           </p:cNvPr>
@@ -10192,7 +10165,7 @@
           <p:cNvPr id="2" name="Title 1">
             <a:extLst>
               <a:ext uri="{FF2B5EF4-FFF2-40B4-BE49-F238E27FC236}">
-                <a16:creationId xmlns:a16="http://schemas.microsoft.com/office/drawing/2014/main" xmlns="" id="{3BED149D-E126-47FB-924E-968EBDA5EADE}"/>
+                <a16:creationId xmlns:a16="http://schemas.microsoft.com/office/drawing/2014/main" id="{3BED149D-E126-47FB-924E-968EBDA5EADE}"/>
               </a:ext>
             </a:extLst>
           </p:cNvPr>
@@ -10225,7 +10198,7 @@
           <p:cNvPr id="3" name="Content Placeholder 2">
             <a:extLst>
               <a:ext uri="{FF2B5EF4-FFF2-40B4-BE49-F238E27FC236}">
-                <a16:creationId xmlns:a16="http://schemas.microsoft.com/office/drawing/2014/main" xmlns="" id="{699D8BF0-C21B-43AF-BB76-E9EC4B3DC1B7}"/>
+                <a16:creationId xmlns:a16="http://schemas.microsoft.com/office/drawing/2014/main" id="{699D8BF0-C21B-43AF-BB76-E9EC4B3DC1B7}"/>
               </a:ext>
             </a:extLst>
           </p:cNvPr>
@@ -10258,41 +10231,12 @@
           </a:p>
         </p:txBody>
       </p:sp>
-      <p:pic>
-        <p:nvPicPr>
-          <p:cNvPr id="6" name="Content Placeholder 5">
-            <a:extLst>
-              <a:ext uri="{FF2B5EF4-FFF2-40B4-BE49-F238E27FC236}">
-                <a16:creationId xmlns:a16="http://schemas.microsoft.com/office/drawing/2014/main" xmlns="" id="{BDCA271D-3F5B-41A7-990D-D51FD9AC1BF3}"/>
-              </a:ext>
-            </a:extLst>
-          </p:cNvPr>
-          <p:cNvPicPr>
-            <a:picLocks noGrp="1" noChangeAspect="1"/>
-          </p:cNvPicPr>
-          <p:nvPr>
-            <p:ph sz="quarter" idx="14"/>
-          </p:nvPr>
-        </p:nvPicPr>
-        <p:blipFill>
-          <a:blip r:embed="rId3"/>
-          <a:stretch>
-            <a:fillRect/>
-          </a:stretch>
-        </p:blipFill>
-        <p:spPr>
-          <a:xfrm>
-            <a:off x="5130157" y="717717"/>
-            <a:ext cx="6520835" cy="4660135"/>
-          </a:xfrm>
-        </p:spPr>
-      </p:pic>
       <p:sp>
         <p:nvSpPr>
           <p:cNvPr id="7" name="Content Placeholder 2">
             <a:extLst>
               <a:ext uri="{FF2B5EF4-FFF2-40B4-BE49-F238E27FC236}">
-                <a16:creationId xmlns:a16="http://schemas.microsoft.com/office/drawing/2014/main" xmlns="" id="{0C93A34A-63CD-4E15-A190-BFF73B57538A}"/>
+                <a16:creationId xmlns:a16="http://schemas.microsoft.com/office/drawing/2014/main" id="{0C93A34A-63CD-4E15-A190-BFF73B57538A}"/>
               </a:ext>
             </a:extLst>
           </p:cNvPr>
@@ -10532,6 +10476,35 @@
           </a:p>
         </p:txBody>
       </p:sp>
+      <p:pic>
+        <p:nvPicPr>
+          <p:cNvPr id="9" name="Content Placeholder 8" descr="A close up of a map&#10;&#10;Description generated with very high confidence">
+            <a:extLst>
+              <a:ext uri="{FF2B5EF4-FFF2-40B4-BE49-F238E27FC236}">
+                <a16:creationId xmlns:a16="http://schemas.microsoft.com/office/drawing/2014/main" id="{CE5754DC-32AA-44FE-B931-6AB6D4FC95B2}"/>
+              </a:ext>
+            </a:extLst>
+          </p:cNvPr>
+          <p:cNvPicPr>
+            <a:picLocks noGrp="1" noChangeAspect="1"/>
+          </p:cNvPicPr>
+          <p:nvPr>
+            <p:ph sz="quarter" idx="14"/>
+          </p:nvPr>
+        </p:nvPicPr>
+        <p:blipFill>
+          <a:blip r:embed="rId3"/>
+          <a:stretch>
+            <a:fillRect/>
+          </a:stretch>
+        </p:blipFill>
+        <p:spPr>
+          <a:xfrm>
+            <a:off x="5332165" y="853069"/>
+            <a:ext cx="6410072" cy="4689475"/>
+          </a:xfrm>
+        </p:spPr>
+      </p:pic>
     </p:spTree>
     <p:extLst>
       <p:ext uri="{BB962C8B-B14F-4D97-AF65-F5344CB8AC3E}">
@@ -10612,64 +10585,19 @@
                             </p:stCondLst>
                             <p:childTnLst>
                               <p:par>
-                                <p:cTn id="9" presetID="1" presetClass="entr" presetSubtype="0" fill="hold" nodeType="clickEffect">
-                                  <p:stCondLst>
-                                    <p:cond delay="0"/>
-                                  </p:stCondLst>
-                                  <p:childTnLst>
-                                    <p:set>
-                                      <p:cBhvr>
-                                        <p:cTn id="10" dur="1" fill="hold">
-                                          <p:stCondLst>
-                                            <p:cond delay="0"/>
-                                          </p:stCondLst>
-                                        </p:cTn>
-                                        <p:tgtEl>
-                                          <p:spTgt spid="6"/>
-                                        </p:tgtEl>
-                                        <p:attrNameLst>
-                                          <p:attrName>style.visibility</p:attrName>
-                                        </p:attrNameLst>
-                                      </p:cBhvr>
-                                      <p:to>
-                                        <p:strVal val="visible"/>
-                                      </p:to>
-                                    </p:set>
-                                  </p:childTnLst>
-                                </p:cTn>
-                              </p:par>
-                            </p:childTnLst>
-                          </p:cTn>
-                        </p:par>
-                      </p:childTnLst>
-                    </p:cTn>
-                  </p:par>
-                  <p:par>
-                    <p:cTn id="11" fill="hold">
-                      <p:stCondLst>
-                        <p:cond delay="indefinite"/>
-                      </p:stCondLst>
-                      <p:childTnLst>
-                        <p:par>
-                          <p:cTn id="12" fill="hold">
-                            <p:stCondLst>
-                              <p:cond delay="0"/>
-                            </p:stCondLst>
-                            <p:childTnLst>
-                              <p:par>
-                                <p:cTn id="13" presetID="1" presetClass="entr" presetSubtype="0" fill="hold" grpId="0" nodeType="clickEffect" nodePh="1">
+                                <p:cTn id="9" presetID="1" presetClass="entr" presetSubtype="0" fill="hold" grpId="0" nodeType="clickEffect" nodePh="1">
                                   <p:stCondLst>
                                     <p:cond delay="0"/>
                                   </p:stCondLst>
                                   <p:endCondLst>
                                     <p:cond evt="begin" delay="0">
-                                      <p:tn val="13"/>
+                                      <p:tn val="9"/>
                                     </p:cond>
                                   </p:endCondLst>
                                   <p:childTnLst>
                                     <p:set>
                                       <p:cBhvr>
-                                        <p:cTn id="14" dur="1" fill="hold">
+                                        <p:cTn id="10" dur="1" fill="hold">
                                           <p:stCondLst>
                                             <p:cond delay="0"/>
                                           </p:stCondLst>
@@ -10749,7 +10677,7 @@
           <p:cNvPr id="2" name="Title 1">
             <a:extLst>
               <a:ext uri="{FF2B5EF4-FFF2-40B4-BE49-F238E27FC236}">
-                <a16:creationId xmlns:a16="http://schemas.microsoft.com/office/drawing/2014/main" xmlns="" id="{1833FD4B-F7AB-4121-9556-D05FFC544755}"/>
+                <a16:creationId xmlns:a16="http://schemas.microsoft.com/office/drawing/2014/main" id="{1833FD4B-F7AB-4121-9556-D05FFC544755}"/>
               </a:ext>
             </a:extLst>
           </p:cNvPr>
@@ -10778,41 +10706,12 @@
           </a:p>
         </p:txBody>
       </p:sp>
-      <p:pic>
-        <p:nvPicPr>
-          <p:cNvPr id="6" name="Content Placeholder 5" descr="A screenshot of a cell phone&#10;&#10;Description generated with very high confidence">
-            <a:extLst>
-              <a:ext uri="{FF2B5EF4-FFF2-40B4-BE49-F238E27FC236}">
-                <a16:creationId xmlns:a16="http://schemas.microsoft.com/office/drawing/2014/main" xmlns="" id="{C226757D-1BA7-458A-99DF-F62E7D32361E}"/>
-              </a:ext>
-            </a:extLst>
-          </p:cNvPr>
-          <p:cNvPicPr>
-            <a:picLocks noGrp="1" noChangeAspect="1"/>
-          </p:cNvPicPr>
-          <p:nvPr>
-            <p:ph sz="quarter" idx="13"/>
-          </p:nvPr>
-        </p:nvPicPr>
-        <p:blipFill>
-          <a:blip r:embed="rId3"/>
-          <a:stretch>
-            <a:fillRect/>
-          </a:stretch>
-        </p:blipFill>
-        <p:spPr>
-          <a:xfrm>
-            <a:off x="118256" y="594911"/>
-            <a:ext cx="5925523" cy="4881649"/>
-          </a:xfrm>
-        </p:spPr>
-      </p:pic>
       <p:sp>
         <p:nvSpPr>
           <p:cNvPr id="4" name="Content Placeholder 3">
             <a:extLst>
               <a:ext uri="{FF2B5EF4-FFF2-40B4-BE49-F238E27FC236}">
-                <a16:creationId xmlns:a16="http://schemas.microsoft.com/office/drawing/2014/main" xmlns="" id="{7B168BB0-0EEE-45DF-A2C7-316419C4E1CF}"/>
+                <a16:creationId xmlns:a16="http://schemas.microsoft.com/office/drawing/2014/main" id="{7B168BB0-0EEE-45DF-A2C7-316419C4E1CF}"/>
               </a:ext>
             </a:extLst>
           </p:cNvPr>
@@ -10856,7 +10755,7 @@
           <p:cNvPr id="7" name="Content Placeholder 3">
             <a:extLst>
               <a:ext uri="{FF2B5EF4-FFF2-40B4-BE49-F238E27FC236}">
-                <a16:creationId xmlns:a16="http://schemas.microsoft.com/office/drawing/2014/main" xmlns="" id="{9E47DB04-22E5-4CFB-9C01-419E3AB44220}"/>
+                <a16:creationId xmlns:a16="http://schemas.microsoft.com/office/drawing/2014/main" id="{9E47DB04-22E5-4CFB-9C01-419E3AB44220}"/>
               </a:ext>
             </a:extLst>
           </p:cNvPr>
@@ -11103,7 +11002,7 @@
           <p:cNvPr id="8" name="Content Placeholder 3">
             <a:extLst>
               <a:ext uri="{FF2B5EF4-FFF2-40B4-BE49-F238E27FC236}">
-                <a16:creationId xmlns:a16="http://schemas.microsoft.com/office/drawing/2014/main" xmlns="" id="{F794E119-977B-4176-B9BF-6EE8F7E04E37}"/>
+                <a16:creationId xmlns:a16="http://schemas.microsoft.com/office/drawing/2014/main" id="{F794E119-977B-4176-B9BF-6EE8F7E04E37}"/>
               </a:ext>
             </a:extLst>
           </p:cNvPr>
@@ -11347,10 +11246,39 @@
       </p:sp>
       <p:pic>
         <p:nvPicPr>
-          <p:cNvPr id="10" name="Picture 9" descr="A screenshot of a cell phone&#10;&#10;Description generated with very high confidence">
+          <p:cNvPr id="11" name="Content Placeholder 10" descr="A screenshot of a cell phone&#10;&#10;Description generated with very high confidence">
             <a:extLst>
               <a:ext uri="{FF2B5EF4-FFF2-40B4-BE49-F238E27FC236}">
-                <a16:creationId xmlns:a16="http://schemas.microsoft.com/office/drawing/2014/main" xmlns="" id="{B0241CE4-AA02-4A96-BED1-CAB0E5CF90C9}"/>
+                <a16:creationId xmlns:a16="http://schemas.microsoft.com/office/drawing/2014/main" id="{BC8373B7-BA62-401E-BC74-9B833B436909}"/>
+              </a:ext>
+            </a:extLst>
+          </p:cNvPr>
+          <p:cNvPicPr>
+            <a:picLocks noGrp="1" noChangeAspect="1"/>
+          </p:cNvPicPr>
+          <p:nvPr>
+            <p:ph sz="quarter" idx="13"/>
+          </p:nvPr>
+        </p:nvPicPr>
+        <p:blipFill>
+          <a:blip r:embed="rId3"/>
+          <a:stretch>
+            <a:fillRect/>
+          </a:stretch>
+        </p:blipFill>
+        <p:spPr>
+          <a:xfrm>
+            <a:off x="139011" y="765275"/>
+            <a:ext cx="5888043" cy="4850771"/>
+          </a:xfrm>
+        </p:spPr>
+      </p:pic>
+      <p:pic>
+        <p:nvPicPr>
+          <p:cNvPr id="13" name="Picture 12" descr="A screenshot of a cell phone&#10;&#10;Description generated with very high confidence">
+            <a:extLst>
+              <a:ext uri="{FF2B5EF4-FFF2-40B4-BE49-F238E27FC236}">
+                <a16:creationId xmlns:a16="http://schemas.microsoft.com/office/drawing/2014/main" id="{91AA2871-2F00-4CD8-9B20-1ECEFE6D60DA}"/>
               </a:ext>
             </a:extLst>
           </p:cNvPr>
@@ -11367,8 +11295,8 @@
         </p:blipFill>
         <p:spPr>
           <a:xfrm>
-            <a:off x="251723" y="612217"/>
-            <a:ext cx="5792056" cy="4847036"/>
+            <a:off x="263732" y="793056"/>
+            <a:ext cx="5763322" cy="4822990"/>
           </a:xfrm>
           <a:prstGeom prst="rect">
             <a:avLst/>
@@ -11468,7 +11396,11 @@
                                           </p:stCondLst>
                                         </p:cTn>
                                         <p:tgtEl>
-                                          <p:spTgt spid="6"/>
+                                          <p:spTgt spid="4">
+                                            <p:txEl>
+                                              <p:pRg st="0" end="0"/>
+                                            </p:txEl>
+                                          </p:spTgt>
                                         </p:tgtEl>
                                         <p:attrNameLst>
                                           <p:attrName>style.visibility</p:attrName>
@@ -11513,7 +11445,7 @@
                                           </p:stCondLst>
                                         </p:cTn>
                                         <p:tgtEl>
-                                          <p:spTgt spid="4">
+                                          <p:spTgt spid="8">
                                             <p:txEl>
                                               <p:pRg st="0" end="0"/>
                                             </p:txEl>
@@ -11562,11 +11494,7 @@
                                           </p:stCondLst>
                                         </p:cTn>
                                         <p:tgtEl>
-                                          <p:spTgt spid="8">
-                                            <p:txEl>
-                                              <p:pRg st="0" end="0"/>
-                                            </p:txEl>
-                                          </p:spTgt>
+                                          <p:spTgt spid="11"/>
                                         </p:tgtEl>
                                         <p:attrNameLst>
                                           <p:attrName>style.visibility</p:attrName>
@@ -11598,28 +11526,20 @@
                             </p:stCondLst>
                             <p:childTnLst>
                               <p:par>
-                                <p:cTn id="21" presetID="10" presetClass="exit" presetSubtype="0" fill="hold" nodeType="clickEffect">
+                                <p:cTn id="21" presetID="1" presetClass="exit" presetSubtype="0" fill="hold" nodeType="clickEffect">
                                   <p:stCondLst>
                                     <p:cond delay="0"/>
                                   </p:stCondLst>
                                   <p:childTnLst>
-                                    <p:animEffect transition="out" filter="fade">
-                                      <p:cBhvr>
-                                        <p:cTn id="22" dur="500"/>
-                                        <p:tgtEl>
-                                          <p:spTgt spid="6"/>
-                                        </p:tgtEl>
-                                      </p:cBhvr>
-                                    </p:animEffect>
                                     <p:set>
                                       <p:cBhvr>
-                                        <p:cTn id="23" dur="1" fill="hold">
+                                        <p:cTn id="22" dur="1" fill="hold">
                                           <p:stCondLst>
-                                            <p:cond delay="499"/>
+                                            <p:cond delay="0"/>
                                           </p:stCondLst>
                                         </p:cTn>
                                         <p:tgtEl>
-                                          <p:spTgt spid="6"/>
+                                          <p:spTgt spid="11"/>
                                         </p:tgtEl>
                                         <p:attrNameLst>
                                           <p:attrName>style.visibility</p:attrName>
@@ -11639,32 +11559,32 @@
                     </p:cTn>
                   </p:par>
                   <p:par>
-                    <p:cTn id="24" fill="hold">
+                    <p:cTn id="23" fill="hold">
                       <p:stCondLst>
                         <p:cond delay="indefinite"/>
                       </p:stCondLst>
                       <p:childTnLst>
                         <p:par>
-                          <p:cTn id="25" fill="hold">
+                          <p:cTn id="24" fill="hold">
                             <p:stCondLst>
                               <p:cond delay="0"/>
                             </p:stCondLst>
                             <p:childTnLst>
                               <p:par>
-                                <p:cTn id="26" presetID="1" presetClass="entr" presetSubtype="0" fill="hold" nodeType="clickEffect">
+                                <p:cTn id="25" presetID="1" presetClass="entr" presetSubtype="0" fill="hold" nodeType="clickEffect">
                                   <p:stCondLst>
                                     <p:cond delay="0"/>
                                   </p:stCondLst>
                                   <p:childTnLst>
                                     <p:set>
                                       <p:cBhvr>
-                                        <p:cTn id="27" dur="1" fill="hold">
+                                        <p:cTn id="26" dur="1" fill="hold">
                                           <p:stCondLst>
                                             <p:cond delay="0"/>
                                           </p:stCondLst>
                                         </p:cTn>
                                         <p:tgtEl>
-                                          <p:spTgt spid="10"/>
+                                          <p:spTgt spid="13"/>
                                         </p:tgtEl>
                                         <p:attrNameLst>
                                           <p:attrName>style.visibility</p:attrName>
@@ -11727,10 +11647,10 @@
       </p:grpSpPr>
       <p:pic>
         <p:nvPicPr>
-          <p:cNvPr id="6" name="Content Placeholder 5" descr="A screenshot of a cell phone&#10;&#10;Description generated with very high confidence">
+          <p:cNvPr id="5" name="Content Placeholder 4" descr="A screenshot of a cell phone&#10;&#10;Description generated with very high confidence">
             <a:extLst>
               <a:ext uri="{FF2B5EF4-FFF2-40B4-BE49-F238E27FC236}">
-                <a16:creationId xmlns:a16="http://schemas.microsoft.com/office/drawing/2014/main" xmlns="" id="{BC3DCE3D-E696-45DB-ADEE-0AD1F7ECF2F2}"/>
+                <a16:creationId xmlns:a16="http://schemas.microsoft.com/office/drawing/2014/main" id="{EA5335CA-4D73-4C2D-9174-37B8FC68FE5F}"/>
               </a:ext>
             </a:extLst>
           </p:cNvPr>
@@ -11749,17 +11669,17 @@
         </p:blipFill>
         <p:spPr>
           <a:xfrm>
-            <a:off x="173340" y="653566"/>
-            <a:ext cx="5490675" cy="4523405"/>
+            <a:off x="175447" y="333313"/>
+            <a:ext cx="5920553" cy="4877554"/>
           </a:xfrm>
         </p:spPr>
       </p:pic>
       <p:pic>
         <p:nvPicPr>
-          <p:cNvPr id="8" name="Content Placeholder 7" descr="A screenshot of a cell phone&#10;&#10;Description generated with very high confidence">
+          <p:cNvPr id="11" name="Content Placeholder 10" descr="A screenshot of a cell phone&#10;&#10;Description generated with very high confidence">
             <a:extLst>
               <a:ext uri="{FF2B5EF4-FFF2-40B4-BE49-F238E27FC236}">
-                <a16:creationId xmlns:a16="http://schemas.microsoft.com/office/drawing/2014/main" xmlns="" id="{6B17349F-43D0-40B2-82B7-EC0BFC9E9B4A}"/>
+                <a16:creationId xmlns:a16="http://schemas.microsoft.com/office/drawing/2014/main" id="{3C7FD3C1-91F4-443E-BAC9-EBABA5ADE85F}"/>
               </a:ext>
             </a:extLst>
           </p:cNvPr>
@@ -11778,8 +11698,8 @@
         </p:blipFill>
         <p:spPr>
           <a:xfrm>
-            <a:off x="6096000" y="653567"/>
-            <a:ext cx="5405327" cy="4523405"/>
+            <a:off x="5990277" y="384014"/>
+            <a:ext cx="5707352" cy="4776152"/>
           </a:xfrm>
         </p:spPr>
       </p:pic>
@@ -11793,13 +11713,6 @@
   <p:clrMapOvr>
     <a:masterClrMapping/>
   </p:clrMapOvr>
-  <p:timing>
-    <p:tnLst>
-      <p:par>
-        <p:cTn id="1" dur="indefinite" restart="never" nodeType="tmRoot"/>
-      </p:par>
-    </p:tnLst>
-  </p:timing>
 </p:sld>
 </file>
 
@@ -11825,7 +11738,7 @@
           <p:cNvPr id="2" name="Title 1">
             <a:extLst>
               <a:ext uri="{FF2B5EF4-FFF2-40B4-BE49-F238E27FC236}">
-                <a16:creationId xmlns:a16="http://schemas.microsoft.com/office/drawing/2014/main" xmlns="" id="{D70524D5-97C8-48F3-9986-C1DD466D55AF}"/>
+                <a16:creationId xmlns:a16="http://schemas.microsoft.com/office/drawing/2014/main" id="{D70524D5-97C8-48F3-9986-C1DD466D55AF}"/>
               </a:ext>
             </a:extLst>
           </p:cNvPr>
@@ -11874,7 +11787,7 @@
           <p:cNvPr id="3" name="Content Placeholder 2">
             <a:extLst>
               <a:ext uri="{FF2B5EF4-FFF2-40B4-BE49-F238E27FC236}">
-                <a16:creationId xmlns:a16="http://schemas.microsoft.com/office/drawing/2014/main" xmlns="" id="{442B4B3D-83F0-4E29-A64A-C907F55CCEC9}"/>
+                <a16:creationId xmlns:a16="http://schemas.microsoft.com/office/drawing/2014/main" id="{442B4B3D-83F0-4E29-A64A-C907F55CCEC9}"/>
               </a:ext>
             </a:extLst>
           </p:cNvPr>
@@ -11912,41 +11825,12 @@
           </a:p>
         </p:txBody>
       </p:sp>
-      <p:pic>
-        <p:nvPicPr>
-          <p:cNvPr id="6" name="Content Placeholder 5">
-            <a:extLst>
-              <a:ext uri="{FF2B5EF4-FFF2-40B4-BE49-F238E27FC236}">
-                <a16:creationId xmlns:a16="http://schemas.microsoft.com/office/drawing/2014/main" xmlns="" id="{F79BAEDC-45FE-4540-9DA9-06AD80D646F7}"/>
-              </a:ext>
-            </a:extLst>
-          </p:cNvPr>
-          <p:cNvPicPr>
-            <a:picLocks noGrp="1" noChangeAspect="1"/>
-          </p:cNvPicPr>
-          <p:nvPr>
-            <p:ph sz="quarter" idx="14"/>
-          </p:nvPr>
-        </p:nvPicPr>
-        <p:blipFill>
-          <a:blip r:embed="rId3"/>
-          <a:stretch>
-            <a:fillRect/>
-          </a:stretch>
-        </p:blipFill>
-        <p:spPr>
-          <a:xfrm>
-            <a:off x="5210979" y="672164"/>
-            <a:ext cx="6439909" cy="4602301"/>
-          </a:xfrm>
-        </p:spPr>
-      </p:pic>
       <p:sp>
         <p:nvSpPr>
           <p:cNvPr id="20" name="Content Placeholder 2">
             <a:extLst>
               <a:ext uri="{FF2B5EF4-FFF2-40B4-BE49-F238E27FC236}">
-                <a16:creationId xmlns:a16="http://schemas.microsoft.com/office/drawing/2014/main" xmlns="" id="{E9F75C6F-4B4E-4291-B992-231B1A53AE31}"/>
+                <a16:creationId xmlns:a16="http://schemas.microsoft.com/office/drawing/2014/main" id="{E9F75C6F-4B4E-4291-B992-231B1A53AE31}"/>
               </a:ext>
             </a:extLst>
           </p:cNvPr>
@@ -12189,6 +12073,35 @@
           </a:p>
         </p:txBody>
       </p:sp>
+      <p:pic>
+        <p:nvPicPr>
+          <p:cNvPr id="8" name="Content Placeholder 7" descr="A close up of a map&#10;&#10;Description generated with very high confidence">
+            <a:extLst>
+              <a:ext uri="{FF2B5EF4-FFF2-40B4-BE49-F238E27FC236}">
+                <a16:creationId xmlns:a16="http://schemas.microsoft.com/office/drawing/2014/main" id="{663A707E-3767-4966-AD05-B1192742BE39}"/>
+              </a:ext>
+            </a:extLst>
+          </p:cNvPr>
+          <p:cNvPicPr>
+            <a:picLocks noGrp="1" noChangeAspect="1"/>
+          </p:cNvPicPr>
+          <p:nvPr>
+            <p:ph sz="quarter" idx="14"/>
+          </p:nvPr>
+        </p:nvPicPr>
+        <p:blipFill>
+          <a:blip r:embed="rId3"/>
+          <a:stretch>
+            <a:fillRect/>
+          </a:stretch>
+        </p:blipFill>
+        <p:spPr>
+          <a:xfrm>
+            <a:off x="4802342" y="465699"/>
+            <a:ext cx="6649960" cy="4864972"/>
+          </a:xfrm>
+        </p:spPr>
+      </p:pic>
     </p:spTree>
     <p:extLst>
       <p:ext uri="{BB962C8B-B14F-4D97-AF65-F5344CB8AC3E}">
@@ -12220,7 +12133,7 @@
                             </p:stCondLst>
                             <p:childTnLst>
                               <p:par>
-                                <p:cTn id="5" presetID="1" presetClass="entr" presetSubtype="0" fill="hold" nodeType="clickEffect">
+                                <p:cTn id="5" presetID="10" presetClass="entr" presetSubtype="0" fill="hold" grpId="0" nodeType="clickEffect">
                                   <p:stCondLst>
                                     <p:cond delay="0"/>
                                   </p:stCondLst>
@@ -12228,51 +12141,6 @@
                                     <p:set>
                                       <p:cBhvr>
                                         <p:cTn id="6" dur="1" fill="hold">
-                                          <p:stCondLst>
-                                            <p:cond delay="0"/>
-                                          </p:stCondLst>
-                                        </p:cTn>
-                                        <p:tgtEl>
-                                          <p:spTgt spid="6"/>
-                                        </p:tgtEl>
-                                        <p:attrNameLst>
-                                          <p:attrName>style.visibility</p:attrName>
-                                        </p:attrNameLst>
-                                      </p:cBhvr>
-                                      <p:to>
-                                        <p:strVal val="visible"/>
-                                      </p:to>
-                                    </p:set>
-                                  </p:childTnLst>
-                                </p:cTn>
-                              </p:par>
-                            </p:childTnLst>
-                          </p:cTn>
-                        </p:par>
-                      </p:childTnLst>
-                    </p:cTn>
-                  </p:par>
-                  <p:par>
-                    <p:cTn id="7" fill="hold">
-                      <p:stCondLst>
-                        <p:cond delay="indefinite"/>
-                      </p:stCondLst>
-                      <p:childTnLst>
-                        <p:par>
-                          <p:cTn id="8" fill="hold">
-                            <p:stCondLst>
-                              <p:cond delay="0"/>
-                            </p:stCondLst>
-                            <p:childTnLst>
-                              <p:par>
-                                <p:cTn id="9" presetID="10" presetClass="entr" presetSubtype="0" fill="hold" grpId="0" nodeType="clickEffect">
-                                  <p:stCondLst>
-                                    <p:cond delay="0"/>
-                                  </p:stCondLst>
-                                  <p:childTnLst>
-                                    <p:set>
-                                      <p:cBhvr>
-                                        <p:cTn id="10" dur="1" fill="hold">
                                           <p:stCondLst>
                                             <p:cond delay="0"/>
                                           </p:stCondLst>
@@ -12290,12 +12158,57 @@
                                     </p:set>
                                     <p:animEffect transition="in" filter="fade">
                                       <p:cBhvr>
-                                        <p:cTn id="11" dur="500"/>
+                                        <p:cTn id="7" dur="500"/>
                                         <p:tgtEl>
                                           <p:spTgt spid="20"/>
                                         </p:tgtEl>
                                       </p:cBhvr>
                                     </p:animEffect>
+                                  </p:childTnLst>
+                                </p:cTn>
+                              </p:par>
+                            </p:childTnLst>
+                          </p:cTn>
+                        </p:par>
+                      </p:childTnLst>
+                    </p:cTn>
+                  </p:par>
+                  <p:par>
+                    <p:cTn id="8" fill="hold">
+                      <p:stCondLst>
+                        <p:cond delay="indefinite"/>
+                      </p:stCondLst>
+                      <p:childTnLst>
+                        <p:par>
+                          <p:cTn id="9" fill="hold">
+                            <p:stCondLst>
+                              <p:cond delay="0"/>
+                            </p:stCondLst>
+                            <p:childTnLst>
+                              <p:par>
+                                <p:cTn id="10" presetID="1" presetClass="entr" presetSubtype="0" fill="hold" nodeType="clickEffect">
+                                  <p:stCondLst>
+                                    <p:cond delay="0"/>
+                                  </p:stCondLst>
+                                  <p:childTnLst>
+                                    <p:set>
+                                      <p:cBhvr>
+                                        <p:cTn id="11" dur="1" fill="hold">
+                                          <p:stCondLst>
+                                            <p:cond delay="0"/>
+                                          </p:stCondLst>
+                                        </p:cTn>
+                                        <p:tgtEl>
+                                          <p:spTgt spid="8"/>
+                                        </p:tgtEl>
+                                        <p:attrNameLst>
+                                          <p:attrName>style.visibility</p:attrName>
+                                        </p:attrNameLst>
+                                      </p:cBhvr>
+                                      <p:to>
+                                        <p:strVal val="visible"/>
+                                      </p:to>
+                                    </p:set>
                                   </p:childTnLst>
                                 </p:cTn>
                               </p:par>
@@ -12355,7 +12268,7 @@
           <p:cNvPr id="2" name="Title 1">
             <a:extLst>
               <a:ext uri="{FF2B5EF4-FFF2-40B4-BE49-F238E27FC236}">
-                <a16:creationId xmlns:a16="http://schemas.microsoft.com/office/drawing/2014/main" xmlns="" id="{E2E2F591-D63D-4B4C-BA61-D3AD551C9A6C}"/>
+                <a16:creationId xmlns:a16="http://schemas.microsoft.com/office/drawing/2014/main" id="{E2E2F591-D63D-4B4C-BA61-D3AD551C9A6C}"/>
               </a:ext>
             </a:extLst>
           </p:cNvPr>
@@ -12383,12 +12296,48 @@
           </a:p>
         </p:txBody>
       </p:sp>
+      <p:sp>
+        <p:nvSpPr>
+          <p:cNvPr id="4" name="Content Placeholder 3">
+            <a:extLst>
+              <a:ext uri="{FF2B5EF4-FFF2-40B4-BE49-F238E27FC236}">
+                <a16:creationId xmlns:a16="http://schemas.microsoft.com/office/drawing/2014/main" id="{12467DB6-0126-47B9-8E01-C38BAC1C80F1}"/>
+              </a:ext>
+            </a:extLst>
+          </p:cNvPr>
+          <p:cNvSpPr>
+            <a:spLocks noGrp="1"/>
+          </p:cNvSpPr>
+          <p:nvPr>
+            <p:ph sz="quarter" idx="14"/>
+          </p:nvPr>
+        </p:nvSpPr>
+        <p:spPr>
+          <a:xfrm>
+            <a:off x="6287865" y="2241817"/>
+            <a:ext cx="5086538" cy="1772624"/>
+          </a:xfrm>
+        </p:spPr>
+        <p:txBody>
+          <a:bodyPr/>
+          <a:lstStyle/>
+          <a:p>
+            <a:pPr marL="0" indent="0" algn="r">
+              <a:buNone/>
+            </a:pPr>
+            <a:r>
+              <a:rPr lang="en-US" dirty="0"/>
+              <a:t>Facebook is a billion dollar business but does the number of likes on a Movie Facebook page correlate to more Gross Revenue?</a:t>
+            </a:r>
+          </a:p>
+        </p:txBody>
+      </p:sp>
       <p:pic>
         <p:nvPicPr>
-          <p:cNvPr id="6" name="Content Placeholder 5" descr="A close up of text on a white background&#10;&#10;Description generated with very high confidence">
+          <p:cNvPr id="8" name="Content Placeholder 7" descr="A close up of text on a white background&#10;&#10;Description generated with very high confidence">
             <a:extLst>
               <a:ext uri="{FF2B5EF4-FFF2-40B4-BE49-F238E27FC236}">
-                <a16:creationId xmlns:a16="http://schemas.microsoft.com/office/drawing/2014/main" xmlns="" id="{EF64E628-5CE7-4388-A7DF-3D20D7E29071}"/>
+                <a16:creationId xmlns:a16="http://schemas.microsoft.com/office/drawing/2014/main" id="{94721ABC-590D-48E1-A397-B8BA903A764C}"/>
               </a:ext>
             </a:extLst>
           </p:cNvPr>
@@ -12407,47 +12356,11 @@
         </p:blipFill>
         <p:spPr>
           <a:xfrm>
-            <a:off x="0" y="1186812"/>
-            <a:ext cx="6264114" cy="4431512"/>
+            <a:off x="369907" y="1293304"/>
+            <a:ext cx="5412001" cy="3959307"/>
           </a:xfrm>
         </p:spPr>
       </p:pic>
-      <p:sp>
-        <p:nvSpPr>
-          <p:cNvPr id="4" name="Content Placeholder 3">
-            <a:extLst>
-              <a:ext uri="{FF2B5EF4-FFF2-40B4-BE49-F238E27FC236}">
-                <a16:creationId xmlns:a16="http://schemas.microsoft.com/office/drawing/2014/main" xmlns="" id="{12467DB6-0126-47B9-8E01-C38BAC1C80F1}"/>
-              </a:ext>
-            </a:extLst>
-          </p:cNvPr>
-          <p:cNvSpPr>
-            <a:spLocks noGrp="1"/>
-          </p:cNvSpPr>
-          <p:nvPr>
-            <p:ph sz="quarter" idx="14"/>
-          </p:nvPr>
-        </p:nvSpPr>
-        <p:spPr>
-          <a:xfrm>
-            <a:off x="6287865" y="2241817"/>
-            <a:ext cx="5086538" cy="1772624"/>
-          </a:xfrm>
-        </p:spPr>
-        <p:txBody>
-          <a:bodyPr/>
-          <a:lstStyle/>
-          <a:p>
-            <a:pPr marL="0" indent="0" algn="r">
-              <a:buNone/>
-            </a:pPr>
-            <a:r>
-              <a:rPr lang="en-US" dirty="0"/>
-              <a:t>Facebook is a billion dollar business but does the number of likes on a Movie Facebook page correlate to more Gross Revenue?</a:t>
-            </a:r>
-          </a:p>
-        </p:txBody>
-      </p:sp>
     </p:spTree>
     <p:extLst>
       <p:ext uri="{BB962C8B-B14F-4D97-AF65-F5344CB8AC3E}">
@@ -12479,7 +12392,7 @@
                             </p:stCondLst>
                             <p:childTnLst>
                               <p:par>
-                                <p:cTn id="5" presetID="1" presetClass="entr" presetSubtype="0" fill="hold" nodeType="clickEffect">
+                                <p:cTn id="5" presetID="10" presetClass="entr" presetSubtype="0" fill="hold" nodeType="clickEffect">
                                   <p:stCondLst>
                                     <p:cond delay="0"/>
                                   </p:stCondLst>
@@ -12492,7 +12405,7 @@
                                           </p:stCondLst>
                                         </p:cTn>
                                         <p:tgtEl>
-                                          <p:spTgt spid="6"/>
+                                          <p:spTgt spid="8"/>
                                         </p:tgtEl>
                                         <p:attrNameLst>
                                           <p:attrName>style.visibility</p:attrName>
@@ -12502,6 +12415,14 @@
                                         <p:strVal val="visible"/>
                                       </p:to>
                                     </p:set>
+                                    <p:animEffect transition="in" filter="fade">
+                                      <p:cBhvr>
+                                        <p:cTn id="7" dur="500"/>
+                                        <p:tgtEl>
+                                          <p:spTgt spid="8"/>
+                                        </p:tgtEl>
+                                      </p:cBhvr>
+                                    </p:animEffect>
                                   </p:childTnLst>
                                 </p:cTn>
                               </p:par>
@@ -12558,7 +12479,7 @@
           <p:cNvPr id="2" name="Title 1">
             <a:extLst>
               <a:ext uri="{FF2B5EF4-FFF2-40B4-BE49-F238E27FC236}">
-                <a16:creationId xmlns:a16="http://schemas.microsoft.com/office/drawing/2014/main" xmlns="" id="{236C88B5-D1A0-4B7D-BC80-BA0050016305}"/>
+                <a16:creationId xmlns:a16="http://schemas.microsoft.com/office/drawing/2014/main" id="{236C88B5-D1A0-4B7D-BC80-BA0050016305}"/>
               </a:ext>
             </a:extLst>
           </p:cNvPr>
@@ -12600,7 +12521,7 @@
           <p:cNvPr id="3" name="Content Placeholder 2">
             <a:extLst>
               <a:ext uri="{FF2B5EF4-FFF2-40B4-BE49-F238E27FC236}">
-                <a16:creationId xmlns:a16="http://schemas.microsoft.com/office/drawing/2014/main" xmlns="" id="{B817A838-CD8E-454C-8265-33BD2EF0086B}"/>
+                <a16:creationId xmlns:a16="http://schemas.microsoft.com/office/drawing/2014/main" id="{B817A838-CD8E-454C-8265-33BD2EF0086B}"/>
               </a:ext>
             </a:extLst>
           </p:cNvPr>
@@ -12642,10 +12563,10 @@
       </p:sp>
       <p:pic>
         <p:nvPicPr>
-          <p:cNvPr id="6" name="Content Placeholder 5">
+          <p:cNvPr id="8" name="Content Placeholder 7">
             <a:extLst>
               <a:ext uri="{FF2B5EF4-FFF2-40B4-BE49-F238E27FC236}">
-                <a16:creationId xmlns:a16="http://schemas.microsoft.com/office/drawing/2014/main" xmlns="" id="{1F1C2F8B-A979-4F25-9871-0BBA34D98D3F}"/>
+                <a16:creationId xmlns:a16="http://schemas.microsoft.com/office/drawing/2014/main" id="{228E1959-7354-44B0-99D6-BF14C8DDFB5B}"/>
               </a:ext>
             </a:extLst>
           </p:cNvPr>
@@ -12664,8 +12585,8 @@
         </p:blipFill>
         <p:spPr>
           <a:xfrm>
-            <a:off x="4821812" y="1017168"/>
-            <a:ext cx="6794556" cy="4544704"/>
+            <a:off x="4846645" y="1022915"/>
+            <a:ext cx="6799684" cy="4548133"/>
           </a:xfrm>
         </p:spPr>
       </p:pic>
@@ -12713,7 +12634,7 @@
                                           </p:stCondLst>
                                         </p:cTn>
                                         <p:tgtEl>
-                                          <p:spTgt spid="6"/>
+                                          <p:spTgt spid="8"/>
                                         </p:tgtEl>
                                         <p:attrNameLst>
                                           <p:attrName>style.visibility</p:attrName>

</xml_diff>